<commit_message>
Fixed typos in the slides
</commit_message>
<xml_diff>
--- a/PTB - A gentle introduction (lecture one).pptx
+++ b/PTB - A gentle introduction (lecture one).pptx
@@ -155,6 +155,1313 @@
 <file path=ppt/changesInfos/changesInfo1.xml><?xml version="1.0" encoding="utf-8"?>
 <pc:chgInfo xmlns:a="http://schemas.openxmlformats.org/drawingml/2006/main" xmlns:r="http://schemas.openxmlformats.org/officeDocument/2006/relationships" xmlns:ac="http://schemas.microsoft.com/office/drawing/2013/main/command" xmlns:pc="http://schemas.microsoft.com/office/powerpoint/2013/main/command">
   <pc:docChgLst>
+    <pc:chgData name="Castegnaro, Andrea" userId="e719bb20-b48f-4237-97c2-e35c3e0dc9cd" providerId="ADAL" clId="{78304693-7C79-4023-BC7A-18AAB28EFB2B}"/>
+    <pc:docChg chg="undo redo custSel addSld delSld modSld">
+      <pc:chgData name="Castegnaro, Andrea" userId="e719bb20-b48f-4237-97c2-e35c3e0dc9cd" providerId="ADAL" clId="{78304693-7C79-4023-BC7A-18AAB28EFB2B}" dt="2022-01-24T15:20:50.212" v="5744" actId="1036"/>
+      <pc:docMkLst>
+        <pc:docMk/>
+      </pc:docMkLst>
+      <pc:sldChg chg="modSp mod">
+        <pc:chgData name="Castegnaro, Andrea" userId="e719bb20-b48f-4237-97c2-e35c3e0dc9cd" providerId="ADAL" clId="{78304693-7C79-4023-BC7A-18AAB28EFB2B}" dt="2022-01-24T14:04:22.236" v="1398" actId="1076"/>
+        <pc:sldMkLst>
+          <pc:docMk/>
+          <pc:sldMk cId="2445713399" sldId="312"/>
+        </pc:sldMkLst>
+        <pc:spChg chg="mod">
+          <ac:chgData name="Castegnaro, Andrea" userId="e719bb20-b48f-4237-97c2-e35c3e0dc9cd" providerId="ADAL" clId="{78304693-7C79-4023-BC7A-18AAB28EFB2B}" dt="2022-01-24T14:03:43.143" v="1369" actId="255"/>
+          <ac:spMkLst>
+            <pc:docMk/>
+            <pc:sldMk cId="2445713399" sldId="312"/>
+            <ac:spMk id="4" creationId="{28B7D50A-2F55-41BB-89F9-4739DA584FE6}"/>
+          </ac:spMkLst>
+        </pc:spChg>
+        <pc:spChg chg="mod">
+          <ac:chgData name="Castegnaro, Andrea" userId="e719bb20-b48f-4237-97c2-e35c3e0dc9cd" providerId="ADAL" clId="{78304693-7C79-4023-BC7A-18AAB28EFB2B}" dt="2022-01-24T14:04:22.236" v="1398" actId="1076"/>
+          <ac:spMkLst>
+            <pc:docMk/>
+            <pc:sldMk cId="2445713399" sldId="312"/>
+            <ac:spMk id="5" creationId="{C11578D7-67FF-4927-BFF8-8E8235ECAA05}"/>
+          </ac:spMkLst>
+        </pc:spChg>
+      </pc:sldChg>
+      <pc:sldChg chg="modSp mod">
+        <pc:chgData name="Castegnaro, Andrea" userId="e719bb20-b48f-4237-97c2-e35c3e0dc9cd" providerId="ADAL" clId="{78304693-7C79-4023-BC7A-18AAB28EFB2B}" dt="2022-01-24T14:09:45.412" v="1702" actId="27636"/>
+        <pc:sldMkLst>
+          <pc:docMk/>
+          <pc:sldMk cId="3098246948" sldId="320"/>
+        </pc:sldMkLst>
+        <pc:spChg chg="mod">
+          <ac:chgData name="Castegnaro, Andrea" userId="e719bb20-b48f-4237-97c2-e35c3e0dc9cd" providerId="ADAL" clId="{78304693-7C79-4023-BC7A-18AAB28EFB2B}" dt="2022-01-24T14:09:45.412" v="1702" actId="27636"/>
+          <ac:spMkLst>
+            <pc:docMk/>
+            <pc:sldMk cId="3098246948" sldId="320"/>
+            <ac:spMk id="7" creationId="{54CD5984-D0C0-4B4F-AC0A-2376ABCE0754}"/>
+          </ac:spMkLst>
+        </pc:spChg>
+      </pc:sldChg>
+      <pc:sldChg chg="addSp modSp mod">
+        <pc:chgData name="Castegnaro, Andrea" userId="e719bb20-b48f-4237-97c2-e35c3e0dc9cd" providerId="ADAL" clId="{78304693-7C79-4023-BC7A-18AAB28EFB2B}" dt="2022-01-24T14:21:32.240" v="2586" actId="1037"/>
+        <pc:sldMkLst>
+          <pc:docMk/>
+          <pc:sldMk cId="2695853462" sldId="321"/>
+        </pc:sldMkLst>
+        <pc:spChg chg="mod">
+          <ac:chgData name="Castegnaro, Andrea" userId="e719bb20-b48f-4237-97c2-e35c3e0dc9cd" providerId="ADAL" clId="{78304693-7C79-4023-BC7A-18AAB28EFB2B}" dt="2022-01-24T14:21:00.276" v="2492" actId="20577"/>
+          <ac:spMkLst>
+            <pc:docMk/>
+            <pc:sldMk cId="2695853462" sldId="321"/>
+            <ac:spMk id="7" creationId="{54CD5984-D0C0-4B4F-AC0A-2376ABCE0754}"/>
+          </ac:spMkLst>
+        </pc:spChg>
+        <pc:spChg chg="mod">
+          <ac:chgData name="Castegnaro, Andrea" userId="e719bb20-b48f-4237-97c2-e35c3e0dc9cd" providerId="ADAL" clId="{78304693-7C79-4023-BC7A-18AAB28EFB2B}" dt="2022-01-24T14:21:13.508" v="2493" actId="1076"/>
+          <ac:spMkLst>
+            <pc:docMk/>
+            <pc:sldMk cId="2695853462" sldId="321"/>
+            <ac:spMk id="11" creationId="{4AED893B-59AF-4521-930C-481ADBDA9A07}"/>
+          </ac:spMkLst>
+        </pc:spChg>
+        <pc:spChg chg="mod">
+          <ac:chgData name="Castegnaro, Andrea" userId="e719bb20-b48f-4237-97c2-e35c3e0dc9cd" providerId="ADAL" clId="{78304693-7C79-4023-BC7A-18AAB28EFB2B}" dt="2022-01-24T14:21:32.240" v="2586" actId="1037"/>
+          <ac:spMkLst>
+            <pc:docMk/>
+            <pc:sldMk cId="2695853462" sldId="321"/>
+            <ac:spMk id="25" creationId="{F5F18927-EBD5-4151-BD31-2C9DB79B28F4}"/>
+          </ac:spMkLst>
+        </pc:spChg>
+        <pc:picChg chg="add mod">
+          <ac:chgData name="Castegnaro, Andrea" userId="e719bb20-b48f-4237-97c2-e35c3e0dc9cd" providerId="ADAL" clId="{78304693-7C79-4023-BC7A-18AAB28EFB2B}" dt="2022-01-24T14:11:12.450" v="1737" actId="1076"/>
+          <ac:picMkLst>
+            <pc:docMk/>
+            <pc:sldMk cId="2695853462" sldId="321"/>
+            <ac:picMk id="4" creationId="{62082887-9F3C-4282-84C6-391B42F8CC77}"/>
+          </ac:picMkLst>
+        </pc:picChg>
+      </pc:sldChg>
+      <pc:sldChg chg="addSp modSp mod">
+        <pc:chgData name="Castegnaro, Andrea" userId="e719bb20-b48f-4237-97c2-e35c3e0dc9cd" providerId="ADAL" clId="{78304693-7C79-4023-BC7A-18AAB28EFB2B}" dt="2022-01-24T14:10:40.205" v="1733" actId="1076"/>
+        <pc:sldMkLst>
+          <pc:docMk/>
+          <pc:sldMk cId="3366187170" sldId="322"/>
+        </pc:sldMkLst>
+        <pc:spChg chg="mod">
+          <ac:chgData name="Castegnaro, Andrea" userId="e719bb20-b48f-4237-97c2-e35c3e0dc9cd" providerId="ADAL" clId="{78304693-7C79-4023-BC7A-18AAB28EFB2B}" dt="2022-01-24T14:10:01.512" v="1731" actId="20577"/>
+          <ac:spMkLst>
+            <pc:docMk/>
+            <pc:sldMk cId="3366187170" sldId="322"/>
+            <ac:spMk id="7" creationId="{54CD5984-D0C0-4B4F-AC0A-2376ABCE0754}"/>
+          </ac:spMkLst>
+        </pc:spChg>
+        <pc:picChg chg="add mod">
+          <ac:chgData name="Castegnaro, Andrea" userId="e719bb20-b48f-4237-97c2-e35c3e0dc9cd" providerId="ADAL" clId="{78304693-7C79-4023-BC7A-18AAB28EFB2B}" dt="2022-01-24T14:10:40.205" v="1733" actId="1076"/>
+          <ac:picMkLst>
+            <pc:docMk/>
+            <pc:sldMk cId="3366187170" sldId="322"/>
+            <ac:picMk id="3" creationId="{2FACF68E-D86F-4282-B9E1-B5F86B9E8A69}"/>
+          </ac:picMkLst>
+        </pc:picChg>
+        <pc:picChg chg="mod">
+          <ac:chgData name="Castegnaro, Andrea" userId="e719bb20-b48f-4237-97c2-e35c3e0dc9cd" providerId="ADAL" clId="{78304693-7C79-4023-BC7A-18AAB28EFB2B}" dt="2022-01-24T14:09:59.199" v="1729" actId="1036"/>
+          <ac:picMkLst>
+            <pc:docMk/>
+            <pc:sldMk cId="3366187170" sldId="322"/>
+            <ac:picMk id="5" creationId="{946E137A-3507-460F-92B7-F6F41D6667F3}"/>
+          </ac:picMkLst>
+        </pc:picChg>
+      </pc:sldChg>
+      <pc:sldChg chg="del">
+        <pc:chgData name="Castegnaro, Andrea" userId="e719bb20-b48f-4237-97c2-e35c3e0dc9cd" providerId="ADAL" clId="{78304693-7C79-4023-BC7A-18AAB28EFB2B}" dt="2022-01-24T12:16:12.123" v="0" actId="47"/>
+        <pc:sldMkLst>
+          <pc:docMk/>
+          <pc:sldMk cId="4124654771" sldId="323"/>
+        </pc:sldMkLst>
+      </pc:sldChg>
+      <pc:sldChg chg="addSp modSp mod">
+        <pc:chgData name="Castegnaro, Andrea" userId="e719bb20-b48f-4237-97c2-e35c3e0dc9cd" providerId="ADAL" clId="{78304693-7C79-4023-BC7A-18AAB28EFB2B}" dt="2022-01-24T14:27:02.850" v="2853" actId="14100"/>
+        <pc:sldMkLst>
+          <pc:docMk/>
+          <pc:sldMk cId="399080098" sldId="324"/>
+        </pc:sldMkLst>
+        <pc:spChg chg="mod">
+          <ac:chgData name="Castegnaro, Andrea" userId="e719bb20-b48f-4237-97c2-e35c3e0dc9cd" providerId="ADAL" clId="{78304693-7C79-4023-BC7A-18AAB28EFB2B}" dt="2022-01-24T14:25:32.638" v="2851" actId="20577"/>
+          <ac:spMkLst>
+            <pc:docMk/>
+            <pc:sldMk cId="399080098" sldId="324"/>
+            <ac:spMk id="7" creationId="{54CD5984-D0C0-4B4F-AC0A-2376ABCE0754}"/>
+          </ac:spMkLst>
+        </pc:spChg>
+        <pc:grpChg chg="mod">
+          <ac:chgData name="Castegnaro, Andrea" userId="e719bb20-b48f-4237-97c2-e35c3e0dc9cd" providerId="ADAL" clId="{78304693-7C79-4023-BC7A-18AAB28EFB2B}" dt="2022-01-24T14:26:52.601" v="2852" actId="14100"/>
+          <ac:grpSpMkLst>
+            <pc:docMk/>
+            <pc:sldMk cId="399080098" sldId="324"/>
+            <ac:grpSpMk id="9" creationId="{0FDBFE43-2856-4A45-979D-1A1EDA34662D}"/>
+          </ac:grpSpMkLst>
+        </pc:grpChg>
+        <pc:grpChg chg="mod">
+          <ac:chgData name="Castegnaro, Andrea" userId="e719bb20-b48f-4237-97c2-e35c3e0dc9cd" providerId="ADAL" clId="{78304693-7C79-4023-BC7A-18AAB28EFB2B}" dt="2022-01-24T14:27:02.850" v="2853" actId="14100"/>
+          <ac:grpSpMkLst>
+            <pc:docMk/>
+            <pc:sldMk cId="399080098" sldId="324"/>
+            <ac:grpSpMk id="12" creationId="{CC68E5B3-7249-45C9-BA86-9E3BBEBA998A}"/>
+          </ac:grpSpMkLst>
+        </pc:grpChg>
+        <pc:picChg chg="add mod">
+          <ac:chgData name="Castegnaro, Andrea" userId="e719bb20-b48f-4237-97c2-e35c3e0dc9cd" providerId="ADAL" clId="{78304693-7C79-4023-BC7A-18AAB28EFB2B}" dt="2022-01-24T14:12:19.179" v="1739" actId="1076"/>
+          <ac:picMkLst>
+            <pc:docMk/>
+            <pc:sldMk cId="399080098" sldId="324"/>
+            <ac:picMk id="3" creationId="{A8E7FCFF-040A-4AB8-AE7A-8540942394E2}"/>
+          </ac:picMkLst>
+        </pc:picChg>
+      </pc:sldChg>
+      <pc:sldChg chg="addSp modSp mod">
+        <pc:chgData name="Castegnaro, Andrea" userId="e719bb20-b48f-4237-97c2-e35c3e0dc9cd" providerId="ADAL" clId="{78304693-7C79-4023-BC7A-18AAB28EFB2B}" dt="2022-01-24T14:29:27.809" v="3123" actId="20577"/>
+        <pc:sldMkLst>
+          <pc:docMk/>
+          <pc:sldMk cId="2336413018" sldId="325"/>
+        </pc:sldMkLst>
+        <pc:spChg chg="mod">
+          <ac:chgData name="Castegnaro, Andrea" userId="e719bb20-b48f-4237-97c2-e35c3e0dc9cd" providerId="ADAL" clId="{78304693-7C79-4023-BC7A-18AAB28EFB2B}" dt="2022-01-24T14:28:16.095" v="2977" actId="1076"/>
+          <ac:spMkLst>
+            <pc:docMk/>
+            <pc:sldMk cId="2336413018" sldId="325"/>
+            <ac:spMk id="16" creationId="{857DB101-D698-46A5-8E69-583A5022065A}"/>
+          </ac:spMkLst>
+        </pc:spChg>
+        <pc:spChg chg="mod">
+          <ac:chgData name="Castegnaro, Andrea" userId="e719bb20-b48f-4237-97c2-e35c3e0dc9cd" providerId="ADAL" clId="{78304693-7C79-4023-BC7A-18AAB28EFB2B}" dt="2022-01-24T14:29:27.809" v="3123" actId="20577"/>
+          <ac:spMkLst>
+            <pc:docMk/>
+            <pc:sldMk cId="2336413018" sldId="325"/>
+            <ac:spMk id="17" creationId="{0D8970B3-669D-467D-AB3C-62B855528DFE}"/>
+          </ac:spMkLst>
+        </pc:spChg>
+        <pc:grpChg chg="mod">
+          <ac:chgData name="Castegnaro, Andrea" userId="e719bb20-b48f-4237-97c2-e35c3e0dc9cd" providerId="ADAL" clId="{78304693-7C79-4023-BC7A-18AAB28EFB2B}" dt="2022-01-24T14:29:24.176" v="3122" actId="1076"/>
+          <ac:grpSpMkLst>
+            <pc:docMk/>
+            <pc:sldMk cId="2336413018" sldId="325"/>
+            <ac:grpSpMk id="15" creationId="{BCC43B12-C895-4A10-8A0F-C95B291A7394}"/>
+          </ac:grpSpMkLst>
+        </pc:grpChg>
+        <pc:picChg chg="add mod">
+          <ac:chgData name="Castegnaro, Andrea" userId="e719bb20-b48f-4237-97c2-e35c3e0dc9cd" providerId="ADAL" clId="{78304693-7C79-4023-BC7A-18AAB28EFB2B}" dt="2022-01-24T14:12:21.379" v="1740"/>
+          <ac:picMkLst>
+            <pc:docMk/>
+            <pc:sldMk cId="2336413018" sldId="325"/>
+            <ac:picMk id="8" creationId="{399F033C-09C9-42AD-90C5-996F31A30D96}"/>
+          </ac:picMkLst>
+        </pc:picChg>
+      </pc:sldChg>
+      <pc:sldChg chg="modSp mod">
+        <pc:chgData name="Castegnaro, Andrea" userId="e719bb20-b48f-4237-97c2-e35c3e0dc9cd" providerId="ADAL" clId="{78304693-7C79-4023-BC7A-18AAB28EFB2B}" dt="2022-01-24T14:41:45.695" v="3572" actId="1035"/>
+        <pc:sldMkLst>
+          <pc:docMk/>
+          <pc:sldMk cId="2722255684" sldId="327"/>
+        </pc:sldMkLst>
+        <pc:spChg chg="mod">
+          <ac:chgData name="Castegnaro, Andrea" userId="e719bb20-b48f-4237-97c2-e35c3e0dc9cd" providerId="ADAL" clId="{78304693-7C79-4023-BC7A-18AAB28EFB2B}" dt="2022-01-24T14:32:44.831" v="3233" actId="20577"/>
+          <ac:spMkLst>
+            <pc:docMk/>
+            <pc:sldMk cId="2722255684" sldId="327"/>
+            <ac:spMk id="3" creationId="{7A55B0CE-1FB7-4986-A0C4-E26590DF9A46}"/>
+          </ac:spMkLst>
+        </pc:spChg>
+        <pc:spChg chg="mod">
+          <ac:chgData name="Castegnaro, Andrea" userId="e719bb20-b48f-4237-97c2-e35c3e0dc9cd" providerId="ADAL" clId="{78304693-7C79-4023-BC7A-18AAB28EFB2B}" dt="2022-01-24T14:41:45.695" v="3572" actId="1035"/>
+          <ac:spMkLst>
+            <pc:docMk/>
+            <pc:sldMk cId="2722255684" sldId="327"/>
+            <ac:spMk id="7" creationId="{E3909C12-3D74-485A-A00B-89F9856B98A8}"/>
+          </ac:spMkLst>
+        </pc:spChg>
+        <pc:spChg chg="mod">
+          <ac:chgData name="Castegnaro, Andrea" userId="e719bb20-b48f-4237-97c2-e35c3e0dc9cd" providerId="ADAL" clId="{78304693-7C79-4023-BC7A-18AAB28EFB2B}" dt="2022-01-24T14:41:45.695" v="3572" actId="1035"/>
+          <ac:spMkLst>
+            <pc:docMk/>
+            <pc:sldMk cId="2722255684" sldId="327"/>
+            <ac:spMk id="8" creationId="{5897A589-44FB-448A-B11A-48CE2E975CAD}"/>
+          </ac:spMkLst>
+        </pc:spChg>
+        <pc:spChg chg="mod">
+          <ac:chgData name="Castegnaro, Andrea" userId="e719bb20-b48f-4237-97c2-e35c3e0dc9cd" providerId="ADAL" clId="{78304693-7C79-4023-BC7A-18AAB28EFB2B}" dt="2022-01-24T14:41:45.695" v="3572" actId="1035"/>
+          <ac:spMkLst>
+            <pc:docMk/>
+            <pc:sldMk cId="2722255684" sldId="327"/>
+            <ac:spMk id="9" creationId="{9C309091-4E79-4937-9393-13DEDFEC62ED}"/>
+          </ac:spMkLst>
+        </pc:spChg>
+        <pc:spChg chg="mod">
+          <ac:chgData name="Castegnaro, Andrea" userId="e719bb20-b48f-4237-97c2-e35c3e0dc9cd" providerId="ADAL" clId="{78304693-7C79-4023-BC7A-18AAB28EFB2B}" dt="2022-01-24T14:41:45.695" v="3572" actId="1035"/>
+          <ac:spMkLst>
+            <pc:docMk/>
+            <pc:sldMk cId="2722255684" sldId="327"/>
+            <ac:spMk id="11" creationId="{1E9444AC-3345-494E-ACEA-0E4A35364B4C}"/>
+          </ac:spMkLst>
+        </pc:spChg>
+        <pc:spChg chg="mod">
+          <ac:chgData name="Castegnaro, Andrea" userId="e719bb20-b48f-4237-97c2-e35c3e0dc9cd" providerId="ADAL" clId="{78304693-7C79-4023-BC7A-18AAB28EFB2B}" dt="2022-01-24T14:41:45.695" v="3572" actId="1035"/>
+          <ac:spMkLst>
+            <pc:docMk/>
+            <pc:sldMk cId="2722255684" sldId="327"/>
+            <ac:spMk id="16" creationId="{4F0F9161-347E-405C-B3A2-902E63F04A53}"/>
+          </ac:spMkLst>
+        </pc:spChg>
+        <pc:spChg chg="mod">
+          <ac:chgData name="Castegnaro, Andrea" userId="e719bb20-b48f-4237-97c2-e35c3e0dc9cd" providerId="ADAL" clId="{78304693-7C79-4023-BC7A-18AAB28EFB2B}" dt="2022-01-24T14:32:51.775" v="3248" actId="1036"/>
+          <ac:spMkLst>
+            <pc:docMk/>
+            <pc:sldMk cId="2722255684" sldId="327"/>
+            <ac:spMk id="20" creationId="{AB91209B-4339-4CB3-89D3-D76B48348061}"/>
+          </ac:spMkLst>
+        </pc:spChg>
+        <pc:grpChg chg="mod">
+          <ac:chgData name="Castegnaro, Andrea" userId="e719bb20-b48f-4237-97c2-e35c3e0dc9cd" providerId="ADAL" clId="{78304693-7C79-4023-BC7A-18AAB28EFB2B}" dt="2022-01-24T14:30:05.918" v="3150" actId="1036"/>
+          <ac:grpSpMkLst>
+            <pc:docMk/>
+            <pc:sldMk cId="2722255684" sldId="327"/>
+            <ac:grpSpMk id="4" creationId="{D4B6B013-58ED-4EE5-B6F1-3D85207406FB}"/>
+          </ac:grpSpMkLst>
+        </pc:grpChg>
+        <pc:grpChg chg="mod">
+          <ac:chgData name="Castegnaro, Andrea" userId="e719bb20-b48f-4237-97c2-e35c3e0dc9cd" providerId="ADAL" clId="{78304693-7C79-4023-BC7A-18AAB28EFB2B}" dt="2022-01-24T14:41:45.695" v="3572" actId="1035"/>
+          <ac:grpSpMkLst>
+            <pc:docMk/>
+            <pc:sldMk cId="2722255684" sldId="327"/>
+            <ac:grpSpMk id="12" creationId="{9F47D37F-97CB-42BC-850A-E3AFB84C94BC}"/>
+          </ac:grpSpMkLst>
+        </pc:grpChg>
+      </pc:sldChg>
+      <pc:sldChg chg="modSp add del mod">
+        <pc:chgData name="Castegnaro, Andrea" userId="e719bb20-b48f-4237-97c2-e35c3e0dc9cd" providerId="ADAL" clId="{78304693-7C79-4023-BC7A-18AAB28EFB2B}" dt="2022-01-24T12:50:01.537" v="269" actId="2696"/>
+        <pc:sldMkLst>
+          <pc:docMk/>
+          <pc:sldMk cId="271442219" sldId="328"/>
+        </pc:sldMkLst>
+        <pc:cxnChg chg="mod">
+          <ac:chgData name="Castegnaro, Andrea" userId="e719bb20-b48f-4237-97c2-e35c3e0dc9cd" providerId="ADAL" clId="{78304693-7C79-4023-BC7A-18AAB28EFB2B}" dt="2022-01-24T12:47:30.513" v="266" actId="14100"/>
+          <ac:cxnSpMkLst>
+            <pc:docMk/>
+            <pc:sldMk cId="271442219" sldId="328"/>
+            <ac:cxnSpMk id="14" creationId="{C3ACF057-DF13-49E1-900B-8ABA3A1D8C63}"/>
+          </ac:cxnSpMkLst>
+        </pc:cxnChg>
+      </pc:sldChg>
+      <pc:sldChg chg="addSp modSp mod">
+        <pc:chgData name="Castegnaro, Andrea" userId="e719bb20-b48f-4237-97c2-e35c3e0dc9cd" providerId="ADAL" clId="{78304693-7C79-4023-BC7A-18AAB28EFB2B}" dt="2022-01-24T14:13:11.092" v="1746" actId="1076"/>
+        <pc:sldMkLst>
+          <pc:docMk/>
+          <pc:sldMk cId="1057538686" sldId="329"/>
+        </pc:sldMkLst>
+        <pc:picChg chg="add mod">
+          <ac:chgData name="Castegnaro, Andrea" userId="e719bb20-b48f-4237-97c2-e35c3e0dc9cd" providerId="ADAL" clId="{78304693-7C79-4023-BC7A-18AAB28EFB2B}" dt="2022-01-24T14:13:11.092" v="1746" actId="1076"/>
+          <ac:picMkLst>
+            <pc:docMk/>
+            <pc:sldMk cId="1057538686" sldId="329"/>
+            <ac:picMk id="5" creationId="{F96A5A5B-4B04-4B57-BFE8-AE72EFA23CF1}"/>
+          </ac:picMkLst>
+        </pc:picChg>
+      </pc:sldChg>
+      <pc:sldChg chg="addSp delSp modSp mod">
+        <pc:chgData name="Castegnaro, Andrea" userId="e719bb20-b48f-4237-97c2-e35c3e0dc9cd" providerId="ADAL" clId="{78304693-7C79-4023-BC7A-18AAB28EFB2B}" dt="2022-01-24T14:14:02.882" v="1749"/>
+        <pc:sldMkLst>
+          <pc:docMk/>
+          <pc:sldMk cId="2645979126" sldId="331"/>
+        </pc:sldMkLst>
+        <pc:picChg chg="add del mod">
+          <ac:chgData name="Castegnaro, Andrea" userId="e719bb20-b48f-4237-97c2-e35c3e0dc9cd" providerId="ADAL" clId="{78304693-7C79-4023-BC7A-18AAB28EFB2B}" dt="2022-01-24T14:13:58.195" v="1748" actId="478"/>
+          <ac:picMkLst>
+            <pc:docMk/>
+            <pc:sldMk cId="2645979126" sldId="331"/>
+            <ac:picMk id="30" creationId="{E4C3C554-72A8-4927-9F49-67FF1A7554CB}"/>
+          </ac:picMkLst>
+        </pc:picChg>
+        <pc:picChg chg="add mod">
+          <ac:chgData name="Castegnaro, Andrea" userId="e719bb20-b48f-4237-97c2-e35c3e0dc9cd" providerId="ADAL" clId="{78304693-7C79-4023-BC7A-18AAB28EFB2B}" dt="2022-01-24T14:14:02.882" v="1749"/>
+          <ac:picMkLst>
+            <pc:docMk/>
+            <pc:sldMk cId="2645979126" sldId="331"/>
+            <ac:picMk id="33" creationId="{9D2BB5CC-B830-4007-85FF-34E2D985C0DA}"/>
+          </ac:picMkLst>
+        </pc:picChg>
+      </pc:sldChg>
+      <pc:sldChg chg="addSp delSp modSp mod">
+        <pc:chgData name="Castegnaro, Andrea" userId="e719bb20-b48f-4237-97c2-e35c3e0dc9cd" providerId="ADAL" clId="{78304693-7C79-4023-BC7A-18AAB28EFB2B}" dt="2022-01-24T14:58:22.710" v="4330" actId="20577"/>
+        <pc:sldMkLst>
+          <pc:docMk/>
+          <pc:sldMk cId="3686595670" sldId="332"/>
+        </pc:sldMkLst>
+        <pc:spChg chg="mod">
+          <ac:chgData name="Castegnaro, Andrea" userId="e719bb20-b48f-4237-97c2-e35c3e0dc9cd" providerId="ADAL" clId="{78304693-7C79-4023-BC7A-18AAB28EFB2B}" dt="2022-01-24T14:58:22.710" v="4330" actId="20577"/>
+          <ac:spMkLst>
+            <pc:docMk/>
+            <pc:sldMk cId="3686595670" sldId="332"/>
+            <ac:spMk id="3" creationId="{7A55B0CE-1FB7-4986-A0C4-E26590DF9A46}"/>
+          </ac:spMkLst>
+        </pc:spChg>
+        <pc:picChg chg="add mod">
+          <ac:chgData name="Castegnaro, Andrea" userId="e719bb20-b48f-4237-97c2-e35c3e0dc9cd" providerId="ADAL" clId="{78304693-7C79-4023-BC7A-18AAB28EFB2B}" dt="2022-01-24T14:14:18.998" v="1751" actId="1076"/>
+          <ac:picMkLst>
+            <pc:docMk/>
+            <pc:sldMk cId="3686595670" sldId="332"/>
+            <ac:picMk id="5" creationId="{77E66B9E-2FDB-4A91-ADBC-9FCA72B0395F}"/>
+          </ac:picMkLst>
+        </pc:picChg>
+        <pc:cxnChg chg="add mod">
+          <ac:chgData name="Castegnaro, Andrea" userId="e719bb20-b48f-4237-97c2-e35c3e0dc9cd" providerId="ADAL" clId="{78304693-7C79-4023-BC7A-18AAB28EFB2B}" dt="2022-01-24T14:56:47.487" v="4254"/>
+          <ac:cxnSpMkLst>
+            <pc:docMk/>
+            <pc:sldMk cId="3686595670" sldId="332"/>
+            <ac:cxnSpMk id="20" creationId="{47E2323B-67A6-47A5-930E-D7C4D49074A1}"/>
+          </ac:cxnSpMkLst>
+        </pc:cxnChg>
+        <pc:cxnChg chg="add mod">
+          <ac:chgData name="Castegnaro, Andrea" userId="e719bb20-b48f-4237-97c2-e35c3e0dc9cd" providerId="ADAL" clId="{78304693-7C79-4023-BC7A-18AAB28EFB2B}" dt="2022-01-24T14:57:04.572" v="4259" actId="14100"/>
+          <ac:cxnSpMkLst>
+            <pc:docMk/>
+            <pc:sldMk cId="3686595670" sldId="332"/>
+            <ac:cxnSpMk id="21" creationId="{4505758A-570F-49DD-9986-14834BBFC022}"/>
+          </ac:cxnSpMkLst>
+        </pc:cxnChg>
+        <pc:cxnChg chg="del">
+          <ac:chgData name="Castegnaro, Andrea" userId="e719bb20-b48f-4237-97c2-e35c3e0dc9cd" providerId="ADAL" clId="{78304693-7C79-4023-BC7A-18AAB28EFB2B}" dt="2022-01-24T14:56:51.243" v="4257" actId="478"/>
+          <ac:cxnSpMkLst>
+            <pc:docMk/>
+            <pc:sldMk cId="3686595670" sldId="332"/>
+            <ac:cxnSpMk id="46" creationId="{B5ABE54A-D144-48DA-81B8-2A36557D5A8D}"/>
+          </ac:cxnSpMkLst>
+        </pc:cxnChg>
+        <pc:cxnChg chg="del">
+          <ac:chgData name="Castegnaro, Andrea" userId="e719bb20-b48f-4237-97c2-e35c3e0dc9cd" providerId="ADAL" clId="{78304693-7C79-4023-BC7A-18AAB28EFB2B}" dt="2022-01-24T14:56:46.560" v="4253" actId="21"/>
+          <ac:cxnSpMkLst>
+            <pc:docMk/>
+            <pc:sldMk cId="3686595670" sldId="332"/>
+            <ac:cxnSpMk id="48" creationId="{564BE0B4-1901-4972-9A40-A1B068109D06}"/>
+          </ac:cxnSpMkLst>
+        </pc:cxnChg>
+      </pc:sldChg>
+      <pc:sldChg chg="addSp modSp mod">
+        <pc:chgData name="Castegnaro, Andrea" userId="e719bb20-b48f-4237-97c2-e35c3e0dc9cd" providerId="ADAL" clId="{78304693-7C79-4023-BC7A-18AAB28EFB2B}" dt="2022-01-24T15:00:00.999" v="4529" actId="20577"/>
+        <pc:sldMkLst>
+          <pc:docMk/>
+          <pc:sldMk cId="4054631168" sldId="333"/>
+        </pc:sldMkLst>
+        <pc:spChg chg="mod">
+          <ac:chgData name="Castegnaro, Andrea" userId="e719bb20-b48f-4237-97c2-e35c3e0dc9cd" providerId="ADAL" clId="{78304693-7C79-4023-BC7A-18AAB28EFB2B}" dt="2022-01-24T15:00:00.999" v="4529" actId="20577"/>
+          <ac:spMkLst>
+            <pc:docMk/>
+            <pc:sldMk cId="4054631168" sldId="333"/>
+            <ac:spMk id="3" creationId="{7A55B0CE-1FB7-4986-A0C4-E26590DF9A46}"/>
+          </ac:spMkLst>
+        </pc:spChg>
+        <pc:picChg chg="add mod">
+          <ac:chgData name="Castegnaro, Andrea" userId="e719bb20-b48f-4237-97c2-e35c3e0dc9cd" providerId="ADAL" clId="{78304693-7C79-4023-BC7A-18AAB28EFB2B}" dt="2022-01-24T14:14:56.116" v="1755" actId="1076"/>
+          <ac:picMkLst>
+            <pc:docMk/>
+            <pc:sldMk cId="4054631168" sldId="333"/>
+            <ac:picMk id="5" creationId="{73EAFDEE-D909-4FE6-940D-0E58C315D038}"/>
+          </ac:picMkLst>
+        </pc:picChg>
+      </pc:sldChg>
+      <pc:sldChg chg="modSp mod">
+        <pc:chgData name="Castegnaro, Andrea" userId="e719bb20-b48f-4237-97c2-e35c3e0dc9cd" providerId="ADAL" clId="{78304693-7C79-4023-BC7A-18AAB28EFB2B}" dt="2022-01-24T14:36:48.525" v="3385" actId="20577"/>
+        <pc:sldMkLst>
+          <pc:docMk/>
+          <pc:sldMk cId="3423161011" sldId="334"/>
+        </pc:sldMkLst>
+        <pc:spChg chg="mod">
+          <ac:chgData name="Castegnaro, Andrea" userId="e719bb20-b48f-4237-97c2-e35c3e0dc9cd" providerId="ADAL" clId="{78304693-7C79-4023-BC7A-18AAB28EFB2B}" dt="2022-01-24T14:36:14.014" v="3371" actId="20577"/>
+          <ac:spMkLst>
+            <pc:docMk/>
+            <pc:sldMk cId="3423161011" sldId="334"/>
+            <ac:spMk id="3" creationId="{7A55B0CE-1FB7-4986-A0C4-E26590DF9A46}"/>
+          </ac:spMkLst>
+        </pc:spChg>
+        <pc:spChg chg="mod">
+          <ac:chgData name="Castegnaro, Andrea" userId="e719bb20-b48f-4237-97c2-e35c3e0dc9cd" providerId="ADAL" clId="{78304693-7C79-4023-BC7A-18AAB28EFB2B}" dt="2022-01-24T14:36:48.525" v="3385" actId="20577"/>
+          <ac:spMkLst>
+            <pc:docMk/>
+            <pc:sldMk cId="3423161011" sldId="334"/>
+            <ac:spMk id="62" creationId="{5F01621C-58DB-4146-961B-8013B9006F9A}"/>
+          </ac:spMkLst>
+        </pc:spChg>
+      </pc:sldChg>
+      <pc:sldChg chg="addSp modSp mod">
+        <pc:chgData name="Castegnaro, Andrea" userId="e719bb20-b48f-4237-97c2-e35c3e0dc9cd" providerId="ADAL" clId="{78304693-7C79-4023-BC7A-18AAB28EFB2B}" dt="2022-01-24T14:51:06.607" v="4251" actId="20577"/>
+        <pc:sldMkLst>
+          <pc:docMk/>
+          <pc:sldMk cId="718657368" sldId="335"/>
+        </pc:sldMkLst>
+        <pc:spChg chg="mod">
+          <ac:chgData name="Castegnaro, Andrea" userId="e719bb20-b48f-4237-97c2-e35c3e0dc9cd" providerId="ADAL" clId="{78304693-7C79-4023-BC7A-18AAB28EFB2B}" dt="2022-01-24T13:57:21.372" v="931" actId="20577"/>
+          <ac:spMkLst>
+            <pc:docMk/>
+            <pc:sldMk cId="718657368" sldId="335"/>
+            <ac:spMk id="2" creationId="{32DCA100-7D85-4A3C-9993-92EC37D3F8E2}"/>
+          </ac:spMkLst>
+        </pc:spChg>
+        <pc:spChg chg="mod">
+          <ac:chgData name="Castegnaro, Andrea" userId="e719bb20-b48f-4237-97c2-e35c3e0dc9cd" providerId="ADAL" clId="{78304693-7C79-4023-BC7A-18AAB28EFB2B}" dt="2022-01-24T12:51:04.988" v="316" actId="403"/>
+          <ac:spMkLst>
+            <pc:docMk/>
+            <pc:sldMk cId="718657368" sldId="335"/>
+            <ac:spMk id="3" creationId="{7A55B0CE-1FB7-4986-A0C4-E26590DF9A46}"/>
+          </ac:spMkLst>
+        </pc:spChg>
+        <pc:spChg chg="mod">
+          <ac:chgData name="Castegnaro, Andrea" userId="e719bb20-b48f-4237-97c2-e35c3e0dc9cd" providerId="ADAL" clId="{78304693-7C79-4023-BC7A-18AAB28EFB2B}" dt="2022-01-24T14:46:18.938" v="3855" actId="20577"/>
+          <ac:spMkLst>
+            <pc:docMk/>
+            <pc:sldMk cId="718657368" sldId="335"/>
+            <ac:spMk id="25" creationId="{8B877B96-EC26-48B0-A817-98407AEAFB73}"/>
+          </ac:spMkLst>
+        </pc:spChg>
+        <pc:spChg chg="mod">
+          <ac:chgData name="Castegnaro, Andrea" userId="e719bb20-b48f-4237-97c2-e35c3e0dc9cd" providerId="ADAL" clId="{78304693-7C79-4023-BC7A-18AAB28EFB2B}" dt="2022-01-24T14:46:53.911" v="3876" actId="20577"/>
+          <ac:spMkLst>
+            <pc:docMk/>
+            <pc:sldMk cId="718657368" sldId="335"/>
+            <ac:spMk id="39" creationId="{2F98A3E9-C2A3-4920-8955-DAC8246077A7}"/>
+          </ac:spMkLst>
+        </pc:spChg>
+        <pc:spChg chg="mod">
+          <ac:chgData name="Castegnaro, Andrea" userId="e719bb20-b48f-4237-97c2-e35c3e0dc9cd" providerId="ADAL" clId="{78304693-7C79-4023-BC7A-18AAB28EFB2B}" dt="2022-01-24T12:51:31.584" v="330" actId="20577"/>
+          <ac:spMkLst>
+            <pc:docMk/>
+            <pc:sldMk cId="718657368" sldId="335"/>
+            <ac:spMk id="50" creationId="{CA328B6A-8775-4A7D-94E8-76EFC8BAF3CC}"/>
+          </ac:spMkLst>
+        </pc:spChg>
+        <pc:spChg chg="mod">
+          <ac:chgData name="Castegnaro, Andrea" userId="e719bb20-b48f-4237-97c2-e35c3e0dc9cd" providerId="ADAL" clId="{78304693-7C79-4023-BC7A-18AAB28EFB2B}" dt="2022-01-24T12:51:13.342" v="323" actId="1035"/>
+          <ac:spMkLst>
+            <pc:docMk/>
+            <pc:sldMk cId="718657368" sldId="335"/>
+            <ac:spMk id="54" creationId="{80D25D53-FA5A-4018-BE6C-102E696C182A}"/>
+          </ac:spMkLst>
+        </pc:spChg>
+        <pc:spChg chg="mod">
+          <ac:chgData name="Castegnaro, Andrea" userId="e719bb20-b48f-4237-97c2-e35c3e0dc9cd" providerId="ADAL" clId="{78304693-7C79-4023-BC7A-18AAB28EFB2B}" dt="2022-01-24T14:47:00.986" v="3877" actId="403"/>
+          <ac:spMkLst>
+            <pc:docMk/>
+            <pc:sldMk cId="718657368" sldId="335"/>
+            <ac:spMk id="61" creationId="{0B3FD355-1584-4FD7-91CE-606F7423F97B}"/>
+          </ac:spMkLst>
+        </pc:spChg>
+        <pc:spChg chg="mod">
+          <ac:chgData name="Castegnaro, Andrea" userId="e719bb20-b48f-4237-97c2-e35c3e0dc9cd" providerId="ADAL" clId="{78304693-7C79-4023-BC7A-18AAB28EFB2B}" dt="2022-01-24T14:51:06.607" v="4251" actId="20577"/>
+          <ac:spMkLst>
+            <pc:docMk/>
+            <pc:sldMk cId="718657368" sldId="335"/>
+            <ac:spMk id="80" creationId="{D03D1DBB-C193-430E-B5BB-41A5A6D86740}"/>
+          </ac:spMkLst>
+        </pc:spChg>
+        <pc:grpChg chg="mod">
+          <ac:chgData name="Castegnaro, Andrea" userId="e719bb20-b48f-4237-97c2-e35c3e0dc9cd" providerId="ADAL" clId="{78304693-7C79-4023-BC7A-18AAB28EFB2B}" dt="2022-01-24T14:45:39.636" v="3747" actId="1035"/>
+          <ac:grpSpMkLst>
+            <pc:docMk/>
+            <pc:sldMk cId="718657368" sldId="335"/>
+            <ac:grpSpMk id="41" creationId="{48367AE3-41F9-410F-85AE-D8448B3EC75E}"/>
+          </ac:grpSpMkLst>
+        </pc:grpChg>
+        <pc:picChg chg="add mod">
+          <ac:chgData name="Castegnaro, Andrea" userId="e719bb20-b48f-4237-97c2-e35c3e0dc9cd" providerId="ADAL" clId="{78304693-7C79-4023-BC7A-18AAB28EFB2B}" dt="2022-01-24T14:12:44.248" v="1742" actId="1076"/>
+          <ac:picMkLst>
+            <pc:docMk/>
+            <pc:sldMk cId="718657368" sldId="335"/>
+            <ac:picMk id="5" creationId="{2DB7C646-D289-4BAF-9DD4-45ACE1A447C4}"/>
+          </ac:picMkLst>
+        </pc:picChg>
+        <pc:cxnChg chg="mod">
+          <ac:chgData name="Castegnaro, Andrea" userId="e719bb20-b48f-4237-97c2-e35c3e0dc9cd" providerId="ADAL" clId="{78304693-7C79-4023-BC7A-18AAB28EFB2B}" dt="2022-01-24T14:46:44.869" v="3870" actId="14100"/>
+          <ac:cxnSpMkLst>
+            <pc:docMk/>
+            <pc:sldMk cId="718657368" sldId="335"/>
+            <ac:cxnSpMk id="35" creationId="{E5575B6A-7D10-4D09-875B-D4C4FDF2FF1A}"/>
+          </ac:cxnSpMkLst>
+        </pc:cxnChg>
+      </pc:sldChg>
+      <pc:sldChg chg="addSp delSp modSp mod">
+        <pc:chgData name="Castegnaro, Andrea" userId="e719bb20-b48f-4237-97c2-e35c3e0dc9cd" providerId="ADAL" clId="{78304693-7C79-4023-BC7A-18AAB28EFB2B}" dt="2022-01-24T15:12:49.499" v="5017" actId="20577"/>
+        <pc:sldMkLst>
+          <pc:docMk/>
+          <pc:sldMk cId="3468065226" sldId="336"/>
+        </pc:sldMkLst>
+        <pc:spChg chg="mod">
+          <ac:chgData name="Castegnaro, Andrea" userId="e719bb20-b48f-4237-97c2-e35c3e0dc9cd" providerId="ADAL" clId="{78304693-7C79-4023-BC7A-18AAB28EFB2B}" dt="2022-01-24T12:56:01.833" v="351" actId="14100"/>
+          <ac:spMkLst>
+            <pc:docMk/>
+            <pc:sldMk cId="3468065226" sldId="336"/>
+            <ac:spMk id="3" creationId="{7A55B0CE-1FB7-4986-A0C4-E26590DF9A46}"/>
+          </ac:spMkLst>
+        </pc:spChg>
+        <pc:spChg chg="mod">
+          <ac:chgData name="Castegnaro, Andrea" userId="e719bb20-b48f-4237-97c2-e35c3e0dc9cd" providerId="ADAL" clId="{78304693-7C79-4023-BC7A-18AAB28EFB2B}" dt="2022-01-24T12:59:20.929" v="392" actId="20577"/>
+          <ac:spMkLst>
+            <pc:docMk/>
+            <pc:sldMk cId="3468065226" sldId="336"/>
+            <ac:spMk id="12" creationId="{E8B9767D-0C35-4C07-89CE-1C2D21EAB79C}"/>
+          </ac:spMkLst>
+        </pc:spChg>
+        <pc:spChg chg="mod">
+          <ac:chgData name="Castegnaro, Andrea" userId="e719bb20-b48f-4237-97c2-e35c3e0dc9cd" providerId="ADAL" clId="{78304693-7C79-4023-BC7A-18AAB28EFB2B}" dt="2022-01-24T12:57:04.352" v="372"/>
+          <ac:spMkLst>
+            <pc:docMk/>
+            <pc:sldMk cId="3468065226" sldId="336"/>
+            <ac:spMk id="13" creationId="{CD2B78FA-05E7-46B6-A65B-4A63B41A29ED}"/>
+          </ac:spMkLst>
+        </pc:spChg>
+        <pc:spChg chg="add mod">
+          <ac:chgData name="Castegnaro, Andrea" userId="e719bb20-b48f-4237-97c2-e35c3e0dc9cd" providerId="ADAL" clId="{78304693-7C79-4023-BC7A-18AAB28EFB2B}" dt="2022-01-24T13:48:30.412" v="491" actId="404"/>
+          <ac:spMkLst>
+            <pc:docMk/>
+            <pc:sldMk cId="3468065226" sldId="336"/>
+            <ac:spMk id="14" creationId="{BF2838A4-10B1-4B0D-9109-02DE7A4EE607}"/>
+          </ac:spMkLst>
+        </pc:spChg>
+        <pc:spChg chg="add mod">
+          <ac:chgData name="Castegnaro, Andrea" userId="e719bb20-b48f-4237-97c2-e35c3e0dc9cd" providerId="ADAL" clId="{78304693-7C79-4023-BC7A-18AAB28EFB2B}" dt="2022-01-24T15:01:51.800" v="4666" actId="6549"/>
+          <ac:spMkLst>
+            <pc:docMk/>
+            <pc:sldMk cId="3468065226" sldId="336"/>
+            <ac:spMk id="20" creationId="{8CD09D1C-A44B-4901-9F91-8B55C4781FF4}"/>
+          </ac:spMkLst>
+        </pc:spChg>
+        <pc:spChg chg="add mod">
+          <ac:chgData name="Castegnaro, Andrea" userId="e719bb20-b48f-4237-97c2-e35c3e0dc9cd" providerId="ADAL" clId="{78304693-7C79-4023-BC7A-18AAB28EFB2B}" dt="2022-01-24T15:12:49.499" v="5017" actId="20577"/>
+          <ac:spMkLst>
+            <pc:docMk/>
+            <pc:sldMk cId="3468065226" sldId="336"/>
+            <ac:spMk id="28" creationId="{91D3111F-9B4A-457A-9549-710FA698F1C3}"/>
+          </ac:spMkLst>
+        </pc:spChg>
+        <pc:spChg chg="mod">
+          <ac:chgData name="Castegnaro, Andrea" userId="e719bb20-b48f-4237-97c2-e35c3e0dc9cd" providerId="ADAL" clId="{78304693-7C79-4023-BC7A-18AAB28EFB2B}" dt="2022-01-24T12:46:03.140" v="198" actId="404"/>
+          <ac:spMkLst>
+            <pc:docMk/>
+            <pc:sldMk cId="3468065226" sldId="336"/>
+            <ac:spMk id="34" creationId="{68B92E82-A63B-4C09-B931-88A388D1A866}"/>
+          </ac:spMkLst>
+        </pc:spChg>
+        <pc:spChg chg="mod">
+          <ac:chgData name="Castegnaro, Andrea" userId="e719bb20-b48f-4237-97c2-e35c3e0dc9cd" providerId="ADAL" clId="{78304693-7C79-4023-BC7A-18AAB28EFB2B}" dt="2022-01-24T15:06:50.701" v="4908" actId="20577"/>
+          <ac:spMkLst>
+            <pc:docMk/>
+            <pc:sldMk cId="3468065226" sldId="336"/>
+            <ac:spMk id="37" creationId="{5791EDE9-2ADD-4106-8EEA-DB3CE83DE3CA}"/>
+          </ac:spMkLst>
+        </pc:spChg>
+        <pc:grpChg chg="add mod">
+          <ac:chgData name="Castegnaro, Andrea" userId="e719bb20-b48f-4237-97c2-e35c3e0dc9cd" providerId="ADAL" clId="{78304693-7C79-4023-BC7A-18AAB28EFB2B}" dt="2022-01-24T15:01:57.873" v="4669" actId="1076"/>
+          <ac:grpSpMkLst>
+            <pc:docMk/>
+            <pc:sldMk cId="3468065226" sldId="336"/>
+            <ac:grpSpMk id="11" creationId="{0C55BF05-5C6E-4A1C-813D-2AF2DEC9645A}"/>
+          </ac:grpSpMkLst>
+        </pc:grpChg>
+        <pc:grpChg chg="mod">
+          <ac:chgData name="Castegnaro, Andrea" userId="e719bb20-b48f-4237-97c2-e35c3e0dc9cd" providerId="ADAL" clId="{78304693-7C79-4023-BC7A-18AAB28EFB2B}" dt="2022-01-24T15:00:18.090" v="4530" actId="1076"/>
+          <ac:grpSpMkLst>
+            <pc:docMk/>
+            <pc:sldMk cId="3468065226" sldId="336"/>
+            <ac:grpSpMk id="33" creationId="{F4500DD2-6D8D-4761-A1F4-E06D35507531}"/>
+          </ac:grpSpMkLst>
+        </pc:grpChg>
+        <pc:grpChg chg="del">
+          <ac:chgData name="Castegnaro, Andrea" userId="e719bb20-b48f-4237-97c2-e35c3e0dc9cd" providerId="ADAL" clId="{78304693-7C79-4023-BC7A-18AAB28EFB2B}" dt="2022-01-24T12:52:34.617" v="342" actId="478"/>
+          <ac:grpSpMkLst>
+            <pc:docMk/>
+            <pc:sldMk cId="3468065226" sldId="336"/>
+            <ac:grpSpMk id="39" creationId="{8C4129A2-93B4-42E3-BA38-14CA7A13A1B5}"/>
+          </ac:grpSpMkLst>
+        </pc:grpChg>
+        <pc:picChg chg="add mod">
+          <ac:chgData name="Castegnaro, Andrea" userId="e719bb20-b48f-4237-97c2-e35c3e0dc9cd" providerId="ADAL" clId="{78304693-7C79-4023-BC7A-18AAB28EFB2B}" dt="2022-01-24T14:15:33.401" v="1763" actId="1076"/>
+          <ac:picMkLst>
+            <pc:docMk/>
+            <pc:sldMk cId="3468065226" sldId="336"/>
+            <ac:picMk id="7" creationId="{8AD2CFE3-3A93-422E-9B83-392926E51C1D}"/>
+          </ac:picMkLst>
+        </pc:picChg>
+        <pc:cxnChg chg="add mod">
+          <ac:chgData name="Castegnaro, Andrea" userId="e719bb20-b48f-4237-97c2-e35c3e0dc9cd" providerId="ADAL" clId="{78304693-7C79-4023-BC7A-18AAB28EFB2B}" dt="2022-01-24T15:02:05.354" v="4672" actId="1076"/>
+          <ac:cxnSpMkLst>
+            <pc:docMk/>
+            <pc:sldMk cId="3468065226" sldId="336"/>
+            <ac:cxnSpMk id="15" creationId="{71DEF9B2-8E96-41E4-908F-28CA2A3EC04E}"/>
+          </ac:cxnSpMkLst>
+        </pc:cxnChg>
+        <pc:cxnChg chg="add mod">
+          <ac:chgData name="Castegnaro, Andrea" userId="e719bb20-b48f-4237-97c2-e35c3e0dc9cd" providerId="ADAL" clId="{78304693-7C79-4023-BC7A-18AAB28EFB2B}" dt="2022-01-24T15:02:53.441" v="4694" actId="14100"/>
+          <ac:cxnSpMkLst>
+            <pc:docMk/>
+            <pc:sldMk cId="3468065226" sldId="336"/>
+            <ac:cxnSpMk id="23" creationId="{71FC1980-73F2-41AC-BBCB-4962193D0F21}"/>
+          </ac:cxnSpMkLst>
+        </pc:cxnChg>
+        <pc:cxnChg chg="add mod">
+          <ac:chgData name="Castegnaro, Andrea" userId="e719bb20-b48f-4237-97c2-e35c3e0dc9cd" providerId="ADAL" clId="{78304693-7C79-4023-BC7A-18AAB28EFB2B}" dt="2022-01-24T15:02:57.057" v="4695" actId="14100"/>
+          <ac:cxnSpMkLst>
+            <pc:docMk/>
+            <pc:sldMk cId="3468065226" sldId="336"/>
+            <ac:cxnSpMk id="26" creationId="{DA9AB0AC-3262-42E4-B5BA-DB5A161CADE9}"/>
+          </ac:cxnSpMkLst>
+        </pc:cxnChg>
+      </pc:sldChg>
+      <pc:sldChg chg="addSp modSp mod">
+        <pc:chgData name="Castegnaro, Andrea" userId="e719bb20-b48f-4237-97c2-e35c3e0dc9cd" providerId="ADAL" clId="{78304693-7C79-4023-BC7A-18AAB28EFB2B}" dt="2022-01-24T14:43:49.691" v="3641" actId="20577"/>
+        <pc:sldMkLst>
+          <pc:docMk/>
+          <pc:sldMk cId="3329810214" sldId="337"/>
+        </pc:sldMkLst>
+        <pc:spChg chg="mod">
+          <ac:chgData name="Castegnaro, Andrea" userId="e719bb20-b48f-4237-97c2-e35c3e0dc9cd" providerId="ADAL" clId="{78304693-7C79-4023-BC7A-18AAB28EFB2B}" dt="2022-01-24T14:43:49.691" v="3641" actId="20577"/>
+          <ac:spMkLst>
+            <pc:docMk/>
+            <pc:sldMk cId="3329810214" sldId="337"/>
+            <ac:spMk id="3" creationId="{7A55B0CE-1FB7-4986-A0C4-E26590DF9A46}"/>
+          </ac:spMkLst>
+        </pc:spChg>
+        <pc:spChg chg="mod">
+          <ac:chgData name="Castegnaro, Andrea" userId="e719bb20-b48f-4237-97c2-e35c3e0dc9cd" providerId="ADAL" clId="{78304693-7C79-4023-BC7A-18AAB28EFB2B}" dt="2022-01-24T14:42:23.795" v="3599" actId="164"/>
+          <ac:spMkLst>
+            <pc:docMk/>
+            <pc:sldMk cId="3329810214" sldId="337"/>
+            <ac:spMk id="7" creationId="{E3909C12-3D74-485A-A00B-89F9856B98A8}"/>
+          </ac:spMkLst>
+        </pc:spChg>
+        <pc:spChg chg="mod">
+          <ac:chgData name="Castegnaro, Andrea" userId="e719bb20-b48f-4237-97c2-e35c3e0dc9cd" providerId="ADAL" clId="{78304693-7C79-4023-BC7A-18AAB28EFB2B}" dt="2022-01-24T14:42:46.178" v="3610" actId="114"/>
+          <ac:spMkLst>
+            <pc:docMk/>
+            <pc:sldMk cId="3329810214" sldId="337"/>
+            <ac:spMk id="36" creationId="{589ED94A-C997-4638-AE5A-8611E031C7D2}"/>
+          </ac:spMkLst>
+        </pc:spChg>
+        <pc:spChg chg="mod">
+          <ac:chgData name="Castegnaro, Andrea" userId="e719bb20-b48f-4237-97c2-e35c3e0dc9cd" providerId="ADAL" clId="{78304693-7C79-4023-BC7A-18AAB28EFB2B}" dt="2022-01-24T14:43:05.237" v="3619" actId="114"/>
+          <ac:spMkLst>
+            <pc:docMk/>
+            <pc:sldMk cId="3329810214" sldId="337"/>
+            <ac:spMk id="37" creationId="{863AA4B6-6FA9-4542-BE97-E9375E158AAC}"/>
+          </ac:spMkLst>
+        </pc:spChg>
+        <pc:spChg chg="mod">
+          <ac:chgData name="Castegnaro, Andrea" userId="e719bb20-b48f-4237-97c2-e35c3e0dc9cd" providerId="ADAL" clId="{78304693-7C79-4023-BC7A-18AAB28EFB2B}" dt="2022-01-24T14:43:42.105" v="3638" actId="20577"/>
+          <ac:spMkLst>
+            <pc:docMk/>
+            <pc:sldMk cId="3329810214" sldId="337"/>
+            <ac:spMk id="38" creationId="{7E5ADCD3-26FF-45E6-8DC8-1F3EFD1428E3}"/>
+          </ac:spMkLst>
+        </pc:spChg>
+        <pc:grpChg chg="add mod">
+          <ac:chgData name="Castegnaro, Andrea" userId="e719bb20-b48f-4237-97c2-e35c3e0dc9cd" providerId="ADAL" clId="{78304693-7C79-4023-BC7A-18AAB28EFB2B}" dt="2022-01-24T14:42:35.487" v="3609" actId="1035"/>
+          <ac:grpSpMkLst>
+            <pc:docMk/>
+            <pc:sldMk cId="3329810214" sldId="337"/>
+            <ac:grpSpMk id="4" creationId="{BF4E70AF-9883-4ED8-B2AD-7F6B2D279024}"/>
+          </ac:grpSpMkLst>
+        </pc:grpChg>
+        <pc:grpChg chg="mod">
+          <ac:chgData name="Castegnaro, Andrea" userId="e719bb20-b48f-4237-97c2-e35c3e0dc9cd" providerId="ADAL" clId="{78304693-7C79-4023-BC7A-18AAB28EFB2B}" dt="2022-01-24T14:42:23.795" v="3599" actId="164"/>
+          <ac:grpSpMkLst>
+            <pc:docMk/>
+            <pc:sldMk cId="3329810214" sldId="337"/>
+            <ac:grpSpMk id="24" creationId="{1CEFF591-0B36-47CE-9371-0D103E071574}"/>
+          </ac:grpSpMkLst>
+        </pc:grpChg>
+        <pc:grpChg chg="mod">
+          <ac:chgData name="Castegnaro, Andrea" userId="e719bb20-b48f-4237-97c2-e35c3e0dc9cd" providerId="ADAL" clId="{78304693-7C79-4023-BC7A-18AAB28EFB2B}" dt="2022-01-24T14:42:23.795" v="3599" actId="164"/>
+          <ac:grpSpMkLst>
+            <pc:docMk/>
+            <pc:sldMk cId="3329810214" sldId="337"/>
+            <ac:grpSpMk id="32" creationId="{D66C8309-9686-43CB-9A8F-96EE5B20B70E}"/>
+          </ac:grpSpMkLst>
+        </pc:grpChg>
+      </pc:sldChg>
+      <pc:sldChg chg="addSp delSp modSp add mod">
+        <pc:chgData name="Castegnaro, Andrea" userId="e719bb20-b48f-4237-97c2-e35c3e0dc9cd" providerId="ADAL" clId="{78304693-7C79-4023-BC7A-18AAB28EFB2B}" dt="2022-01-24T14:45:18.944" v="3743" actId="1036"/>
+        <pc:sldMkLst>
+          <pc:docMk/>
+          <pc:sldMk cId="2097315419" sldId="338"/>
+        </pc:sldMkLst>
+        <pc:spChg chg="mod">
+          <ac:chgData name="Castegnaro, Andrea" userId="e719bb20-b48f-4237-97c2-e35c3e0dc9cd" providerId="ADAL" clId="{78304693-7C79-4023-BC7A-18AAB28EFB2B}" dt="2022-01-24T13:49:34.612" v="523" actId="20577"/>
+          <ac:spMkLst>
+            <pc:docMk/>
+            <pc:sldMk cId="2097315419" sldId="338"/>
+            <ac:spMk id="2" creationId="{32DCA100-7D85-4A3C-9993-92EC37D3F8E2}"/>
+          </ac:spMkLst>
+        </pc:spChg>
+        <pc:spChg chg="mod">
+          <ac:chgData name="Castegnaro, Andrea" userId="e719bb20-b48f-4237-97c2-e35c3e0dc9cd" providerId="ADAL" clId="{78304693-7C79-4023-BC7A-18AAB28EFB2B}" dt="2022-01-24T14:44:58.485" v="3718" actId="20577"/>
+          <ac:spMkLst>
+            <pc:docMk/>
+            <pc:sldMk cId="2097315419" sldId="338"/>
+            <ac:spMk id="3" creationId="{7A55B0CE-1FB7-4986-A0C4-E26590DF9A46}"/>
+          </ac:spMkLst>
+        </pc:spChg>
+        <pc:spChg chg="del">
+          <ac:chgData name="Castegnaro, Andrea" userId="e719bb20-b48f-4237-97c2-e35c3e0dc9cd" providerId="ADAL" clId="{78304693-7C79-4023-BC7A-18AAB28EFB2B}" dt="2022-01-24T13:54:39.051" v="788" actId="478"/>
+          <ac:spMkLst>
+            <pc:docMk/>
+            <pc:sldMk cId="2097315419" sldId="338"/>
+            <ac:spMk id="7" creationId="{E3909C12-3D74-485A-A00B-89F9856B98A8}"/>
+          </ac:spMkLst>
+        </pc:spChg>
+        <pc:spChg chg="mod">
+          <ac:chgData name="Castegnaro, Andrea" userId="e719bb20-b48f-4237-97c2-e35c3e0dc9cd" providerId="ADAL" clId="{78304693-7C79-4023-BC7A-18AAB28EFB2B}" dt="2022-01-24T13:55:03.287" v="791" actId="20577"/>
+          <ac:spMkLst>
+            <pc:docMk/>
+            <pc:sldMk cId="2097315419" sldId="338"/>
+            <ac:spMk id="21" creationId="{BE92B265-6B8E-4FE3-BCA1-CA56D22A83C4}"/>
+          </ac:spMkLst>
+        </pc:spChg>
+        <pc:spChg chg="mod">
+          <ac:chgData name="Castegnaro, Andrea" userId="e719bb20-b48f-4237-97c2-e35c3e0dc9cd" providerId="ADAL" clId="{78304693-7C79-4023-BC7A-18AAB28EFB2B}" dt="2022-01-24T13:52:36.813" v="728"/>
+          <ac:spMkLst>
+            <pc:docMk/>
+            <pc:sldMk cId="2097315419" sldId="338"/>
+            <ac:spMk id="22" creationId="{005FC275-9820-4C1A-89A0-7BCA5B1CBDE5}"/>
+          </ac:spMkLst>
+        </pc:spChg>
+        <pc:spChg chg="add mod">
+          <ac:chgData name="Castegnaro, Andrea" userId="e719bb20-b48f-4237-97c2-e35c3e0dc9cd" providerId="ADAL" clId="{78304693-7C79-4023-BC7A-18AAB28EFB2B}" dt="2022-01-24T13:59:13.333" v="1144" actId="1036"/>
+          <ac:spMkLst>
+            <pc:docMk/>
+            <pc:sldMk cId="2097315419" sldId="338"/>
+            <ac:spMk id="23" creationId="{960B41A7-DCC8-4E2E-A99E-972A331A6260}"/>
+          </ac:spMkLst>
+        </pc:spChg>
+        <pc:spChg chg="add mod">
+          <ac:chgData name="Castegnaro, Andrea" userId="e719bb20-b48f-4237-97c2-e35c3e0dc9cd" providerId="ADAL" clId="{78304693-7C79-4023-BC7A-18AAB28EFB2B}" dt="2022-01-24T13:59:13.333" v="1144" actId="1036"/>
+          <ac:spMkLst>
+            <pc:docMk/>
+            <pc:sldMk cId="2097315419" sldId="338"/>
+            <ac:spMk id="28" creationId="{4A78E373-57D1-47FD-B2E2-46459D4BD2D3}"/>
+          </ac:spMkLst>
+        </pc:spChg>
+        <pc:spChg chg="add mod">
+          <ac:chgData name="Castegnaro, Andrea" userId="e719bb20-b48f-4237-97c2-e35c3e0dc9cd" providerId="ADAL" clId="{78304693-7C79-4023-BC7A-18AAB28EFB2B}" dt="2022-01-24T14:45:18.944" v="3743" actId="1036"/>
+          <ac:spMkLst>
+            <pc:docMk/>
+            <pc:sldMk cId="2097315419" sldId="338"/>
+            <ac:spMk id="30" creationId="{A966CB9F-9F0B-457C-B44B-0BA1EE55BCEA}"/>
+          </ac:spMkLst>
+        </pc:spChg>
+        <pc:spChg chg="del">
+          <ac:chgData name="Castegnaro, Andrea" userId="e719bb20-b48f-4237-97c2-e35c3e0dc9cd" providerId="ADAL" clId="{78304693-7C79-4023-BC7A-18AAB28EFB2B}" dt="2022-01-24T13:54:39.051" v="788" actId="478"/>
+          <ac:spMkLst>
+            <pc:docMk/>
+            <pc:sldMk cId="2097315419" sldId="338"/>
+            <ac:spMk id="36" creationId="{589ED94A-C997-4638-AE5A-8611E031C7D2}"/>
+          </ac:spMkLst>
+        </pc:spChg>
+        <pc:spChg chg="del">
+          <ac:chgData name="Castegnaro, Andrea" userId="e719bb20-b48f-4237-97c2-e35c3e0dc9cd" providerId="ADAL" clId="{78304693-7C79-4023-BC7A-18AAB28EFB2B}" dt="2022-01-24T13:54:39.051" v="788" actId="478"/>
+          <ac:spMkLst>
+            <pc:docMk/>
+            <pc:sldMk cId="2097315419" sldId="338"/>
+            <ac:spMk id="37" creationId="{863AA4B6-6FA9-4542-BE97-E9375E158AAC}"/>
+          </ac:spMkLst>
+        </pc:spChg>
+        <pc:spChg chg="del">
+          <ac:chgData name="Castegnaro, Andrea" userId="e719bb20-b48f-4237-97c2-e35c3e0dc9cd" providerId="ADAL" clId="{78304693-7C79-4023-BC7A-18AAB28EFB2B}" dt="2022-01-24T13:54:39.051" v="788" actId="478"/>
+          <ac:spMkLst>
+            <pc:docMk/>
+            <pc:sldMk cId="2097315419" sldId="338"/>
+            <ac:spMk id="38" creationId="{7E5ADCD3-26FF-45E6-8DC8-1F3EFD1428E3}"/>
+          </ac:spMkLst>
+        </pc:spChg>
+        <pc:spChg chg="mod">
+          <ac:chgData name="Castegnaro, Andrea" userId="e719bb20-b48f-4237-97c2-e35c3e0dc9cd" providerId="ADAL" clId="{78304693-7C79-4023-BC7A-18AAB28EFB2B}" dt="2022-01-24T14:00:50.748" v="1316" actId="6549"/>
+          <ac:spMkLst>
+            <pc:docMk/>
+            <pc:sldMk cId="2097315419" sldId="338"/>
+            <ac:spMk id="39" creationId="{B248D79F-C28B-47EE-B667-73823F2CB4BA}"/>
+          </ac:spMkLst>
+        </pc:spChg>
+        <pc:spChg chg="mod">
+          <ac:chgData name="Castegnaro, Andrea" userId="e719bb20-b48f-4237-97c2-e35c3e0dc9cd" providerId="ADAL" clId="{78304693-7C79-4023-BC7A-18AAB28EFB2B}" dt="2022-01-24T14:00:40.231" v="1298"/>
+          <ac:spMkLst>
+            <pc:docMk/>
+            <pc:sldMk cId="2097315419" sldId="338"/>
+            <ac:spMk id="40" creationId="{EBFD99E5-E1FF-48E9-BCF7-C843268EF86C}"/>
+          </ac:spMkLst>
+        </pc:spChg>
+        <pc:spChg chg="add del mod">
+          <ac:chgData name="Castegnaro, Andrea" userId="e719bb20-b48f-4237-97c2-e35c3e0dc9cd" providerId="ADAL" clId="{78304693-7C79-4023-BC7A-18AAB28EFB2B}" dt="2022-01-24T14:01:38.884" v="1332" actId="478"/>
+          <ac:spMkLst>
+            <pc:docMk/>
+            <pc:sldMk cId="2097315419" sldId="338"/>
+            <ac:spMk id="41" creationId="{7789EF99-E82D-4FAC-BDEF-26D0ECD2989C}"/>
+          </ac:spMkLst>
+        </pc:spChg>
+        <pc:grpChg chg="add mod">
+          <ac:chgData name="Castegnaro, Andrea" userId="e719bb20-b48f-4237-97c2-e35c3e0dc9cd" providerId="ADAL" clId="{78304693-7C79-4023-BC7A-18AAB28EFB2B}" dt="2022-01-24T14:45:02.877" v="3730" actId="1036"/>
+          <ac:grpSpMkLst>
+            <pc:docMk/>
+            <pc:sldMk cId="2097315419" sldId="338"/>
+            <ac:grpSpMk id="20" creationId="{ECAE6BB0-FC18-4A62-8CFD-5120B0FCA786}"/>
+          </ac:grpSpMkLst>
+        </pc:grpChg>
+        <pc:grpChg chg="del">
+          <ac:chgData name="Castegnaro, Andrea" userId="e719bb20-b48f-4237-97c2-e35c3e0dc9cd" providerId="ADAL" clId="{78304693-7C79-4023-BC7A-18AAB28EFB2B}" dt="2022-01-24T13:54:39.051" v="788" actId="478"/>
+          <ac:grpSpMkLst>
+            <pc:docMk/>
+            <pc:sldMk cId="2097315419" sldId="338"/>
+            <ac:grpSpMk id="24" creationId="{1CEFF591-0B36-47CE-9371-0D103E071574}"/>
+          </ac:grpSpMkLst>
+        </pc:grpChg>
+        <pc:grpChg chg="add mod">
+          <ac:chgData name="Castegnaro, Andrea" userId="e719bb20-b48f-4237-97c2-e35c3e0dc9cd" providerId="ADAL" clId="{78304693-7C79-4023-BC7A-18AAB28EFB2B}" dt="2022-01-24T14:01:41.924" v="1333" actId="1076"/>
+          <ac:grpSpMkLst>
+            <pc:docMk/>
+            <pc:sldMk cId="2097315419" sldId="338"/>
+            <ac:grpSpMk id="31" creationId="{0BECAA68-9DC7-4084-A8AF-3D6C83E7273F}"/>
+          </ac:grpSpMkLst>
+        </pc:grpChg>
+        <pc:grpChg chg="del">
+          <ac:chgData name="Castegnaro, Andrea" userId="e719bb20-b48f-4237-97c2-e35c3e0dc9cd" providerId="ADAL" clId="{78304693-7C79-4023-BC7A-18AAB28EFB2B}" dt="2022-01-24T13:54:39.051" v="788" actId="478"/>
+          <ac:grpSpMkLst>
+            <pc:docMk/>
+            <pc:sldMk cId="2097315419" sldId="338"/>
+            <ac:grpSpMk id="32" creationId="{D66C8309-9686-43CB-9A8F-96EE5B20B70E}"/>
+          </ac:grpSpMkLst>
+        </pc:grpChg>
+        <pc:picChg chg="add del mod">
+          <ac:chgData name="Castegnaro, Andrea" userId="e719bb20-b48f-4237-97c2-e35c3e0dc9cd" providerId="ADAL" clId="{78304693-7C79-4023-BC7A-18AAB28EFB2B}" dt="2022-01-24T13:49:57.039" v="525" actId="478"/>
+          <ac:picMkLst>
+            <pc:docMk/>
+            <pc:sldMk cId="2097315419" sldId="338"/>
+            <ac:picMk id="5" creationId="{80694409-4E60-4A0C-AB6A-C452C8142CCE}"/>
+          </ac:picMkLst>
+        </pc:picChg>
+        <pc:picChg chg="add mod">
+          <ac:chgData name="Castegnaro, Andrea" userId="e719bb20-b48f-4237-97c2-e35c3e0dc9cd" providerId="ADAL" clId="{78304693-7C79-4023-BC7A-18AAB28EFB2B}" dt="2022-01-24T13:57:00.944" v="926" actId="1036"/>
+          <ac:picMkLst>
+            <pc:docMk/>
+            <pc:sldMk cId="2097315419" sldId="338"/>
+            <ac:picMk id="8" creationId="{A057BB84-75B9-4A58-A793-0527A651DB20}"/>
+          </ac:picMkLst>
+        </pc:picChg>
+        <pc:picChg chg="del">
+          <ac:chgData name="Castegnaro, Andrea" userId="e719bb20-b48f-4237-97c2-e35c3e0dc9cd" providerId="ADAL" clId="{78304693-7C79-4023-BC7A-18AAB28EFB2B}" dt="2022-01-24T13:49:32.019" v="522" actId="478"/>
+          <ac:picMkLst>
+            <pc:docMk/>
+            <pc:sldMk cId="2097315419" sldId="338"/>
+            <ac:picMk id="18" creationId="{272A3C8F-DA4B-4523-B0CC-5E0F9ED9731F}"/>
+          </ac:picMkLst>
+        </pc:picChg>
+        <pc:cxnChg chg="add mod">
+          <ac:chgData name="Castegnaro, Andrea" userId="e719bb20-b48f-4237-97c2-e35c3e0dc9cd" providerId="ADAL" clId="{78304693-7C79-4023-BC7A-18AAB28EFB2B}" dt="2022-01-24T14:45:05.005" v="3731" actId="1076"/>
+          <ac:cxnSpMkLst>
+            <pc:docMk/>
+            <pc:sldMk cId="2097315419" sldId="338"/>
+            <ac:cxnSpMk id="26" creationId="{F72D2822-8291-4CFF-A0C3-64F4B096F961}"/>
+          </ac:cxnSpMkLst>
+        </pc:cxnChg>
+        <pc:cxnChg chg="add del mod">
+          <ac:chgData name="Castegnaro, Andrea" userId="e719bb20-b48f-4237-97c2-e35c3e0dc9cd" providerId="ADAL" clId="{78304693-7C79-4023-BC7A-18AAB28EFB2B}" dt="2022-01-24T14:45:08.438" v="3734" actId="478"/>
+          <ac:cxnSpMkLst>
+            <pc:docMk/>
+            <pc:sldMk cId="2097315419" sldId="338"/>
+            <ac:cxnSpMk id="27" creationId="{3C008FB3-EF39-41A4-A7D0-6D5DF9558794}"/>
+          </ac:cxnSpMkLst>
+        </pc:cxnChg>
+        <pc:cxnChg chg="add mod">
+          <ac:chgData name="Castegnaro, Andrea" userId="e719bb20-b48f-4237-97c2-e35c3e0dc9cd" providerId="ADAL" clId="{78304693-7C79-4023-BC7A-18AAB28EFB2B}" dt="2022-01-24T14:45:14.086" v="3736" actId="1076"/>
+          <ac:cxnSpMkLst>
+            <pc:docMk/>
+            <pc:sldMk cId="2097315419" sldId="338"/>
+            <ac:cxnSpMk id="42" creationId="{3EBC99A2-234C-499D-9969-8796E50A6349}"/>
+          </ac:cxnSpMkLst>
+        </pc:cxnChg>
+      </pc:sldChg>
+      <pc:sldChg chg="addSp delSp modSp add mod setBg">
+        <pc:chgData name="Castegnaro, Andrea" userId="e719bb20-b48f-4237-97c2-e35c3e0dc9cd" providerId="ADAL" clId="{78304693-7C79-4023-BC7A-18AAB28EFB2B}" dt="2022-01-24T14:24:50.463" v="2781" actId="20577"/>
+        <pc:sldMkLst>
+          <pc:docMk/>
+          <pc:sldMk cId="2075616132" sldId="339"/>
+        </pc:sldMkLst>
+        <pc:spChg chg="mod">
+          <ac:chgData name="Castegnaro, Andrea" userId="e719bb20-b48f-4237-97c2-e35c3e0dc9cd" providerId="ADAL" clId="{78304693-7C79-4023-BC7A-18AAB28EFB2B}" dt="2022-01-24T14:20:16.048" v="2450" actId="26606"/>
+          <ac:spMkLst>
+            <pc:docMk/>
+            <pc:sldMk cId="2075616132" sldId="339"/>
+            <ac:spMk id="2" creationId="{32DCA100-7D85-4A3C-9993-92EC37D3F8E2}"/>
+          </ac:spMkLst>
+        </pc:spChg>
+        <pc:spChg chg="mod">
+          <ac:chgData name="Castegnaro, Andrea" userId="e719bb20-b48f-4237-97c2-e35c3e0dc9cd" providerId="ADAL" clId="{78304693-7C79-4023-BC7A-18AAB28EFB2B}" dt="2022-01-24T14:24:50.463" v="2781" actId="20577"/>
+          <ac:spMkLst>
+            <pc:docMk/>
+            <pc:sldMk cId="2075616132" sldId="339"/>
+            <ac:spMk id="3" creationId="{7A55B0CE-1FB7-4986-A0C4-E26590DF9A46}"/>
+          </ac:spMkLst>
+        </pc:spChg>
+        <pc:spChg chg="add del">
+          <ac:chgData name="Castegnaro, Andrea" userId="e719bb20-b48f-4237-97c2-e35c3e0dc9cd" providerId="ADAL" clId="{78304693-7C79-4023-BC7A-18AAB28EFB2B}" dt="2022-01-24T14:20:16.048" v="2450" actId="26606"/>
+          <ac:spMkLst>
+            <pc:docMk/>
+            <pc:sldMk cId="2075616132" sldId="339"/>
+            <ac:spMk id="10" creationId="{F13C74B1-5B17-4795-BED0-7140497B445A}"/>
+          </ac:spMkLst>
+        </pc:spChg>
+        <pc:spChg chg="add del">
+          <ac:chgData name="Castegnaro, Andrea" userId="e719bb20-b48f-4237-97c2-e35c3e0dc9cd" providerId="ADAL" clId="{78304693-7C79-4023-BC7A-18AAB28EFB2B}" dt="2022-01-24T14:20:16.048" v="2450" actId="26606"/>
+          <ac:spMkLst>
+            <pc:docMk/>
+            <pc:sldMk cId="2075616132" sldId="339"/>
+            <ac:spMk id="12" creationId="{D4974D33-8DC5-464E-8C6D-BE58F0669C17}"/>
+          </ac:spMkLst>
+        </pc:spChg>
+        <pc:spChg chg="del">
+          <ac:chgData name="Castegnaro, Andrea" userId="e719bb20-b48f-4237-97c2-e35c3e0dc9cd" providerId="ADAL" clId="{78304693-7C79-4023-BC7A-18AAB28EFB2B}" dt="2022-01-24T14:16:23" v="1832" actId="478"/>
+          <ac:spMkLst>
+            <pc:docMk/>
+            <pc:sldMk cId="2075616132" sldId="339"/>
+            <ac:spMk id="14" creationId="{BF2838A4-10B1-4B0D-9109-02DE7A4EE607}"/>
+          </ac:spMkLst>
+        </pc:spChg>
+        <pc:spChg chg="del">
+          <ac:chgData name="Castegnaro, Andrea" userId="e719bb20-b48f-4237-97c2-e35c3e0dc9cd" providerId="ADAL" clId="{78304693-7C79-4023-BC7A-18AAB28EFB2B}" dt="2022-01-24T14:16:20.577" v="1829" actId="478"/>
+          <ac:spMkLst>
+            <pc:docMk/>
+            <pc:sldMk cId="2075616132" sldId="339"/>
+            <ac:spMk id="37" creationId="{5791EDE9-2ADD-4106-8EEA-DB3CE83DE3CA}"/>
+          </ac:spMkLst>
+        </pc:spChg>
+        <pc:grpChg chg="del">
+          <ac:chgData name="Castegnaro, Andrea" userId="e719bb20-b48f-4237-97c2-e35c3e0dc9cd" providerId="ADAL" clId="{78304693-7C79-4023-BC7A-18AAB28EFB2B}" dt="2022-01-24T14:16:21.457" v="1830" actId="478"/>
+          <ac:grpSpMkLst>
+            <pc:docMk/>
+            <pc:sldMk cId="2075616132" sldId="339"/>
+            <ac:grpSpMk id="11" creationId="{0C55BF05-5C6E-4A1C-813D-2AF2DEC9645A}"/>
+          </ac:grpSpMkLst>
+        </pc:grpChg>
+        <pc:grpChg chg="del">
+          <ac:chgData name="Castegnaro, Andrea" userId="e719bb20-b48f-4237-97c2-e35c3e0dc9cd" providerId="ADAL" clId="{78304693-7C79-4023-BC7A-18AAB28EFB2B}" dt="2022-01-24T14:16:19.224" v="1828" actId="478"/>
+          <ac:grpSpMkLst>
+            <pc:docMk/>
+            <pc:sldMk cId="2075616132" sldId="339"/>
+            <ac:grpSpMk id="33" creationId="{F4500DD2-6D8D-4761-A1F4-E06D35507531}"/>
+          </ac:grpSpMkLst>
+        </pc:grpChg>
+        <pc:picChg chg="add mod">
+          <ac:chgData name="Castegnaro, Andrea" userId="e719bb20-b48f-4237-97c2-e35c3e0dc9cd" providerId="ADAL" clId="{78304693-7C79-4023-BC7A-18AAB28EFB2B}" dt="2022-01-24T14:24:48.278" v="2780" actId="1076"/>
+          <ac:picMkLst>
+            <pc:docMk/>
+            <pc:sldMk cId="2075616132" sldId="339"/>
+            <ac:picMk id="5" creationId="{B040B3DA-BD5E-4ABE-ADAA-6A62924DE4C9}"/>
+          </ac:picMkLst>
+        </pc:picChg>
+        <pc:picChg chg="add del mod">
+          <ac:chgData name="Castegnaro, Andrea" userId="e719bb20-b48f-4237-97c2-e35c3e0dc9cd" providerId="ADAL" clId="{78304693-7C79-4023-BC7A-18AAB28EFB2B}" dt="2022-01-24T14:24:33.932" v="2774" actId="478"/>
+          <ac:picMkLst>
+            <pc:docMk/>
+            <pc:sldMk cId="2075616132" sldId="339"/>
+            <ac:picMk id="7" creationId="{49FFB218-FA33-4AD1-B608-73692D7DA0BC}"/>
+          </ac:picMkLst>
+        </pc:picChg>
+        <pc:cxnChg chg="del">
+          <ac:chgData name="Castegnaro, Andrea" userId="e719bb20-b48f-4237-97c2-e35c3e0dc9cd" providerId="ADAL" clId="{78304693-7C79-4023-BC7A-18AAB28EFB2B}" dt="2022-01-24T14:16:22.017" v="1831" actId="478"/>
+          <ac:cxnSpMkLst>
+            <pc:docMk/>
+            <pc:sldMk cId="2075616132" sldId="339"/>
+            <ac:cxnSpMk id="15" creationId="{71DEF9B2-8E96-41E4-908F-28CA2A3EC04E}"/>
+          </ac:cxnSpMkLst>
+        </pc:cxnChg>
+      </pc:sldChg>
+      <pc:sldChg chg="add del">
+        <pc:chgData name="Castegnaro, Andrea" userId="e719bb20-b48f-4237-97c2-e35c3e0dc9cd" providerId="ADAL" clId="{78304693-7C79-4023-BC7A-18AAB28EFB2B}" dt="2022-01-24T14:15:11.811" v="1757" actId="47"/>
+        <pc:sldMkLst>
+          <pc:docMk/>
+          <pc:sldMk cId="2477883259" sldId="339"/>
+        </pc:sldMkLst>
+      </pc:sldChg>
+      <pc:sldChg chg="addSp delSp modSp add mod">
+        <pc:chgData name="Castegnaro, Andrea" userId="e719bb20-b48f-4237-97c2-e35c3e0dc9cd" providerId="ADAL" clId="{78304693-7C79-4023-BC7A-18AAB28EFB2B}" dt="2022-01-24T15:20:50.212" v="5744" actId="1036"/>
+        <pc:sldMkLst>
+          <pc:docMk/>
+          <pc:sldMk cId="3243017373" sldId="340"/>
+        </pc:sldMkLst>
+        <pc:spChg chg="mod">
+          <ac:chgData name="Castegnaro, Andrea" userId="e719bb20-b48f-4237-97c2-e35c3e0dc9cd" providerId="ADAL" clId="{78304693-7C79-4023-BC7A-18AAB28EFB2B}" dt="2022-01-24T15:20:45.939" v="5741" actId="14100"/>
+          <ac:spMkLst>
+            <pc:docMk/>
+            <pc:sldMk cId="3243017373" sldId="340"/>
+            <ac:spMk id="3" creationId="{7A55B0CE-1FB7-4986-A0C4-E26590DF9A46}"/>
+          </ac:spMkLst>
+        </pc:spChg>
+        <pc:spChg chg="mod">
+          <ac:chgData name="Castegnaro, Andrea" userId="e719bb20-b48f-4237-97c2-e35c3e0dc9cd" providerId="ADAL" clId="{78304693-7C79-4023-BC7A-18AAB28EFB2B}" dt="2022-01-24T15:20:15.791" v="5729" actId="20577"/>
+          <ac:spMkLst>
+            <pc:docMk/>
+            <pc:sldMk cId="3243017373" sldId="340"/>
+            <ac:spMk id="12" creationId="{E8B9767D-0C35-4C07-89CE-1C2D21EAB79C}"/>
+          </ac:spMkLst>
+        </pc:spChg>
+        <pc:spChg chg="del">
+          <ac:chgData name="Castegnaro, Andrea" userId="e719bb20-b48f-4237-97c2-e35c3e0dc9cd" providerId="ADAL" clId="{78304693-7C79-4023-BC7A-18AAB28EFB2B}" dt="2022-01-24T15:17:27.532" v="5358" actId="478"/>
+          <ac:spMkLst>
+            <pc:docMk/>
+            <pc:sldMk cId="3243017373" sldId="340"/>
+            <ac:spMk id="14" creationId="{BF2838A4-10B1-4B0D-9109-02DE7A4EE607}"/>
+          </ac:spMkLst>
+        </pc:spChg>
+        <pc:spChg chg="mod">
+          <ac:chgData name="Castegnaro, Andrea" userId="e719bb20-b48f-4237-97c2-e35c3e0dc9cd" providerId="ADAL" clId="{78304693-7C79-4023-BC7A-18AAB28EFB2B}" dt="2022-01-24T15:15:24.300" v="5146" actId="404"/>
+          <ac:spMkLst>
+            <pc:docMk/>
+            <pc:sldMk cId="3243017373" sldId="340"/>
+            <ac:spMk id="19" creationId="{AE18C425-4419-4851-B7CD-36AE93E65401}"/>
+          </ac:spMkLst>
+        </pc:spChg>
+        <pc:spChg chg="del">
+          <ac:chgData name="Castegnaro, Andrea" userId="e719bb20-b48f-4237-97c2-e35c3e0dc9cd" providerId="ADAL" clId="{78304693-7C79-4023-BC7A-18AAB28EFB2B}" dt="2022-01-24T15:17:27.532" v="5358" actId="478"/>
+          <ac:spMkLst>
+            <pc:docMk/>
+            <pc:sldMk cId="3243017373" sldId="340"/>
+            <ac:spMk id="20" creationId="{8CD09D1C-A44B-4901-9F91-8B55C4781FF4}"/>
+          </ac:spMkLst>
+        </pc:spChg>
+        <pc:spChg chg="mod">
+          <ac:chgData name="Castegnaro, Andrea" userId="e719bb20-b48f-4237-97c2-e35c3e0dc9cd" providerId="ADAL" clId="{78304693-7C79-4023-BC7A-18AAB28EFB2B}" dt="2022-01-24T15:14:50.625" v="5141"/>
+          <ac:spMkLst>
+            <pc:docMk/>
+            <pc:sldMk cId="3243017373" sldId="340"/>
+            <ac:spMk id="21" creationId="{00B36FB0-FD31-4C6D-B6FC-0A2D2E26CF0C}"/>
+          </ac:spMkLst>
+        </pc:spChg>
+        <pc:spChg chg="add mod">
+          <ac:chgData name="Castegnaro, Andrea" userId="e719bb20-b48f-4237-97c2-e35c3e0dc9cd" providerId="ADAL" clId="{78304693-7C79-4023-BC7A-18AAB28EFB2B}" dt="2022-01-24T15:20:50.212" v="5744" actId="1036"/>
+          <ac:spMkLst>
+            <pc:docMk/>
+            <pc:sldMk cId="3243017373" sldId="340"/>
+            <ac:spMk id="22" creationId="{ABDA0CBA-C8E5-4420-BE8B-190D130A6180}"/>
+          </ac:spMkLst>
+        </pc:spChg>
+        <pc:spChg chg="del">
+          <ac:chgData name="Castegnaro, Andrea" userId="e719bb20-b48f-4237-97c2-e35c3e0dc9cd" providerId="ADAL" clId="{78304693-7C79-4023-BC7A-18AAB28EFB2B}" dt="2022-01-24T15:17:27.532" v="5358" actId="478"/>
+          <ac:spMkLst>
+            <pc:docMk/>
+            <pc:sldMk cId="3243017373" sldId="340"/>
+            <ac:spMk id="28" creationId="{91D3111F-9B4A-457A-9549-710FA698F1C3}"/>
+          </ac:spMkLst>
+        </pc:spChg>
+        <pc:spChg chg="mod">
+          <ac:chgData name="Castegnaro, Andrea" userId="e719bb20-b48f-4237-97c2-e35c3e0dc9cd" providerId="ADAL" clId="{78304693-7C79-4023-BC7A-18AAB28EFB2B}" dt="2022-01-24T15:14:40.967" v="5140"/>
+          <ac:spMkLst>
+            <pc:docMk/>
+            <pc:sldMk cId="3243017373" sldId="340"/>
+            <ac:spMk id="34" creationId="{68B92E82-A63B-4C09-B931-88A388D1A866}"/>
+          </ac:spMkLst>
+        </pc:spChg>
+        <pc:spChg chg="mod">
+          <ac:chgData name="Castegnaro, Andrea" userId="e719bb20-b48f-4237-97c2-e35c3e0dc9cd" providerId="ADAL" clId="{78304693-7C79-4023-BC7A-18AAB28EFB2B}" dt="2022-01-24T15:20:42.842" v="5740" actId="14100"/>
+          <ac:spMkLst>
+            <pc:docMk/>
+            <pc:sldMk cId="3243017373" sldId="340"/>
+            <ac:spMk id="37" creationId="{5791EDE9-2ADD-4106-8EEA-DB3CE83DE3CA}"/>
+          </ac:spMkLst>
+        </pc:spChg>
+        <pc:grpChg chg="mod">
+          <ac:chgData name="Castegnaro, Andrea" userId="e719bb20-b48f-4237-97c2-e35c3e0dc9cd" providerId="ADAL" clId="{78304693-7C79-4023-BC7A-18AAB28EFB2B}" dt="2022-01-24T15:20:22.999" v="5737" actId="1036"/>
+          <ac:grpSpMkLst>
+            <pc:docMk/>
+            <pc:sldMk cId="3243017373" sldId="340"/>
+            <ac:grpSpMk id="11" creationId="{0C55BF05-5C6E-4A1C-813D-2AF2DEC9645A}"/>
+          </ac:grpSpMkLst>
+        </pc:grpChg>
+        <pc:grpChg chg="add mod">
+          <ac:chgData name="Castegnaro, Andrea" userId="e719bb20-b48f-4237-97c2-e35c3e0dc9cd" providerId="ADAL" clId="{78304693-7C79-4023-BC7A-18AAB28EFB2B}" dt="2022-01-24T15:19:57.867" v="5722" actId="1076"/>
+          <ac:grpSpMkLst>
+            <pc:docMk/>
+            <pc:sldMk cId="3243017373" sldId="340"/>
+            <ac:grpSpMk id="18" creationId="{825B9E31-C082-40F1-89E8-5F8CCC7E1EF0}"/>
+          </ac:grpSpMkLst>
+        </pc:grpChg>
+        <pc:grpChg chg="del mod">
+          <ac:chgData name="Castegnaro, Andrea" userId="e719bb20-b48f-4237-97c2-e35c3e0dc9cd" providerId="ADAL" clId="{78304693-7C79-4023-BC7A-18AAB28EFB2B}" dt="2022-01-24T15:14:52.957" v="5142" actId="478"/>
+          <ac:grpSpMkLst>
+            <pc:docMk/>
+            <pc:sldMk cId="3243017373" sldId="340"/>
+            <ac:grpSpMk id="33" creationId="{F4500DD2-6D8D-4761-A1F4-E06D35507531}"/>
+          </ac:grpSpMkLst>
+        </pc:grpChg>
+        <pc:cxnChg chg="del">
+          <ac:chgData name="Castegnaro, Andrea" userId="e719bb20-b48f-4237-97c2-e35c3e0dc9cd" providerId="ADAL" clId="{78304693-7C79-4023-BC7A-18AAB28EFB2B}" dt="2022-01-24T15:17:22.627" v="5357" actId="478"/>
+          <ac:cxnSpMkLst>
+            <pc:docMk/>
+            <pc:sldMk cId="3243017373" sldId="340"/>
+            <ac:cxnSpMk id="15" creationId="{71DEF9B2-8E96-41E4-908F-28CA2A3EC04E}"/>
+          </ac:cxnSpMkLst>
+        </pc:cxnChg>
+        <pc:cxnChg chg="del mod">
+          <ac:chgData name="Castegnaro, Andrea" userId="e719bb20-b48f-4237-97c2-e35c3e0dc9cd" providerId="ADAL" clId="{78304693-7C79-4023-BC7A-18AAB28EFB2B}" dt="2022-01-24T15:17:27.532" v="5358" actId="478"/>
+          <ac:cxnSpMkLst>
+            <pc:docMk/>
+            <pc:sldMk cId="3243017373" sldId="340"/>
+            <ac:cxnSpMk id="23" creationId="{71FC1980-73F2-41AC-BBCB-4962193D0F21}"/>
+          </ac:cxnSpMkLst>
+        </pc:cxnChg>
+        <pc:cxnChg chg="del">
+          <ac:chgData name="Castegnaro, Andrea" userId="e719bb20-b48f-4237-97c2-e35c3e0dc9cd" providerId="ADAL" clId="{78304693-7C79-4023-BC7A-18AAB28EFB2B}" dt="2022-01-24T15:17:27.532" v="5358" actId="478"/>
+          <ac:cxnSpMkLst>
+            <pc:docMk/>
+            <pc:sldMk cId="3243017373" sldId="340"/>
+            <ac:cxnSpMk id="26" creationId="{DA9AB0AC-3262-42E4-B5BA-DB5A161CADE9}"/>
+          </ac:cxnSpMkLst>
+        </pc:cxnChg>
+      </pc:sldChg>
+    </pc:docChg>
+  </pc:docChgLst>
+  <pc:docChgLst>
+    <pc:chgData name="Castegnaro, Andrea" userId="e719bb20-b48f-4237-97c2-e35c3e0dc9cd" providerId="ADAL" clId="{6B0B3B43-C1DE-4F71-93A9-FB02E1545C0E}"/>
+    <pc:docChg chg="custSel addSld delSld modSld delMainMaster delSection modSection">
+      <pc:chgData name="Castegnaro, Andrea" userId="e719bb20-b48f-4237-97c2-e35c3e0dc9cd" providerId="ADAL" clId="{6B0B3B43-C1DE-4F71-93A9-FB02E1545C0E}" dt="2022-01-17T15:04:59.362" v="281" actId="700"/>
+      <pc:docMkLst>
+        <pc:docMk/>
+      </pc:docMkLst>
+      <pc:sldChg chg="new del">
+        <pc:chgData name="Castegnaro, Andrea" userId="e719bb20-b48f-4237-97c2-e35c3e0dc9cd" providerId="ADAL" clId="{6B0B3B43-C1DE-4F71-93A9-FB02E1545C0E}" dt="2022-01-13T16:14:43.903" v="1" actId="47"/>
+        <pc:sldMkLst>
+          <pc:docMk/>
+          <pc:sldMk cId="1085287797" sldId="256"/>
+        </pc:sldMkLst>
+      </pc:sldChg>
+      <pc:sldChg chg="modSp mod modTransition">
+        <pc:chgData name="Castegnaro, Andrea" userId="e719bb20-b48f-4237-97c2-e35c3e0dc9cd" providerId="ADAL" clId="{6B0B3B43-C1DE-4F71-93A9-FB02E1545C0E}" dt="2022-01-17T14:56:18.083" v="276" actId="20577"/>
+        <pc:sldMkLst>
+          <pc:docMk/>
+          <pc:sldMk cId="2445713399" sldId="312"/>
+        </pc:sldMkLst>
+        <pc:spChg chg="mod">
+          <ac:chgData name="Castegnaro, Andrea" userId="e719bb20-b48f-4237-97c2-e35c3e0dc9cd" providerId="ADAL" clId="{6B0B3B43-C1DE-4F71-93A9-FB02E1545C0E}" dt="2022-01-13T16:16:57.856" v="81" actId="20577"/>
+          <ac:spMkLst>
+            <pc:docMk/>
+            <pc:sldMk cId="2445713399" sldId="312"/>
+            <ac:spMk id="4" creationId="{28B7D50A-2F55-41BB-89F9-4739DA584FE6}"/>
+          </ac:spMkLst>
+        </pc:spChg>
+        <pc:spChg chg="mod">
+          <ac:chgData name="Castegnaro, Andrea" userId="e719bb20-b48f-4237-97c2-e35c3e0dc9cd" providerId="ADAL" clId="{6B0B3B43-C1DE-4F71-93A9-FB02E1545C0E}" dt="2022-01-17T14:56:18.083" v="276" actId="20577"/>
+          <ac:spMkLst>
+            <pc:docMk/>
+            <pc:sldMk cId="2445713399" sldId="312"/>
+            <ac:spMk id="5" creationId="{C11578D7-67FF-4927-BFF8-8E8235ECAA05}"/>
+          </ac:spMkLst>
+        </pc:spChg>
+      </pc:sldChg>
+      <pc:sldChg chg="modTransition">
+        <pc:chgData name="Castegnaro, Andrea" userId="e719bb20-b48f-4237-97c2-e35c3e0dc9cd" providerId="ADAL" clId="{6B0B3B43-C1DE-4F71-93A9-FB02E1545C0E}" dt="2022-01-13T16:16:32.731" v="64"/>
+        <pc:sldMkLst>
+          <pc:docMk/>
+          <pc:sldMk cId="2471698210" sldId="313"/>
+        </pc:sldMkLst>
+      </pc:sldChg>
+      <pc:sldChg chg="modTransition">
+        <pc:chgData name="Castegnaro, Andrea" userId="e719bb20-b48f-4237-97c2-e35c3e0dc9cd" providerId="ADAL" clId="{6B0B3B43-C1DE-4F71-93A9-FB02E1545C0E}" dt="2022-01-13T16:16:32.731" v="64"/>
+        <pc:sldMkLst>
+          <pc:docMk/>
+          <pc:sldMk cId="839390016" sldId="314"/>
+        </pc:sldMkLst>
+      </pc:sldChg>
+      <pc:sldChg chg="modTransition">
+        <pc:chgData name="Castegnaro, Andrea" userId="e719bb20-b48f-4237-97c2-e35c3e0dc9cd" providerId="ADAL" clId="{6B0B3B43-C1DE-4F71-93A9-FB02E1545C0E}" dt="2022-01-13T16:16:32.731" v="64"/>
+        <pc:sldMkLst>
+          <pc:docMk/>
+          <pc:sldMk cId="2442215223" sldId="315"/>
+        </pc:sldMkLst>
+      </pc:sldChg>
+      <pc:sldChg chg="modTransition">
+        <pc:chgData name="Castegnaro, Andrea" userId="e719bb20-b48f-4237-97c2-e35c3e0dc9cd" providerId="ADAL" clId="{6B0B3B43-C1DE-4F71-93A9-FB02E1545C0E}" dt="2022-01-13T16:16:32.731" v="64"/>
+        <pc:sldMkLst>
+          <pc:docMk/>
+          <pc:sldMk cId="2590270098" sldId="316"/>
+        </pc:sldMkLst>
+      </pc:sldChg>
+      <pc:sldChg chg="modTransition">
+        <pc:chgData name="Castegnaro, Andrea" userId="e719bb20-b48f-4237-97c2-e35c3e0dc9cd" providerId="ADAL" clId="{6B0B3B43-C1DE-4F71-93A9-FB02E1545C0E}" dt="2022-01-13T16:16:32.731" v="64"/>
+        <pc:sldMkLst>
+          <pc:docMk/>
+          <pc:sldMk cId="3996795517" sldId="317"/>
+        </pc:sldMkLst>
+      </pc:sldChg>
+      <pc:sldChg chg="modTransition">
+        <pc:chgData name="Castegnaro, Andrea" userId="e719bb20-b48f-4237-97c2-e35c3e0dc9cd" providerId="ADAL" clId="{6B0B3B43-C1DE-4F71-93A9-FB02E1545C0E}" dt="2022-01-13T16:16:32.731" v="64"/>
+        <pc:sldMkLst>
+          <pc:docMk/>
+          <pc:sldMk cId="2282461073" sldId="319"/>
+        </pc:sldMkLst>
+      </pc:sldChg>
+      <pc:sldChg chg="addSp delSp modSp add mod chgLayout">
+        <pc:chgData name="Castegnaro, Andrea" userId="e719bb20-b48f-4237-97c2-e35c3e0dc9cd" providerId="ADAL" clId="{6B0B3B43-C1DE-4F71-93A9-FB02E1545C0E}" dt="2022-01-17T15:04:59.362" v="281" actId="700"/>
+        <pc:sldMkLst>
+          <pc:docMk/>
+          <pc:sldMk cId="3098246948" sldId="320"/>
+        </pc:sldMkLst>
+        <pc:spChg chg="add del mod">
+          <ac:chgData name="Castegnaro, Andrea" userId="e719bb20-b48f-4237-97c2-e35c3e0dc9cd" providerId="ADAL" clId="{6B0B3B43-C1DE-4F71-93A9-FB02E1545C0E}" dt="2022-01-17T15:04:48.896" v="280" actId="478"/>
+          <ac:spMkLst>
+            <pc:docMk/>
+            <pc:sldMk cId="3098246948" sldId="320"/>
+            <ac:spMk id="3" creationId="{D77B2032-27A6-421C-B685-217E81A6130A}"/>
+          </ac:spMkLst>
+        </pc:spChg>
+        <pc:spChg chg="del">
+          <ac:chgData name="Castegnaro, Andrea" userId="e719bb20-b48f-4237-97c2-e35c3e0dc9cd" providerId="ADAL" clId="{6B0B3B43-C1DE-4F71-93A9-FB02E1545C0E}" dt="2022-01-17T15:04:43.587" v="278" actId="478"/>
+          <ac:spMkLst>
+            <pc:docMk/>
+            <pc:sldMk cId="3098246948" sldId="320"/>
+            <ac:spMk id="4" creationId="{28B7D50A-2F55-41BB-89F9-4739DA584FE6}"/>
+          </ac:spMkLst>
+        </pc:spChg>
+        <pc:spChg chg="del">
+          <ac:chgData name="Castegnaro, Andrea" userId="e719bb20-b48f-4237-97c2-e35c3e0dc9cd" providerId="ADAL" clId="{6B0B3B43-C1DE-4F71-93A9-FB02E1545C0E}" dt="2022-01-17T15:04:46.927" v="279" actId="478"/>
+          <ac:spMkLst>
+            <pc:docMk/>
+            <pc:sldMk cId="3098246948" sldId="320"/>
+            <ac:spMk id="5" creationId="{C11578D7-67FF-4927-BFF8-8E8235ECAA05}"/>
+          </ac:spMkLst>
+        </pc:spChg>
+        <pc:spChg chg="add mod">
+          <ac:chgData name="Castegnaro, Andrea" userId="e719bb20-b48f-4237-97c2-e35c3e0dc9cd" providerId="ADAL" clId="{6B0B3B43-C1DE-4F71-93A9-FB02E1545C0E}" dt="2022-01-17T15:04:59.362" v="281" actId="700"/>
+          <ac:spMkLst>
+            <pc:docMk/>
+            <pc:sldMk cId="3098246948" sldId="320"/>
+            <ac:spMk id="6" creationId="{626B5DB5-B551-48F4-9907-E9D1AB17A470}"/>
+          </ac:spMkLst>
+        </pc:spChg>
+        <pc:spChg chg="add mod">
+          <ac:chgData name="Castegnaro, Andrea" userId="e719bb20-b48f-4237-97c2-e35c3e0dc9cd" providerId="ADAL" clId="{6B0B3B43-C1DE-4F71-93A9-FB02E1545C0E}" dt="2022-01-17T15:04:59.362" v="281" actId="700"/>
+          <ac:spMkLst>
+            <pc:docMk/>
+            <pc:sldMk cId="3098246948" sldId="320"/>
+            <ac:spMk id="7" creationId="{54CD5984-D0C0-4B4F-AC0A-2376ABCE0754}"/>
+          </ac:spMkLst>
+        </pc:spChg>
+      </pc:sldChg>
+      <pc:sldMasterChg chg="del addSldLayout delSldLayout">
+        <pc:chgData name="Castegnaro, Andrea" userId="e719bb20-b48f-4237-97c2-e35c3e0dc9cd" providerId="ADAL" clId="{6B0B3B43-C1DE-4F71-93A9-FB02E1545C0E}" dt="2022-01-13T16:14:43.903" v="1" actId="47"/>
+        <pc:sldMasterMkLst>
+          <pc:docMk/>
+          <pc:sldMasterMk cId="648575456" sldId="2147483648"/>
+        </pc:sldMasterMkLst>
+        <pc:sldLayoutChg chg="add del">
+          <pc:chgData name="Castegnaro, Andrea" userId="e719bb20-b48f-4237-97c2-e35c3e0dc9cd" providerId="ADAL" clId="{6B0B3B43-C1DE-4F71-93A9-FB02E1545C0E}" dt="2022-01-13T16:14:43.903" v="1" actId="47"/>
+          <pc:sldLayoutMkLst>
+            <pc:docMk/>
+            <pc:sldMasterMk cId="648575456" sldId="2147483648"/>
+            <pc:sldLayoutMk cId="1339338325" sldId="2147483649"/>
+          </pc:sldLayoutMkLst>
+        </pc:sldLayoutChg>
+      </pc:sldMasterChg>
+    </pc:docChg>
+  </pc:docChgLst>
+  <pc:docChgLst>
     <pc:chgData name="Castegnaro, Andrea" userId="e719bb20-b48f-4237-97c2-e35c3e0dc9cd" providerId="ADAL" clId="{3BF89D6C-3FC0-4DA5-A9E7-D6052BDBCFB4}"/>
     <pc:docChg chg="undo redo custSel addSld delSld modSld sldOrd">
       <pc:chgData name="Castegnaro, Andrea" userId="e719bb20-b48f-4237-97c2-e35c3e0dc9cd" providerId="ADAL" clId="{3BF89D6C-3FC0-4DA5-A9E7-D6052BDBCFB4}" dt="2022-01-24T12:13:55.541" v="22308" actId="20577"/>
@@ -2976,1313 +4283,6 @@
           </ac:grpSpMkLst>
         </pc:grpChg>
       </pc:sldChg>
-    </pc:docChg>
-  </pc:docChgLst>
-  <pc:docChgLst>
-    <pc:chgData name="Castegnaro, Andrea" userId="e719bb20-b48f-4237-97c2-e35c3e0dc9cd" providerId="ADAL" clId="{78304693-7C79-4023-BC7A-18AAB28EFB2B}"/>
-    <pc:docChg chg="undo redo custSel addSld delSld modSld">
-      <pc:chgData name="Castegnaro, Andrea" userId="e719bb20-b48f-4237-97c2-e35c3e0dc9cd" providerId="ADAL" clId="{78304693-7C79-4023-BC7A-18AAB28EFB2B}" dt="2022-01-24T15:20:50.212" v="5744" actId="1036"/>
-      <pc:docMkLst>
-        <pc:docMk/>
-      </pc:docMkLst>
-      <pc:sldChg chg="modSp mod">
-        <pc:chgData name="Castegnaro, Andrea" userId="e719bb20-b48f-4237-97c2-e35c3e0dc9cd" providerId="ADAL" clId="{78304693-7C79-4023-BC7A-18AAB28EFB2B}" dt="2022-01-24T14:04:22.236" v="1398" actId="1076"/>
-        <pc:sldMkLst>
-          <pc:docMk/>
-          <pc:sldMk cId="2445713399" sldId="312"/>
-        </pc:sldMkLst>
-        <pc:spChg chg="mod">
-          <ac:chgData name="Castegnaro, Andrea" userId="e719bb20-b48f-4237-97c2-e35c3e0dc9cd" providerId="ADAL" clId="{78304693-7C79-4023-BC7A-18AAB28EFB2B}" dt="2022-01-24T14:03:43.143" v="1369" actId="255"/>
-          <ac:spMkLst>
-            <pc:docMk/>
-            <pc:sldMk cId="2445713399" sldId="312"/>
-            <ac:spMk id="4" creationId="{28B7D50A-2F55-41BB-89F9-4739DA584FE6}"/>
-          </ac:spMkLst>
-        </pc:spChg>
-        <pc:spChg chg="mod">
-          <ac:chgData name="Castegnaro, Andrea" userId="e719bb20-b48f-4237-97c2-e35c3e0dc9cd" providerId="ADAL" clId="{78304693-7C79-4023-BC7A-18AAB28EFB2B}" dt="2022-01-24T14:04:22.236" v="1398" actId="1076"/>
-          <ac:spMkLst>
-            <pc:docMk/>
-            <pc:sldMk cId="2445713399" sldId="312"/>
-            <ac:spMk id="5" creationId="{C11578D7-67FF-4927-BFF8-8E8235ECAA05}"/>
-          </ac:spMkLst>
-        </pc:spChg>
-      </pc:sldChg>
-      <pc:sldChg chg="modSp mod">
-        <pc:chgData name="Castegnaro, Andrea" userId="e719bb20-b48f-4237-97c2-e35c3e0dc9cd" providerId="ADAL" clId="{78304693-7C79-4023-BC7A-18AAB28EFB2B}" dt="2022-01-24T14:09:45.412" v="1702" actId="27636"/>
-        <pc:sldMkLst>
-          <pc:docMk/>
-          <pc:sldMk cId="3098246948" sldId="320"/>
-        </pc:sldMkLst>
-        <pc:spChg chg="mod">
-          <ac:chgData name="Castegnaro, Andrea" userId="e719bb20-b48f-4237-97c2-e35c3e0dc9cd" providerId="ADAL" clId="{78304693-7C79-4023-BC7A-18AAB28EFB2B}" dt="2022-01-24T14:09:45.412" v="1702" actId="27636"/>
-          <ac:spMkLst>
-            <pc:docMk/>
-            <pc:sldMk cId="3098246948" sldId="320"/>
-            <ac:spMk id="7" creationId="{54CD5984-D0C0-4B4F-AC0A-2376ABCE0754}"/>
-          </ac:spMkLst>
-        </pc:spChg>
-      </pc:sldChg>
-      <pc:sldChg chg="addSp modSp mod">
-        <pc:chgData name="Castegnaro, Andrea" userId="e719bb20-b48f-4237-97c2-e35c3e0dc9cd" providerId="ADAL" clId="{78304693-7C79-4023-BC7A-18AAB28EFB2B}" dt="2022-01-24T14:21:32.240" v="2586" actId="1037"/>
-        <pc:sldMkLst>
-          <pc:docMk/>
-          <pc:sldMk cId="2695853462" sldId="321"/>
-        </pc:sldMkLst>
-        <pc:spChg chg="mod">
-          <ac:chgData name="Castegnaro, Andrea" userId="e719bb20-b48f-4237-97c2-e35c3e0dc9cd" providerId="ADAL" clId="{78304693-7C79-4023-BC7A-18AAB28EFB2B}" dt="2022-01-24T14:21:00.276" v="2492" actId="20577"/>
-          <ac:spMkLst>
-            <pc:docMk/>
-            <pc:sldMk cId="2695853462" sldId="321"/>
-            <ac:spMk id="7" creationId="{54CD5984-D0C0-4B4F-AC0A-2376ABCE0754}"/>
-          </ac:spMkLst>
-        </pc:spChg>
-        <pc:spChg chg="mod">
-          <ac:chgData name="Castegnaro, Andrea" userId="e719bb20-b48f-4237-97c2-e35c3e0dc9cd" providerId="ADAL" clId="{78304693-7C79-4023-BC7A-18AAB28EFB2B}" dt="2022-01-24T14:21:13.508" v="2493" actId="1076"/>
-          <ac:spMkLst>
-            <pc:docMk/>
-            <pc:sldMk cId="2695853462" sldId="321"/>
-            <ac:spMk id="11" creationId="{4AED893B-59AF-4521-930C-481ADBDA9A07}"/>
-          </ac:spMkLst>
-        </pc:spChg>
-        <pc:spChg chg="mod">
-          <ac:chgData name="Castegnaro, Andrea" userId="e719bb20-b48f-4237-97c2-e35c3e0dc9cd" providerId="ADAL" clId="{78304693-7C79-4023-BC7A-18AAB28EFB2B}" dt="2022-01-24T14:21:32.240" v="2586" actId="1037"/>
-          <ac:spMkLst>
-            <pc:docMk/>
-            <pc:sldMk cId="2695853462" sldId="321"/>
-            <ac:spMk id="25" creationId="{F5F18927-EBD5-4151-BD31-2C9DB79B28F4}"/>
-          </ac:spMkLst>
-        </pc:spChg>
-        <pc:picChg chg="add mod">
-          <ac:chgData name="Castegnaro, Andrea" userId="e719bb20-b48f-4237-97c2-e35c3e0dc9cd" providerId="ADAL" clId="{78304693-7C79-4023-BC7A-18AAB28EFB2B}" dt="2022-01-24T14:11:12.450" v="1737" actId="1076"/>
-          <ac:picMkLst>
-            <pc:docMk/>
-            <pc:sldMk cId="2695853462" sldId="321"/>
-            <ac:picMk id="4" creationId="{62082887-9F3C-4282-84C6-391B42F8CC77}"/>
-          </ac:picMkLst>
-        </pc:picChg>
-      </pc:sldChg>
-      <pc:sldChg chg="addSp modSp mod">
-        <pc:chgData name="Castegnaro, Andrea" userId="e719bb20-b48f-4237-97c2-e35c3e0dc9cd" providerId="ADAL" clId="{78304693-7C79-4023-BC7A-18AAB28EFB2B}" dt="2022-01-24T14:10:40.205" v="1733" actId="1076"/>
-        <pc:sldMkLst>
-          <pc:docMk/>
-          <pc:sldMk cId="3366187170" sldId="322"/>
-        </pc:sldMkLst>
-        <pc:spChg chg="mod">
-          <ac:chgData name="Castegnaro, Andrea" userId="e719bb20-b48f-4237-97c2-e35c3e0dc9cd" providerId="ADAL" clId="{78304693-7C79-4023-BC7A-18AAB28EFB2B}" dt="2022-01-24T14:10:01.512" v="1731" actId="20577"/>
-          <ac:spMkLst>
-            <pc:docMk/>
-            <pc:sldMk cId="3366187170" sldId="322"/>
-            <ac:spMk id="7" creationId="{54CD5984-D0C0-4B4F-AC0A-2376ABCE0754}"/>
-          </ac:spMkLst>
-        </pc:spChg>
-        <pc:picChg chg="add mod">
-          <ac:chgData name="Castegnaro, Andrea" userId="e719bb20-b48f-4237-97c2-e35c3e0dc9cd" providerId="ADAL" clId="{78304693-7C79-4023-BC7A-18AAB28EFB2B}" dt="2022-01-24T14:10:40.205" v="1733" actId="1076"/>
-          <ac:picMkLst>
-            <pc:docMk/>
-            <pc:sldMk cId="3366187170" sldId="322"/>
-            <ac:picMk id="3" creationId="{2FACF68E-D86F-4282-B9E1-B5F86B9E8A69}"/>
-          </ac:picMkLst>
-        </pc:picChg>
-        <pc:picChg chg="mod">
-          <ac:chgData name="Castegnaro, Andrea" userId="e719bb20-b48f-4237-97c2-e35c3e0dc9cd" providerId="ADAL" clId="{78304693-7C79-4023-BC7A-18AAB28EFB2B}" dt="2022-01-24T14:09:59.199" v="1729" actId="1036"/>
-          <ac:picMkLst>
-            <pc:docMk/>
-            <pc:sldMk cId="3366187170" sldId="322"/>
-            <ac:picMk id="5" creationId="{946E137A-3507-460F-92B7-F6F41D6667F3}"/>
-          </ac:picMkLst>
-        </pc:picChg>
-      </pc:sldChg>
-      <pc:sldChg chg="del">
-        <pc:chgData name="Castegnaro, Andrea" userId="e719bb20-b48f-4237-97c2-e35c3e0dc9cd" providerId="ADAL" clId="{78304693-7C79-4023-BC7A-18AAB28EFB2B}" dt="2022-01-24T12:16:12.123" v="0" actId="47"/>
-        <pc:sldMkLst>
-          <pc:docMk/>
-          <pc:sldMk cId="4124654771" sldId="323"/>
-        </pc:sldMkLst>
-      </pc:sldChg>
-      <pc:sldChg chg="addSp modSp mod">
-        <pc:chgData name="Castegnaro, Andrea" userId="e719bb20-b48f-4237-97c2-e35c3e0dc9cd" providerId="ADAL" clId="{78304693-7C79-4023-BC7A-18AAB28EFB2B}" dt="2022-01-24T14:27:02.850" v="2853" actId="14100"/>
-        <pc:sldMkLst>
-          <pc:docMk/>
-          <pc:sldMk cId="399080098" sldId="324"/>
-        </pc:sldMkLst>
-        <pc:spChg chg="mod">
-          <ac:chgData name="Castegnaro, Andrea" userId="e719bb20-b48f-4237-97c2-e35c3e0dc9cd" providerId="ADAL" clId="{78304693-7C79-4023-BC7A-18AAB28EFB2B}" dt="2022-01-24T14:25:32.638" v="2851" actId="20577"/>
-          <ac:spMkLst>
-            <pc:docMk/>
-            <pc:sldMk cId="399080098" sldId="324"/>
-            <ac:spMk id="7" creationId="{54CD5984-D0C0-4B4F-AC0A-2376ABCE0754}"/>
-          </ac:spMkLst>
-        </pc:spChg>
-        <pc:grpChg chg="mod">
-          <ac:chgData name="Castegnaro, Andrea" userId="e719bb20-b48f-4237-97c2-e35c3e0dc9cd" providerId="ADAL" clId="{78304693-7C79-4023-BC7A-18AAB28EFB2B}" dt="2022-01-24T14:26:52.601" v="2852" actId="14100"/>
-          <ac:grpSpMkLst>
-            <pc:docMk/>
-            <pc:sldMk cId="399080098" sldId="324"/>
-            <ac:grpSpMk id="9" creationId="{0FDBFE43-2856-4A45-979D-1A1EDA34662D}"/>
-          </ac:grpSpMkLst>
-        </pc:grpChg>
-        <pc:grpChg chg="mod">
-          <ac:chgData name="Castegnaro, Andrea" userId="e719bb20-b48f-4237-97c2-e35c3e0dc9cd" providerId="ADAL" clId="{78304693-7C79-4023-BC7A-18AAB28EFB2B}" dt="2022-01-24T14:27:02.850" v="2853" actId="14100"/>
-          <ac:grpSpMkLst>
-            <pc:docMk/>
-            <pc:sldMk cId="399080098" sldId="324"/>
-            <ac:grpSpMk id="12" creationId="{CC68E5B3-7249-45C9-BA86-9E3BBEBA998A}"/>
-          </ac:grpSpMkLst>
-        </pc:grpChg>
-        <pc:picChg chg="add mod">
-          <ac:chgData name="Castegnaro, Andrea" userId="e719bb20-b48f-4237-97c2-e35c3e0dc9cd" providerId="ADAL" clId="{78304693-7C79-4023-BC7A-18AAB28EFB2B}" dt="2022-01-24T14:12:19.179" v="1739" actId="1076"/>
-          <ac:picMkLst>
-            <pc:docMk/>
-            <pc:sldMk cId="399080098" sldId="324"/>
-            <ac:picMk id="3" creationId="{A8E7FCFF-040A-4AB8-AE7A-8540942394E2}"/>
-          </ac:picMkLst>
-        </pc:picChg>
-      </pc:sldChg>
-      <pc:sldChg chg="addSp modSp mod">
-        <pc:chgData name="Castegnaro, Andrea" userId="e719bb20-b48f-4237-97c2-e35c3e0dc9cd" providerId="ADAL" clId="{78304693-7C79-4023-BC7A-18AAB28EFB2B}" dt="2022-01-24T14:29:27.809" v="3123" actId="20577"/>
-        <pc:sldMkLst>
-          <pc:docMk/>
-          <pc:sldMk cId="2336413018" sldId="325"/>
-        </pc:sldMkLst>
-        <pc:spChg chg="mod">
-          <ac:chgData name="Castegnaro, Andrea" userId="e719bb20-b48f-4237-97c2-e35c3e0dc9cd" providerId="ADAL" clId="{78304693-7C79-4023-BC7A-18AAB28EFB2B}" dt="2022-01-24T14:28:16.095" v="2977" actId="1076"/>
-          <ac:spMkLst>
-            <pc:docMk/>
-            <pc:sldMk cId="2336413018" sldId="325"/>
-            <ac:spMk id="16" creationId="{857DB101-D698-46A5-8E69-583A5022065A}"/>
-          </ac:spMkLst>
-        </pc:spChg>
-        <pc:spChg chg="mod">
-          <ac:chgData name="Castegnaro, Andrea" userId="e719bb20-b48f-4237-97c2-e35c3e0dc9cd" providerId="ADAL" clId="{78304693-7C79-4023-BC7A-18AAB28EFB2B}" dt="2022-01-24T14:29:27.809" v="3123" actId="20577"/>
-          <ac:spMkLst>
-            <pc:docMk/>
-            <pc:sldMk cId="2336413018" sldId="325"/>
-            <ac:spMk id="17" creationId="{0D8970B3-669D-467D-AB3C-62B855528DFE}"/>
-          </ac:spMkLst>
-        </pc:spChg>
-        <pc:grpChg chg="mod">
-          <ac:chgData name="Castegnaro, Andrea" userId="e719bb20-b48f-4237-97c2-e35c3e0dc9cd" providerId="ADAL" clId="{78304693-7C79-4023-BC7A-18AAB28EFB2B}" dt="2022-01-24T14:29:24.176" v="3122" actId="1076"/>
-          <ac:grpSpMkLst>
-            <pc:docMk/>
-            <pc:sldMk cId="2336413018" sldId="325"/>
-            <ac:grpSpMk id="15" creationId="{BCC43B12-C895-4A10-8A0F-C95B291A7394}"/>
-          </ac:grpSpMkLst>
-        </pc:grpChg>
-        <pc:picChg chg="add mod">
-          <ac:chgData name="Castegnaro, Andrea" userId="e719bb20-b48f-4237-97c2-e35c3e0dc9cd" providerId="ADAL" clId="{78304693-7C79-4023-BC7A-18AAB28EFB2B}" dt="2022-01-24T14:12:21.379" v="1740"/>
-          <ac:picMkLst>
-            <pc:docMk/>
-            <pc:sldMk cId="2336413018" sldId="325"/>
-            <ac:picMk id="8" creationId="{399F033C-09C9-42AD-90C5-996F31A30D96}"/>
-          </ac:picMkLst>
-        </pc:picChg>
-      </pc:sldChg>
-      <pc:sldChg chg="modSp mod">
-        <pc:chgData name="Castegnaro, Andrea" userId="e719bb20-b48f-4237-97c2-e35c3e0dc9cd" providerId="ADAL" clId="{78304693-7C79-4023-BC7A-18AAB28EFB2B}" dt="2022-01-24T14:41:45.695" v="3572" actId="1035"/>
-        <pc:sldMkLst>
-          <pc:docMk/>
-          <pc:sldMk cId="2722255684" sldId="327"/>
-        </pc:sldMkLst>
-        <pc:spChg chg="mod">
-          <ac:chgData name="Castegnaro, Andrea" userId="e719bb20-b48f-4237-97c2-e35c3e0dc9cd" providerId="ADAL" clId="{78304693-7C79-4023-BC7A-18AAB28EFB2B}" dt="2022-01-24T14:32:44.831" v="3233" actId="20577"/>
-          <ac:spMkLst>
-            <pc:docMk/>
-            <pc:sldMk cId="2722255684" sldId="327"/>
-            <ac:spMk id="3" creationId="{7A55B0CE-1FB7-4986-A0C4-E26590DF9A46}"/>
-          </ac:spMkLst>
-        </pc:spChg>
-        <pc:spChg chg="mod">
-          <ac:chgData name="Castegnaro, Andrea" userId="e719bb20-b48f-4237-97c2-e35c3e0dc9cd" providerId="ADAL" clId="{78304693-7C79-4023-BC7A-18AAB28EFB2B}" dt="2022-01-24T14:41:45.695" v="3572" actId="1035"/>
-          <ac:spMkLst>
-            <pc:docMk/>
-            <pc:sldMk cId="2722255684" sldId="327"/>
-            <ac:spMk id="7" creationId="{E3909C12-3D74-485A-A00B-89F9856B98A8}"/>
-          </ac:spMkLst>
-        </pc:spChg>
-        <pc:spChg chg="mod">
-          <ac:chgData name="Castegnaro, Andrea" userId="e719bb20-b48f-4237-97c2-e35c3e0dc9cd" providerId="ADAL" clId="{78304693-7C79-4023-BC7A-18AAB28EFB2B}" dt="2022-01-24T14:41:45.695" v="3572" actId="1035"/>
-          <ac:spMkLst>
-            <pc:docMk/>
-            <pc:sldMk cId="2722255684" sldId="327"/>
-            <ac:spMk id="8" creationId="{5897A589-44FB-448A-B11A-48CE2E975CAD}"/>
-          </ac:spMkLst>
-        </pc:spChg>
-        <pc:spChg chg="mod">
-          <ac:chgData name="Castegnaro, Andrea" userId="e719bb20-b48f-4237-97c2-e35c3e0dc9cd" providerId="ADAL" clId="{78304693-7C79-4023-BC7A-18AAB28EFB2B}" dt="2022-01-24T14:41:45.695" v="3572" actId="1035"/>
-          <ac:spMkLst>
-            <pc:docMk/>
-            <pc:sldMk cId="2722255684" sldId="327"/>
-            <ac:spMk id="9" creationId="{9C309091-4E79-4937-9393-13DEDFEC62ED}"/>
-          </ac:spMkLst>
-        </pc:spChg>
-        <pc:spChg chg="mod">
-          <ac:chgData name="Castegnaro, Andrea" userId="e719bb20-b48f-4237-97c2-e35c3e0dc9cd" providerId="ADAL" clId="{78304693-7C79-4023-BC7A-18AAB28EFB2B}" dt="2022-01-24T14:41:45.695" v="3572" actId="1035"/>
-          <ac:spMkLst>
-            <pc:docMk/>
-            <pc:sldMk cId="2722255684" sldId="327"/>
-            <ac:spMk id="11" creationId="{1E9444AC-3345-494E-ACEA-0E4A35364B4C}"/>
-          </ac:spMkLst>
-        </pc:spChg>
-        <pc:spChg chg="mod">
-          <ac:chgData name="Castegnaro, Andrea" userId="e719bb20-b48f-4237-97c2-e35c3e0dc9cd" providerId="ADAL" clId="{78304693-7C79-4023-BC7A-18AAB28EFB2B}" dt="2022-01-24T14:41:45.695" v="3572" actId="1035"/>
-          <ac:spMkLst>
-            <pc:docMk/>
-            <pc:sldMk cId="2722255684" sldId="327"/>
-            <ac:spMk id="16" creationId="{4F0F9161-347E-405C-B3A2-902E63F04A53}"/>
-          </ac:spMkLst>
-        </pc:spChg>
-        <pc:spChg chg="mod">
-          <ac:chgData name="Castegnaro, Andrea" userId="e719bb20-b48f-4237-97c2-e35c3e0dc9cd" providerId="ADAL" clId="{78304693-7C79-4023-BC7A-18AAB28EFB2B}" dt="2022-01-24T14:32:51.775" v="3248" actId="1036"/>
-          <ac:spMkLst>
-            <pc:docMk/>
-            <pc:sldMk cId="2722255684" sldId="327"/>
-            <ac:spMk id="20" creationId="{AB91209B-4339-4CB3-89D3-D76B48348061}"/>
-          </ac:spMkLst>
-        </pc:spChg>
-        <pc:grpChg chg="mod">
-          <ac:chgData name="Castegnaro, Andrea" userId="e719bb20-b48f-4237-97c2-e35c3e0dc9cd" providerId="ADAL" clId="{78304693-7C79-4023-BC7A-18AAB28EFB2B}" dt="2022-01-24T14:30:05.918" v="3150" actId="1036"/>
-          <ac:grpSpMkLst>
-            <pc:docMk/>
-            <pc:sldMk cId="2722255684" sldId="327"/>
-            <ac:grpSpMk id="4" creationId="{D4B6B013-58ED-4EE5-B6F1-3D85207406FB}"/>
-          </ac:grpSpMkLst>
-        </pc:grpChg>
-        <pc:grpChg chg="mod">
-          <ac:chgData name="Castegnaro, Andrea" userId="e719bb20-b48f-4237-97c2-e35c3e0dc9cd" providerId="ADAL" clId="{78304693-7C79-4023-BC7A-18AAB28EFB2B}" dt="2022-01-24T14:41:45.695" v="3572" actId="1035"/>
-          <ac:grpSpMkLst>
-            <pc:docMk/>
-            <pc:sldMk cId="2722255684" sldId="327"/>
-            <ac:grpSpMk id="12" creationId="{9F47D37F-97CB-42BC-850A-E3AFB84C94BC}"/>
-          </ac:grpSpMkLst>
-        </pc:grpChg>
-      </pc:sldChg>
-      <pc:sldChg chg="modSp add del mod">
-        <pc:chgData name="Castegnaro, Andrea" userId="e719bb20-b48f-4237-97c2-e35c3e0dc9cd" providerId="ADAL" clId="{78304693-7C79-4023-BC7A-18AAB28EFB2B}" dt="2022-01-24T12:50:01.537" v="269" actId="2696"/>
-        <pc:sldMkLst>
-          <pc:docMk/>
-          <pc:sldMk cId="271442219" sldId="328"/>
-        </pc:sldMkLst>
-        <pc:cxnChg chg="mod">
-          <ac:chgData name="Castegnaro, Andrea" userId="e719bb20-b48f-4237-97c2-e35c3e0dc9cd" providerId="ADAL" clId="{78304693-7C79-4023-BC7A-18AAB28EFB2B}" dt="2022-01-24T12:47:30.513" v="266" actId="14100"/>
-          <ac:cxnSpMkLst>
-            <pc:docMk/>
-            <pc:sldMk cId="271442219" sldId="328"/>
-            <ac:cxnSpMk id="14" creationId="{C3ACF057-DF13-49E1-900B-8ABA3A1D8C63}"/>
-          </ac:cxnSpMkLst>
-        </pc:cxnChg>
-      </pc:sldChg>
-      <pc:sldChg chg="addSp modSp mod">
-        <pc:chgData name="Castegnaro, Andrea" userId="e719bb20-b48f-4237-97c2-e35c3e0dc9cd" providerId="ADAL" clId="{78304693-7C79-4023-BC7A-18AAB28EFB2B}" dt="2022-01-24T14:13:11.092" v="1746" actId="1076"/>
-        <pc:sldMkLst>
-          <pc:docMk/>
-          <pc:sldMk cId="1057538686" sldId="329"/>
-        </pc:sldMkLst>
-        <pc:picChg chg="add mod">
-          <ac:chgData name="Castegnaro, Andrea" userId="e719bb20-b48f-4237-97c2-e35c3e0dc9cd" providerId="ADAL" clId="{78304693-7C79-4023-BC7A-18AAB28EFB2B}" dt="2022-01-24T14:13:11.092" v="1746" actId="1076"/>
-          <ac:picMkLst>
-            <pc:docMk/>
-            <pc:sldMk cId="1057538686" sldId="329"/>
-            <ac:picMk id="5" creationId="{F96A5A5B-4B04-4B57-BFE8-AE72EFA23CF1}"/>
-          </ac:picMkLst>
-        </pc:picChg>
-      </pc:sldChg>
-      <pc:sldChg chg="addSp delSp modSp mod">
-        <pc:chgData name="Castegnaro, Andrea" userId="e719bb20-b48f-4237-97c2-e35c3e0dc9cd" providerId="ADAL" clId="{78304693-7C79-4023-BC7A-18AAB28EFB2B}" dt="2022-01-24T14:14:02.882" v="1749"/>
-        <pc:sldMkLst>
-          <pc:docMk/>
-          <pc:sldMk cId="2645979126" sldId="331"/>
-        </pc:sldMkLst>
-        <pc:picChg chg="add del mod">
-          <ac:chgData name="Castegnaro, Andrea" userId="e719bb20-b48f-4237-97c2-e35c3e0dc9cd" providerId="ADAL" clId="{78304693-7C79-4023-BC7A-18AAB28EFB2B}" dt="2022-01-24T14:13:58.195" v="1748" actId="478"/>
-          <ac:picMkLst>
-            <pc:docMk/>
-            <pc:sldMk cId="2645979126" sldId="331"/>
-            <ac:picMk id="30" creationId="{E4C3C554-72A8-4927-9F49-67FF1A7554CB}"/>
-          </ac:picMkLst>
-        </pc:picChg>
-        <pc:picChg chg="add mod">
-          <ac:chgData name="Castegnaro, Andrea" userId="e719bb20-b48f-4237-97c2-e35c3e0dc9cd" providerId="ADAL" clId="{78304693-7C79-4023-BC7A-18AAB28EFB2B}" dt="2022-01-24T14:14:02.882" v="1749"/>
-          <ac:picMkLst>
-            <pc:docMk/>
-            <pc:sldMk cId="2645979126" sldId="331"/>
-            <ac:picMk id="33" creationId="{9D2BB5CC-B830-4007-85FF-34E2D985C0DA}"/>
-          </ac:picMkLst>
-        </pc:picChg>
-      </pc:sldChg>
-      <pc:sldChg chg="addSp delSp modSp mod">
-        <pc:chgData name="Castegnaro, Andrea" userId="e719bb20-b48f-4237-97c2-e35c3e0dc9cd" providerId="ADAL" clId="{78304693-7C79-4023-BC7A-18AAB28EFB2B}" dt="2022-01-24T14:58:22.710" v="4330" actId="20577"/>
-        <pc:sldMkLst>
-          <pc:docMk/>
-          <pc:sldMk cId="3686595670" sldId="332"/>
-        </pc:sldMkLst>
-        <pc:spChg chg="mod">
-          <ac:chgData name="Castegnaro, Andrea" userId="e719bb20-b48f-4237-97c2-e35c3e0dc9cd" providerId="ADAL" clId="{78304693-7C79-4023-BC7A-18AAB28EFB2B}" dt="2022-01-24T14:58:22.710" v="4330" actId="20577"/>
-          <ac:spMkLst>
-            <pc:docMk/>
-            <pc:sldMk cId="3686595670" sldId="332"/>
-            <ac:spMk id="3" creationId="{7A55B0CE-1FB7-4986-A0C4-E26590DF9A46}"/>
-          </ac:spMkLst>
-        </pc:spChg>
-        <pc:picChg chg="add mod">
-          <ac:chgData name="Castegnaro, Andrea" userId="e719bb20-b48f-4237-97c2-e35c3e0dc9cd" providerId="ADAL" clId="{78304693-7C79-4023-BC7A-18AAB28EFB2B}" dt="2022-01-24T14:14:18.998" v="1751" actId="1076"/>
-          <ac:picMkLst>
-            <pc:docMk/>
-            <pc:sldMk cId="3686595670" sldId="332"/>
-            <ac:picMk id="5" creationId="{77E66B9E-2FDB-4A91-ADBC-9FCA72B0395F}"/>
-          </ac:picMkLst>
-        </pc:picChg>
-        <pc:cxnChg chg="add mod">
-          <ac:chgData name="Castegnaro, Andrea" userId="e719bb20-b48f-4237-97c2-e35c3e0dc9cd" providerId="ADAL" clId="{78304693-7C79-4023-BC7A-18AAB28EFB2B}" dt="2022-01-24T14:56:47.487" v="4254"/>
-          <ac:cxnSpMkLst>
-            <pc:docMk/>
-            <pc:sldMk cId="3686595670" sldId="332"/>
-            <ac:cxnSpMk id="20" creationId="{47E2323B-67A6-47A5-930E-D7C4D49074A1}"/>
-          </ac:cxnSpMkLst>
-        </pc:cxnChg>
-        <pc:cxnChg chg="add mod">
-          <ac:chgData name="Castegnaro, Andrea" userId="e719bb20-b48f-4237-97c2-e35c3e0dc9cd" providerId="ADAL" clId="{78304693-7C79-4023-BC7A-18AAB28EFB2B}" dt="2022-01-24T14:57:04.572" v="4259" actId="14100"/>
-          <ac:cxnSpMkLst>
-            <pc:docMk/>
-            <pc:sldMk cId="3686595670" sldId="332"/>
-            <ac:cxnSpMk id="21" creationId="{4505758A-570F-49DD-9986-14834BBFC022}"/>
-          </ac:cxnSpMkLst>
-        </pc:cxnChg>
-        <pc:cxnChg chg="del">
-          <ac:chgData name="Castegnaro, Andrea" userId="e719bb20-b48f-4237-97c2-e35c3e0dc9cd" providerId="ADAL" clId="{78304693-7C79-4023-BC7A-18AAB28EFB2B}" dt="2022-01-24T14:56:51.243" v="4257" actId="478"/>
-          <ac:cxnSpMkLst>
-            <pc:docMk/>
-            <pc:sldMk cId="3686595670" sldId="332"/>
-            <ac:cxnSpMk id="46" creationId="{B5ABE54A-D144-48DA-81B8-2A36557D5A8D}"/>
-          </ac:cxnSpMkLst>
-        </pc:cxnChg>
-        <pc:cxnChg chg="del">
-          <ac:chgData name="Castegnaro, Andrea" userId="e719bb20-b48f-4237-97c2-e35c3e0dc9cd" providerId="ADAL" clId="{78304693-7C79-4023-BC7A-18AAB28EFB2B}" dt="2022-01-24T14:56:46.560" v="4253" actId="21"/>
-          <ac:cxnSpMkLst>
-            <pc:docMk/>
-            <pc:sldMk cId="3686595670" sldId="332"/>
-            <ac:cxnSpMk id="48" creationId="{564BE0B4-1901-4972-9A40-A1B068109D06}"/>
-          </ac:cxnSpMkLst>
-        </pc:cxnChg>
-      </pc:sldChg>
-      <pc:sldChg chg="addSp modSp mod">
-        <pc:chgData name="Castegnaro, Andrea" userId="e719bb20-b48f-4237-97c2-e35c3e0dc9cd" providerId="ADAL" clId="{78304693-7C79-4023-BC7A-18AAB28EFB2B}" dt="2022-01-24T15:00:00.999" v="4529" actId="20577"/>
-        <pc:sldMkLst>
-          <pc:docMk/>
-          <pc:sldMk cId="4054631168" sldId="333"/>
-        </pc:sldMkLst>
-        <pc:spChg chg="mod">
-          <ac:chgData name="Castegnaro, Andrea" userId="e719bb20-b48f-4237-97c2-e35c3e0dc9cd" providerId="ADAL" clId="{78304693-7C79-4023-BC7A-18AAB28EFB2B}" dt="2022-01-24T15:00:00.999" v="4529" actId="20577"/>
-          <ac:spMkLst>
-            <pc:docMk/>
-            <pc:sldMk cId="4054631168" sldId="333"/>
-            <ac:spMk id="3" creationId="{7A55B0CE-1FB7-4986-A0C4-E26590DF9A46}"/>
-          </ac:spMkLst>
-        </pc:spChg>
-        <pc:picChg chg="add mod">
-          <ac:chgData name="Castegnaro, Andrea" userId="e719bb20-b48f-4237-97c2-e35c3e0dc9cd" providerId="ADAL" clId="{78304693-7C79-4023-BC7A-18AAB28EFB2B}" dt="2022-01-24T14:14:56.116" v="1755" actId="1076"/>
-          <ac:picMkLst>
-            <pc:docMk/>
-            <pc:sldMk cId="4054631168" sldId="333"/>
-            <ac:picMk id="5" creationId="{73EAFDEE-D909-4FE6-940D-0E58C315D038}"/>
-          </ac:picMkLst>
-        </pc:picChg>
-      </pc:sldChg>
-      <pc:sldChg chg="modSp mod">
-        <pc:chgData name="Castegnaro, Andrea" userId="e719bb20-b48f-4237-97c2-e35c3e0dc9cd" providerId="ADAL" clId="{78304693-7C79-4023-BC7A-18AAB28EFB2B}" dt="2022-01-24T14:36:48.525" v="3385" actId="20577"/>
-        <pc:sldMkLst>
-          <pc:docMk/>
-          <pc:sldMk cId="3423161011" sldId="334"/>
-        </pc:sldMkLst>
-        <pc:spChg chg="mod">
-          <ac:chgData name="Castegnaro, Andrea" userId="e719bb20-b48f-4237-97c2-e35c3e0dc9cd" providerId="ADAL" clId="{78304693-7C79-4023-BC7A-18AAB28EFB2B}" dt="2022-01-24T14:36:14.014" v="3371" actId="20577"/>
-          <ac:spMkLst>
-            <pc:docMk/>
-            <pc:sldMk cId="3423161011" sldId="334"/>
-            <ac:spMk id="3" creationId="{7A55B0CE-1FB7-4986-A0C4-E26590DF9A46}"/>
-          </ac:spMkLst>
-        </pc:spChg>
-        <pc:spChg chg="mod">
-          <ac:chgData name="Castegnaro, Andrea" userId="e719bb20-b48f-4237-97c2-e35c3e0dc9cd" providerId="ADAL" clId="{78304693-7C79-4023-BC7A-18AAB28EFB2B}" dt="2022-01-24T14:36:48.525" v="3385" actId="20577"/>
-          <ac:spMkLst>
-            <pc:docMk/>
-            <pc:sldMk cId="3423161011" sldId="334"/>
-            <ac:spMk id="62" creationId="{5F01621C-58DB-4146-961B-8013B9006F9A}"/>
-          </ac:spMkLst>
-        </pc:spChg>
-      </pc:sldChg>
-      <pc:sldChg chg="addSp modSp mod">
-        <pc:chgData name="Castegnaro, Andrea" userId="e719bb20-b48f-4237-97c2-e35c3e0dc9cd" providerId="ADAL" clId="{78304693-7C79-4023-BC7A-18AAB28EFB2B}" dt="2022-01-24T14:51:06.607" v="4251" actId="20577"/>
-        <pc:sldMkLst>
-          <pc:docMk/>
-          <pc:sldMk cId="718657368" sldId="335"/>
-        </pc:sldMkLst>
-        <pc:spChg chg="mod">
-          <ac:chgData name="Castegnaro, Andrea" userId="e719bb20-b48f-4237-97c2-e35c3e0dc9cd" providerId="ADAL" clId="{78304693-7C79-4023-BC7A-18AAB28EFB2B}" dt="2022-01-24T13:57:21.372" v="931" actId="20577"/>
-          <ac:spMkLst>
-            <pc:docMk/>
-            <pc:sldMk cId="718657368" sldId="335"/>
-            <ac:spMk id="2" creationId="{32DCA100-7D85-4A3C-9993-92EC37D3F8E2}"/>
-          </ac:spMkLst>
-        </pc:spChg>
-        <pc:spChg chg="mod">
-          <ac:chgData name="Castegnaro, Andrea" userId="e719bb20-b48f-4237-97c2-e35c3e0dc9cd" providerId="ADAL" clId="{78304693-7C79-4023-BC7A-18AAB28EFB2B}" dt="2022-01-24T12:51:04.988" v="316" actId="403"/>
-          <ac:spMkLst>
-            <pc:docMk/>
-            <pc:sldMk cId="718657368" sldId="335"/>
-            <ac:spMk id="3" creationId="{7A55B0CE-1FB7-4986-A0C4-E26590DF9A46}"/>
-          </ac:spMkLst>
-        </pc:spChg>
-        <pc:spChg chg="mod">
-          <ac:chgData name="Castegnaro, Andrea" userId="e719bb20-b48f-4237-97c2-e35c3e0dc9cd" providerId="ADAL" clId="{78304693-7C79-4023-BC7A-18AAB28EFB2B}" dt="2022-01-24T14:46:18.938" v="3855" actId="20577"/>
-          <ac:spMkLst>
-            <pc:docMk/>
-            <pc:sldMk cId="718657368" sldId="335"/>
-            <ac:spMk id="25" creationId="{8B877B96-EC26-48B0-A817-98407AEAFB73}"/>
-          </ac:spMkLst>
-        </pc:spChg>
-        <pc:spChg chg="mod">
-          <ac:chgData name="Castegnaro, Andrea" userId="e719bb20-b48f-4237-97c2-e35c3e0dc9cd" providerId="ADAL" clId="{78304693-7C79-4023-BC7A-18AAB28EFB2B}" dt="2022-01-24T14:46:53.911" v="3876" actId="20577"/>
-          <ac:spMkLst>
-            <pc:docMk/>
-            <pc:sldMk cId="718657368" sldId="335"/>
-            <ac:spMk id="39" creationId="{2F98A3E9-C2A3-4920-8955-DAC8246077A7}"/>
-          </ac:spMkLst>
-        </pc:spChg>
-        <pc:spChg chg="mod">
-          <ac:chgData name="Castegnaro, Andrea" userId="e719bb20-b48f-4237-97c2-e35c3e0dc9cd" providerId="ADAL" clId="{78304693-7C79-4023-BC7A-18AAB28EFB2B}" dt="2022-01-24T12:51:31.584" v="330" actId="20577"/>
-          <ac:spMkLst>
-            <pc:docMk/>
-            <pc:sldMk cId="718657368" sldId="335"/>
-            <ac:spMk id="50" creationId="{CA328B6A-8775-4A7D-94E8-76EFC8BAF3CC}"/>
-          </ac:spMkLst>
-        </pc:spChg>
-        <pc:spChg chg="mod">
-          <ac:chgData name="Castegnaro, Andrea" userId="e719bb20-b48f-4237-97c2-e35c3e0dc9cd" providerId="ADAL" clId="{78304693-7C79-4023-BC7A-18AAB28EFB2B}" dt="2022-01-24T12:51:13.342" v="323" actId="1035"/>
-          <ac:spMkLst>
-            <pc:docMk/>
-            <pc:sldMk cId="718657368" sldId="335"/>
-            <ac:spMk id="54" creationId="{80D25D53-FA5A-4018-BE6C-102E696C182A}"/>
-          </ac:spMkLst>
-        </pc:spChg>
-        <pc:spChg chg="mod">
-          <ac:chgData name="Castegnaro, Andrea" userId="e719bb20-b48f-4237-97c2-e35c3e0dc9cd" providerId="ADAL" clId="{78304693-7C79-4023-BC7A-18AAB28EFB2B}" dt="2022-01-24T14:47:00.986" v="3877" actId="403"/>
-          <ac:spMkLst>
-            <pc:docMk/>
-            <pc:sldMk cId="718657368" sldId="335"/>
-            <ac:spMk id="61" creationId="{0B3FD355-1584-4FD7-91CE-606F7423F97B}"/>
-          </ac:spMkLst>
-        </pc:spChg>
-        <pc:spChg chg="mod">
-          <ac:chgData name="Castegnaro, Andrea" userId="e719bb20-b48f-4237-97c2-e35c3e0dc9cd" providerId="ADAL" clId="{78304693-7C79-4023-BC7A-18AAB28EFB2B}" dt="2022-01-24T14:51:06.607" v="4251" actId="20577"/>
-          <ac:spMkLst>
-            <pc:docMk/>
-            <pc:sldMk cId="718657368" sldId="335"/>
-            <ac:spMk id="80" creationId="{D03D1DBB-C193-430E-B5BB-41A5A6D86740}"/>
-          </ac:spMkLst>
-        </pc:spChg>
-        <pc:grpChg chg="mod">
-          <ac:chgData name="Castegnaro, Andrea" userId="e719bb20-b48f-4237-97c2-e35c3e0dc9cd" providerId="ADAL" clId="{78304693-7C79-4023-BC7A-18AAB28EFB2B}" dt="2022-01-24T14:45:39.636" v="3747" actId="1035"/>
-          <ac:grpSpMkLst>
-            <pc:docMk/>
-            <pc:sldMk cId="718657368" sldId="335"/>
-            <ac:grpSpMk id="41" creationId="{48367AE3-41F9-410F-85AE-D8448B3EC75E}"/>
-          </ac:grpSpMkLst>
-        </pc:grpChg>
-        <pc:picChg chg="add mod">
-          <ac:chgData name="Castegnaro, Andrea" userId="e719bb20-b48f-4237-97c2-e35c3e0dc9cd" providerId="ADAL" clId="{78304693-7C79-4023-BC7A-18AAB28EFB2B}" dt="2022-01-24T14:12:44.248" v="1742" actId="1076"/>
-          <ac:picMkLst>
-            <pc:docMk/>
-            <pc:sldMk cId="718657368" sldId="335"/>
-            <ac:picMk id="5" creationId="{2DB7C646-D289-4BAF-9DD4-45ACE1A447C4}"/>
-          </ac:picMkLst>
-        </pc:picChg>
-        <pc:cxnChg chg="mod">
-          <ac:chgData name="Castegnaro, Andrea" userId="e719bb20-b48f-4237-97c2-e35c3e0dc9cd" providerId="ADAL" clId="{78304693-7C79-4023-BC7A-18AAB28EFB2B}" dt="2022-01-24T14:46:44.869" v="3870" actId="14100"/>
-          <ac:cxnSpMkLst>
-            <pc:docMk/>
-            <pc:sldMk cId="718657368" sldId="335"/>
-            <ac:cxnSpMk id="35" creationId="{E5575B6A-7D10-4D09-875B-D4C4FDF2FF1A}"/>
-          </ac:cxnSpMkLst>
-        </pc:cxnChg>
-      </pc:sldChg>
-      <pc:sldChg chg="addSp delSp modSp mod">
-        <pc:chgData name="Castegnaro, Andrea" userId="e719bb20-b48f-4237-97c2-e35c3e0dc9cd" providerId="ADAL" clId="{78304693-7C79-4023-BC7A-18AAB28EFB2B}" dt="2022-01-24T15:12:49.499" v="5017" actId="20577"/>
-        <pc:sldMkLst>
-          <pc:docMk/>
-          <pc:sldMk cId="3468065226" sldId="336"/>
-        </pc:sldMkLst>
-        <pc:spChg chg="mod">
-          <ac:chgData name="Castegnaro, Andrea" userId="e719bb20-b48f-4237-97c2-e35c3e0dc9cd" providerId="ADAL" clId="{78304693-7C79-4023-BC7A-18AAB28EFB2B}" dt="2022-01-24T12:56:01.833" v="351" actId="14100"/>
-          <ac:spMkLst>
-            <pc:docMk/>
-            <pc:sldMk cId="3468065226" sldId="336"/>
-            <ac:spMk id="3" creationId="{7A55B0CE-1FB7-4986-A0C4-E26590DF9A46}"/>
-          </ac:spMkLst>
-        </pc:spChg>
-        <pc:spChg chg="mod">
-          <ac:chgData name="Castegnaro, Andrea" userId="e719bb20-b48f-4237-97c2-e35c3e0dc9cd" providerId="ADAL" clId="{78304693-7C79-4023-BC7A-18AAB28EFB2B}" dt="2022-01-24T12:59:20.929" v="392" actId="20577"/>
-          <ac:spMkLst>
-            <pc:docMk/>
-            <pc:sldMk cId="3468065226" sldId="336"/>
-            <ac:spMk id="12" creationId="{E8B9767D-0C35-4C07-89CE-1C2D21EAB79C}"/>
-          </ac:spMkLst>
-        </pc:spChg>
-        <pc:spChg chg="mod">
-          <ac:chgData name="Castegnaro, Andrea" userId="e719bb20-b48f-4237-97c2-e35c3e0dc9cd" providerId="ADAL" clId="{78304693-7C79-4023-BC7A-18AAB28EFB2B}" dt="2022-01-24T12:57:04.352" v="372"/>
-          <ac:spMkLst>
-            <pc:docMk/>
-            <pc:sldMk cId="3468065226" sldId="336"/>
-            <ac:spMk id="13" creationId="{CD2B78FA-05E7-46B6-A65B-4A63B41A29ED}"/>
-          </ac:spMkLst>
-        </pc:spChg>
-        <pc:spChg chg="add mod">
-          <ac:chgData name="Castegnaro, Andrea" userId="e719bb20-b48f-4237-97c2-e35c3e0dc9cd" providerId="ADAL" clId="{78304693-7C79-4023-BC7A-18AAB28EFB2B}" dt="2022-01-24T13:48:30.412" v="491" actId="404"/>
-          <ac:spMkLst>
-            <pc:docMk/>
-            <pc:sldMk cId="3468065226" sldId="336"/>
-            <ac:spMk id="14" creationId="{BF2838A4-10B1-4B0D-9109-02DE7A4EE607}"/>
-          </ac:spMkLst>
-        </pc:spChg>
-        <pc:spChg chg="add mod">
-          <ac:chgData name="Castegnaro, Andrea" userId="e719bb20-b48f-4237-97c2-e35c3e0dc9cd" providerId="ADAL" clId="{78304693-7C79-4023-BC7A-18AAB28EFB2B}" dt="2022-01-24T15:01:51.800" v="4666" actId="6549"/>
-          <ac:spMkLst>
-            <pc:docMk/>
-            <pc:sldMk cId="3468065226" sldId="336"/>
-            <ac:spMk id="20" creationId="{8CD09D1C-A44B-4901-9F91-8B55C4781FF4}"/>
-          </ac:spMkLst>
-        </pc:spChg>
-        <pc:spChg chg="add mod">
-          <ac:chgData name="Castegnaro, Andrea" userId="e719bb20-b48f-4237-97c2-e35c3e0dc9cd" providerId="ADAL" clId="{78304693-7C79-4023-BC7A-18AAB28EFB2B}" dt="2022-01-24T15:12:49.499" v="5017" actId="20577"/>
-          <ac:spMkLst>
-            <pc:docMk/>
-            <pc:sldMk cId="3468065226" sldId="336"/>
-            <ac:spMk id="28" creationId="{91D3111F-9B4A-457A-9549-710FA698F1C3}"/>
-          </ac:spMkLst>
-        </pc:spChg>
-        <pc:spChg chg="mod">
-          <ac:chgData name="Castegnaro, Andrea" userId="e719bb20-b48f-4237-97c2-e35c3e0dc9cd" providerId="ADAL" clId="{78304693-7C79-4023-BC7A-18AAB28EFB2B}" dt="2022-01-24T12:46:03.140" v="198" actId="404"/>
-          <ac:spMkLst>
-            <pc:docMk/>
-            <pc:sldMk cId="3468065226" sldId="336"/>
-            <ac:spMk id="34" creationId="{68B92E82-A63B-4C09-B931-88A388D1A866}"/>
-          </ac:spMkLst>
-        </pc:spChg>
-        <pc:spChg chg="mod">
-          <ac:chgData name="Castegnaro, Andrea" userId="e719bb20-b48f-4237-97c2-e35c3e0dc9cd" providerId="ADAL" clId="{78304693-7C79-4023-BC7A-18AAB28EFB2B}" dt="2022-01-24T15:06:50.701" v="4908" actId="20577"/>
-          <ac:spMkLst>
-            <pc:docMk/>
-            <pc:sldMk cId="3468065226" sldId="336"/>
-            <ac:spMk id="37" creationId="{5791EDE9-2ADD-4106-8EEA-DB3CE83DE3CA}"/>
-          </ac:spMkLst>
-        </pc:spChg>
-        <pc:grpChg chg="add mod">
-          <ac:chgData name="Castegnaro, Andrea" userId="e719bb20-b48f-4237-97c2-e35c3e0dc9cd" providerId="ADAL" clId="{78304693-7C79-4023-BC7A-18AAB28EFB2B}" dt="2022-01-24T15:01:57.873" v="4669" actId="1076"/>
-          <ac:grpSpMkLst>
-            <pc:docMk/>
-            <pc:sldMk cId="3468065226" sldId="336"/>
-            <ac:grpSpMk id="11" creationId="{0C55BF05-5C6E-4A1C-813D-2AF2DEC9645A}"/>
-          </ac:grpSpMkLst>
-        </pc:grpChg>
-        <pc:grpChg chg="mod">
-          <ac:chgData name="Castegnaro, Andrea" userId="e719bb20-b48f-4237-97c2-e35c3e0dc9cd" providerId="ADAL" clId="{78304693-7C79-4023-BC7A-18AAB28EFB2B}" dt="2022-01-24T15:00:18.090" v="4530" actId="1076"/>
-          <ac:grpSpMkLst>
-            <pc:docMk/>
-            <pc:sldMk cId="3468065226" sldId="336"/>
-            <ac:grpSpMk id="33" creationId="{F4500DD2-6D8D-4761-A1F4-E06D35507531}"/>
-          </ac:grpSpMkLst>
-        </pc:grpChg>
-        <pc:grpChg chg="del">
-          <ac:chgData name="Castegnaro, Andrea" userId="e719bb20-b48f-4237-97c2-e35c3e0dc9cd" providerId="ADAL" clId="{78304693-7C79-4023-BC7A-18AAB28EFB2B}" dt="2022-01-24T12:52:34.617" v="342" actId="478"/>
-          <ac:grpSpMkLst>
-            <pc:docMk/>
-            <pc:sldMk cId="3468065226" sldId="336"/>
-            <ac:grpSpMk id="39" creationId="{8C4129A2-93B4-42E3-BA38-14CA7A13A1B5}"/>
-          </ac:grpSpMkLst>
-        </pc:grpChg>
-        <pc:picChg chg="add mod">
-          <ac:chgData name="Castegnaro, Andrea" userId="e719bb20-b48f-4237-97c2-e35c3e0dc9cd" providerId="ADAL" clId="{78304693-7C79-4023-BC7A-18AAB28EFB2B}" dt="2022-01-24T14:15:33.401" v="1763" actId="1076"/>
-          <ac:picMkLst>
-            <pc:docMk/>
-            <pc:sldMk cId="3468065226" sldId="336"/>
-            <ac:picMk id="7" creationId="{8AD2CFE3-3A93-422E-9B83-392926E51C1D}"/>
-          </ac:picMkLst>
-        </pc:picChg>
-        <pc:cxnChg chg="add mod">
-          <ac:chgData name="Castegnaro, Andrea" userId="e719bb20-b48f-4237-97c2-e35c3e0dc9cd" providerId="ADAL" clId="{78304693-7C79-4023-BC7A-18AAB28EFB2B}" dt="2022-01-24T15:02:05.354" v="4672" actId="1076"/>
-          <ac:cxnSpMkLst>
-            <pc:docMk/>
-            <pc:sldMk cId="3468065226" sldId="336"/>
-            <ac:cxnSpMk id="15" creationId="{71DEF9B2-8E96-41E4-908F-28CA2A3EC04E}"/>
-          </ac:cxnSpMkLst>
-        </pc:cxnChg>
-        <pc:cxnChg chg="add mod">
-          <ac:chgData name="Castegnaro, Andrea" userId="e719bb20-b48f-4237-97c2-e35c3e0dc9cd" providerId="ADAL" clId="{78304693-7C79-4023-BC7A-18AAB28EFB2B}" dt="2022-01-24T15:02:53.441" v="4694" actId="14100"/>
-          <ac:cxnSpMkLst>
-            <pc:docMk/>
-            <pc:sldMk cId="3468065226" sldId="336"/>
-            <ac:cxnSpMk id="23" creationId="{71FC1980-73F2-41AC-BBCB-4962193D0F21}"/>
-          </ac:cxnSpMkLst>
-        </pc:cxnChg>
-        <pc:cxnChg chg="add mod">
-          <ac:chgData name="Castegnaro, Andrea" userId="e719bb20-b48f-4237-97c2-e35c3e0dc9cd" providerId="ADAL" clId="{78304693-7C79-4023-BC7A-18AAB28EFB2B}" dt="2022-01-24T15:02:57.057" v="4695" actId="14100"/>
-          <ac:cxnSpMkLst>
-            <pc:docMk/>
-            <pc:sldMk cId="3468065226" sldId="336"/>
-            <ac:cxnSpMk id="26" creationId="{DA9AB0AC-3262-42E4-B5BA-DB5A161CADE9}"/>
-          </ac:cxnSpMkLst>
-        </pc:cxnChg>
-      </pc:sldChg>
-      <pc:sldChg chg="addSp modSp mod">
-        <pc:chgData name="Castegnaro, Andrea" userId="e719bb20-b48f-4237-97c2-e35c3e0dc9cd" providerId="ADAL" clId="{78304693-7C79-4023-BC7A-18AAB28EFB2B}" dt="2022-01-24T14:43:49.691" v="3641" actId="20577"/>
-        <pc:sldMkLst>
-          <pc:docMk/>
-          <pc:sldMk cId="3329810214" sldId="337"/>
-        </pc:sldMkLst>
-        <pc:spChg chg="mod">
-          <ac:chgData name="Castegnaro, Andrea" userId="e719bb20-b48f-4237-97c2-e35c3e0dc9cd" providerId="ADAL" clId="{78304693-7C79-4023-BC7A-18AAB28EFB2B}" dt="2022-01-24T14:43:49.691" v="3641" actId="20577"/>
-          <ac:spMkLst>
-            <pc:docMk/>
-            <pc:sldMk cId="3329810214" sldId="337"/>
-            <ac:spMk id="3" creationId="{7A55B0CE-1FB7-4986-A0C4-E26590DF9A46}"/>
-          </ac:spMkLst>
-        </pc:spChg>
-        <pc:spChg chg="mod">
-          <ac:chgData name="Castegnaro, Andrea" userId="e719bb20-b48f-4237-97c2-e35c3e0dc9cd" providerId="ADAL" clId="{78304693-7C79-4023-BC7A-18AAB28EFB2B}" dt="2022-01-24T14:42:23.795" v="3599" actId="164"/>
-          <ac:spMkLst>
-            <pc:docMk/>
-            <pc:sldMk cId="3329810214" sldId="337"/>
-            <ac:spMk id="7" creationId="{E3909C12-3D74-485A-A00B-89F9856B98A8}"/>
-          </ac:spMkLst>
-        </pc:spChg>
-        <pc:spChg chg="mod">
-          <ac:chgData name="Castegnaro, Andrea" userId="e719bb20-b48f-4237-97c2-e35c3e0dc9cd" providerId="ADAL" clId="{78304693-7C79-4023-BC7A-18AAB28EFB2B}" dt="2022-01-24T14:42:46.178" v="3610" actId="114"/>
-          <ac:spMkLst>
-            <pc:docMk/>
-            <pc:sldMk cId="3329810214" sldId="337"/>
-            <ac:spMk id="36" creationId="{589ED94A-C997-4638-AE5A-8611E031C7D2}"/>
-          </ac:spMkLst>
-        </pc:spChg>
-        <pc:spChg chg="mod">
-          <ac:chgData name="Castegnaro, Andrea" userId="e719bb20-b48f-4237-97c2-e35c3e0dc9cd" providerId="ADAL" clId="{78304693-7C79-4023-BC7A-18AAB28EFB2B}" dt="2022-01-24T14:43:05.237" v="3619" actId="114"/>
-          <ac:spMkLst>
-            <pc:docMk/>
-            <pc:sldMk cId="3329810214" sldId="337"/>
-            <ac:spMk id="37" creationId="{863AA4B6-6FA9-4542-BE97-E9375E158AAC}"/>
-          </ac:spMkLst>
-        </pc:spChg>
-        <pc:spChg chg="mod">
-          <ac:chgData name="Castegnaro, Andrea" userId="e719bb20-b48f-4237-97c2-e35c3e0dc9cd" providerId="ADAL" clId="{78304693-7C79-4023-BC7A-18AAB28EFB2B}" dt="2022-01-24T14:43:42.105" v="3638" actId="20577"/>
-          <ac:spMkLst>
-            <pc:docMk/>
-            <pc:sldMk cId="3329810214" sldId="337"/>
-            <ac:spMk id="38" creationId="{7E5ADCD3-26FF-45E6-8DC8-1F3EFD1428E3}"/>
-          </ac:spMkLst>
-        </pc:spChg>
-        <pc:grpChg chg="add mod">
-          <ac:chgData name="Castegnaro, Andrea" userId="e719bb20-b48f-4237-97c2-e35c3e0dc9cd" providerId="ADAL" clId="{78304693-7C79-4023-BC7A-18AAB28EFB2B}" dt="2022-01-24T14:42:35.487" v="3609" actId="1035"/>
-          <ac:grpSpMkLst>
-            <pc:docMk/>
-            <pc:sldMk cId="3329810214" sldId="337"/>
-            <ac:grpSpMk id="4" creationId="{BF4E70AF-9883-4ED8-B2AD-7F6B2D279024}"/>
-          </ac:grpSpMkLst>
-        </pc:grpChg>
-        <pc:grpChg chg="mod">
-          <ac:chgData name="Castegnaro, Andrea" userId="e719bb20-b48f-4237-97c2-e35c3e0dc9cd" providerId="ADAL" clId="{78304693-7C79-4023-BC7A-18AAB28EFB2B}" dt="2022-01-24T14:42:23.795" v="3599" actId="164"/>
-          <ac:grpSpMkLst>
-            <pc:docMk/>
-            <pc:sldMk cId="3329810214" sldId="337"/>
-            <ac:grpSpMk id="24" creationId="{1CEFF591-0B36-47CE-9371-0D103E071574}"/>
-          </ac:grpSpMkLst>
-        </pc:grpChg>
-        <pc:grpChg chg="mod">
-          <ac:chgData name="Castegnaro, Andrea" userId="e719bb20-b48f-4237-97c2-e35c3e0dc9cd" providerId="ADAL" clId="{78304693-7C79-4023-BC7A-18AAB28EFB2B}" dt="2022-01-24T14:42:23.795" v="3599" actId="164"/>
-          <ac:grpSpMkLst>
-            <pc:docMk/>
-            <pc:sldMk cId="3329810214" sldId="337"/>
-            <ac:grpSpMk id="32" creationId="{D66C8309-9686-43CB-9A8F-96EE5B20B70E}"/>
-          </ac:grpSpMkLst>
-        </pc:grpChg>
-      </pc:sldChg>
-      <pc:sldChg chg="addSp delSp modSp add mod">
-        <pc:chgData name="Castegnaro, Andrea" userId="e719bb20-b48f-4237-97c2-e35c3e0dc9cd" providerId="ADAL" clId="{78304693-7C79-4023-BC7A-18AAB28EFB2B}" dt="2022-01-24T14:45:18.944" v="3743" actId="1036"/>
-        <pc:sldMkLst>
-          <pc:docMk/>
-          <pc:sldMk cId="2097315419" sldId="338"/>
-        </pc:sldMkLst>
-        <pc:spChg chg="mod">
-          <ac:chgData name="Castegnaro, Andrea" userId="e719bb20-b48f-4237-97c2-e35c3e0dc9cd" providerId="ADAL" clId="{78304693-7C79-4023-BC7A-18AAB28EFB2B}" dt="2022-01-24T13:49:34.612" v="523" actId="20577"/>
-          <ac:spMkLst>
-            <pc:docMk/>
-            <pc:sldMk cId="2097315419" sldId="338"/>
-            <ac:spMk id="2" creationId="{32DCA100-7D85-4A3C-9993-92EC37D3F8E2}"/>
-          </ac:spMkLst>
-        </pc:spChg>
-        <pc:spChg chg="mod">
-          <ac:chgData name="Castegnaro, Andrea" userId="e719bb20-b48f-4237-97c2-e35c3e0dc9cd" providerId="ADAL" clId="{78304693-7C79-4023-BC7A-18AAB28EFB2B}" dt="2022-01-24T14:44:58.485" v="3718" actId="20577"/>
-          <ac:spMkLst>
-            <pc:docMk/>
-            <pc:sldMk cId="2097315419" sldId="338"/>
-            <ac:spMk id="3" creationId="{7A55B0CE-1FB7-4986-A0C4-E26590DF9A46}"/>
-          </ac:spMkLst>
-        </pc:spChg>
-        <pc:spChg chg="del">
-          <ac:chgData name="Castegnaro, Andrea" userId="e719bb20-b48f-4237-97c2-e35c3e0dc9cd" providerId="ADAL" clId="{78304693-7C79-4023-BC7A-18AAB28EFB2B}" dt="2022-01-24T13:54:39.051" v="788" actId="478"/>
-          <ac:spMkLst>
-            <pc:docMk/>
-            <pc:sldMk cId="2097315419" sldId="338"/>
-            <ac:spMk id="7" creationId="{E3909C12-3D74-485A-A00B-89F9856B98A8}"/>
-          </ac:spMkLst>
-        </pc:spChg>
-        <pc:spChg chg="mod">
-          <ac:chgData name="Castegnaro, Andrea" userId="e719bb20-b48f-4237-97c2-e35c3e0dc9cd" providerId="ADAL" clId="{78304693-7C79-4023-BC7A-18AAB28EFB2B}" dt="2022-01-24T13:55:03.287" v="791" actId="20577"/>
-          <ac:spMkLst>
-            <pc:docMk/>
-            <pc:sldMk cId="2097315419" sldId="338"/>
-            <ac:spMk id="21" creationId="{BE92B265-6B8E-4FE3-BCA1-CA56D22A83C4}"/>
-          </ac:spMkLst>
-        </pc:spChg>
-        <pc:spChg chg="mod">
-          <ac:chgData name="Castegnaro, Andrea" userId="e719bb20-b48f-4237-97c2-e35c3e0dc9cd" providerId="ADAL" clId="{78304693-7C79-4023-BC7A-18AAB28EFB2B}" dt="2022-01-24T13:52:36.813" v="728"/>
-          <ac:spMkLst>
-            <pc:docMk/>
-            <pc:sldMk cId="2097315419" sldId="338"/>
-            <ac:spMk id="22" creationId="{005FC275-9820-4C1A-89A0-7BCA5B1CBDE5}"/>
-          </ac:spMkLst>
-        </pc:spChg>
-        <pc:spChg chg="add mod">
-          <ac:chgData name="Castegnaro, Andrea" userId="e719bb20-b48f-4237-97c2-e35c3e0dc9cd" providerId="ADAL" clId="{78304693-7C79-4023-BC7A-18AAB28EFB2B}" dt="2022-01-24T13:59:13.333" v="1144" actId="1036"/>
-          <ac:spMkLst>
-            <pc:docMk/>
-            <pc:sldMk cId="2097315419" sldId="338"/>
-            <ac:spMk id="23" creationId="{960B41A7-DCC8-4E2E-A99E-972A331A6260}"/>
-          </ac:spMkLst>
-        </pc:spChg>
-        <pc:spChg chg="add mod">
-          <ac:chgData name="Castegnaro, Andrea" userId="e719bb20-b48f-4237-97c2-e35c3e0dc9cd" providerId="ADAL" clId="{78304693-7C79-4023-BC7A-18AAB28EFB2B}" dt="2022-01-24T13:59:13.333" v="1144" actId="1036"/>
-          <ac:spMkLst>
-            <pc:docMk/>
-            <pc:sldMk cId="2097315419" sldId="338"/>
-            <ac:spMk id="28" creationId="{4A78E373-57D1-47FD-B2E2-46459D4BD2D3}"/>
-          </ac:spMkLst>
-        </pc:spChg>
-        <pc:spChg chg="add mod">
-          <ac:chgData name="Castegnaro, Andrea" userId="e719bb20-b48f-4237-97c2-e35c3e0dc9cd" providerId="ADAL" clId="{78304693-7C79-4023-BC7A-18AAB28EFB2B}" dt="2022-01-24T14:45:18.944" v="3743" actId="1036"/>
-          <ac:spMkLst>
-            <pc:docMk/>
-            <pc:sldMk cId="2097315419" sldId="338"/>
-            <ac:spMk id="30" creationId="{A966CB9F-9F0B-457C-B44B-0BA1EE55BCEA}"/>
-          </ac:spMkLst>
-        </pc:spChg>
-        <pc:spChg chg="del">
-          <ac:chgData name="Castegnaro, Andrea" userId="e719bb20-b48f-4237-97c2-e35c3e0dc9cd" providerId="ADAL" clId="{78304693-7C79-4023-BC7A-18AAB28EFB2B}" dt="2022-01-24T13:54:39.051" v="788" actId="478"/>
-          <ac:spMkLst>
-            <pc:docMk/>
-            <pc:sldMk cId="2097315419" sldId="338"/>
-            <ac:spMk id="36" creationId="{589ED94A-C997-4638-AE5A-8611E031C7D2}"/>
-          </ac:spMkLst>
-        </pc:spChg>
-        <pc:spChg chg="del">
-          <ac:chgData name="Castegnaro, Andrea" userId="e719bb20-b48f-4237-97c2-e35c3e0dc9cd" providerId="ADAL" clId="{78304693-7C79-4023-BC7A-18AAB28EFB2B}" dt="2022-01-24T13:54:39.051" v="788" actId="478"/>
-          <ac:spMkLst>
-            <pc:docMk/>
-            <pc:sldMk cId="2097315419" sldId="338"/>
-            <ac:spMk id="37" creationId="{863AA4B6-6FA9-4542-BE97-E9375E158AAC}"/>
-          </ac:spMkLst>
-        </pc:spChg>
-        <pc:spChg chg="del">
-          <ac:chgData name="Castegnaro, Andrea" userId="e719bb20-b48f-4237-97c2-e35c3e0dc9cd" providerId="ADAL" clId="{78304693-7C79-4023-BC7A-18AAB28EFB2B}" dt="2022-01-24T13:54:39.051" v="788" actId="478"/>
-          <ac:spMkLst>
-            <pc:docMk/>
-            <pc:sldMk cId="2097315419" sldId="338"/>
-            <ac:spMk id="38" creationId="{7E5ADCD3-26FF-45E6-8DC8-1F3EFD1428E3}"/>
-          </ac:spMkLst>
-        </pc:spChg>
-        <pc:spChg chg="mod">
-          <ac:chgData name="Castegnaro, Andrea" userId="e719bb20-b48f-4237-97c2-e35c3e0dc9cd" providerId="ADAL" clId="{78304693-7C79-4023-BC7A-18AAB28EFB2B}" dt="2022-01-24T14:00:50.748" v="1316" actId="6549"/>
-          <ac:spMkLst>
-            <pc:docMk/>
-            <pc:sldMk cId="2097315419" sldId="338"/>
-            <ac:spMk id="39" creationId="{B248D79F-C28B-47EE-B667-73823F2CB4BA}"/>
-          </ac:spMkLst>
-        </pc:spChg>
-        <pc:spChg chg="mod">
-          <ac:chgData name="Castegnaro, Andrea" userId="e719bb20-b48f-4237-97c2-e35c3e0dc9cd" providerId="ADAL" clId="{78304693-7C79-4023-BC7A-18AAB28EFB2B}" dt="2022-01-24T14:00:40.231" v="1298"/>
-          <ac:spMkLst>
-            <pc:docMk/>
-            <pc:sldMk cId="2097315419" sldId="338"/>
-            <ac:spMk id="40" creationId="{EBFD99E5-E1FF-48E9-BCF7-C843268EF86C}"/>
-          </ac:spMkLst>
-        </pc:spChg>
-        <pc:spChg chg="add del mod">
-          <ac:chgData name="Castegnaro, Andrea" userId="e719bb20-b48f-4237-97c2-e35c3e0dc9cd" providerId="ADAL" clId="{78304693-7C79-4023-BC7A-18AAB28EFB2B}" dt="2022-01-24T14:01:38.884" v="1332" actId="478"/>
-          <ac:spMkLst>
-            <pc:docMk/>
-            <pc:sldMk cId="2097315419" sldId="338"/>
-            <ac:spMk id="41" creationId="{7789EF99-E82D-4FAC-BDEF-26D0ECD2989C}"/>
-          </ac:spMkLst>
-        </pc:spChg>
-        <pc:grpChg chg="add mod">
-          <ac:chgData name="Castegnaro, Andrea" userId="e719bb20-b48f-4237-97c2-e35c3e0dc9cd" providerId="ADAL" clId="{78304693-7C79-4023-BC7A-18AAB28EFB2B}" dt="2022-01-24T14:45:02.877" v="3730" actId="1036"/>
-          <ac:grpSpMkLst>
-            <pc:docMk/>
-            <pc:sldMk cId="2097315419" sldId="338"/>
-            <ac:grpSpMk id="20" creationId="{ECAE6BB0-FC18-4A62-8CFD-5120B0FCA786}"/>
-          </ac:grpSpMkLst>
-        </pc:grpChg>
-        <pc:grpChg chg="del">
-          <ac:chgData name="Castegnaro, Andrea" userId="e719bb20-b48f-4237-97c2-e35c3e0dc9cd" providerId="ADAL" clId="{78304693-7C79-4023-BC7A-18AAB28EFB2B}" dt="2022-01-24T13:54:39.051" v="788" actId="478"/>
-          <ac:grpSpMkLst>
-            <pc:docMk/>
-            <pc:sldMk cId="2097315419" sldId="338"/>
-            <ac:grpSpMk id="24" creationId="{1CEFF591-0B36-47CE-9371-0D103E071574}"/>
-          </ac:grpSpMkLst>
-        </pc:grpChg>
-        <pc:grpChg chg="add mod">
-          <ac:chgData name="Castegnaro, Andrea" userId="e719bb20-b48f-4237-97c2-e35c3e0dc9cd" providerId="ADAL" clId="{78304693-7C79-4023-BC7A-18AAB28EFB2B}" dt="2022-01-24T14:01:41.924" v="1333" actId="1076"/>
-          <ac:grpSpMkLst>
-            <pc:docMk/>
-            <pc:sldMk cId="2097315419" sldId="338"/>
-            <ac:grpSpMk id="31" creationId="{0BECAA68-9DC7-4084-A8AF-3D6C83E7273F}"/>
-          </ac:grpSpMkLst>
-        </pc:grpChg>
-        <pc:grpChg chg="del">
-          <ac:chgData name="Castegnaro, Andrea" userId="e719bb20-b48f-4237-97c2-e35c3e0dc9cd" providerId="ADAL" clId="{78304693-7C79-4023-BC7A-18AAB28EFB2B}" dt="2022-01-24T13:54:39.051" v="788" actId="478"/>
-          <ac:grpSpMkLst>
-            <pc:docMk/>
-            <pc:sldMk cId="2097315419" sldId="338"/>
-            <ac:grpSpMk id="32" creationId="{D66C8309-9686-43CB-9A8F-96EE5B20B70E}"/>
-          </ac:grpSpMkLst>
-        </pc:grpChg>
-        <pc:picChg chg="add del mod">
-          <ac:chgData name="Castegnaro, Andrea" userId="e719bb20-b48f-4237-97c2-e35c3e0dc9cd" providerId="ADAL" clId="{78304693-7C79-4023-BC7A-18AAB28EFB2B}" dt="2022-01-24T13:49:57.039" v="525" actId="478"/>
-          <ac:picMkLst>
-            <pc:docMk/>
-            <pc:sldMk cId="2097315419" sldId="338"/>
-            <ac:picMk id="5" creationId="{80694409-4E60-4A0C-AB6A-C452C8142CCE}"/>
-          </ac:picMkLst>
-        </pc:picChg>
-        <pc:picChg chg="add mod">
-          <ac:chgData name="Castegnaro, Andrea" userId="e719bb20-b48f-4237-97c2-e35c3e0dc9cd" providerId="ADAL" clId="{78304693-7C79-4023-BC7A-18AAB28EFB2B}" dt="2022-01-24T13:57:00.944" v="926" actId="1036"/>
-          <ac:picMkLst>
-            <pc:docMk/>
-            <pc:sldMk cId="2097315419" sldId="338"/>
-            <ac:picMk id="8" creationId="{A057BB84-75B9-4A58-A793-0527A651DB20}"/>
-          </ac:picMkLst>
-        </pc:picChg>
-        <pc:picChg chg="del">
-          <ac:chgData name="Castegnaro, Andrea" userId="e719bb20-b48f-4237-97c2-e35c3e0dc9cd" providerId="ADAL" clId="{78304693-7C79-4023-BC7A-18AAB28EFB2B}" dt="2022-01-24T13:49:32.019" v="522" actId="478"/>
-          <ac:picMkLst>
-            <pc:docMk/>
-            <pc:sldMk cId="2097315419" sldId="338"/>
-            <ac:picMk id="18" creationId="{272A3C8F-DA4B-4523-B0CC-5E0F9ED9731F}"/>
-          </ac:picMkLst>
-        </pc:picChg>
-        <pc:cxnChg chg="add mod">
-          <ac:chgData name="Castegnaro, Andrea" userId="e719bb20-b48f-4237-97c2-e35c3e0dc9cd" providerId="ADAL" clId="{78304693-7C79-4023-BC7A-18AAB28EFB2B}" dt="2022-01-24T14:45:05.005" v="3731" actId="1076"/>
-          <ac:cxnSpMkLst>
-            <pc:docMk/>
-            <pc:sldMk cId="2097315419" sldId="338"/>
-            <ac:cxnSpMk id="26" creationId="{F72D2822-8291-4CFF-A0C3-64F4B096F961}"/>
-          </ac:cxnSpMkLst>
-        </pc:cxnChg>
-        <pc:cxnChg chg="add del mod">
-          <ac:chgData name="Castegnaro, Andrea" userId="e719bb20-b48f-4237-97c2-e35c3e0dc9cd" providerId="ADAL" clId="{78304693-7C79-4023-BC7A-18AAB28EFB2B}" dt="2022-01-24T14:45:08.438" v="3734" actId="478"/>
-          <ac:cxnSpMkLst>
-            <pc:docMk/>
-            <pc:sldMk cId="2097315419" sldId="338"/>
-            <ac:cxnSpMk id="27" creationId="{3C008FB3-EF39-41A4-A7D0-6D5DF9558794}"/>
-          </ac:cxnSpMkLst>
-        </pc:cxnChg>
-        <pc:cxnChg chg="add mod">
-          <ac:chgData name="Castegnaro, Andrea" userId="e719bb20-b48f-4237-97c2-e35c3e0dc9cd" providerId="ADAL" clId="{78304693-7C79-4023-BC7A-18AAB28EFB2B}" dt="2022-01-24T14:45:14.086" v="3736" actId="1076"/>
-          <ac:cxnSpMkLst>
-            <pc:docMk/>
-            <pc:sldMk cId="2097315419" sldId="338"/>
-            <ac:cxnSpMk id="42" creationId="{3EBC99A2-234C-499D-9969-8796E50A6349}"/>
-          </ac:cxnSpMkLst>
-        </pc:cxnChg>
-      </pc:sldChg>
-      <pc:sldChg chg="addSp delSp modSp add mod setBg">
-        <pc:chgData name="Castegnaro, Andrea" userId="e719bb20-b48f-4237-97c2-e35c3e0dc9cd" providerId="ADAL" clId="{78304693-7C79-4023-BC7A-18AAB28EFB2B}" dt="2022-01-24T14:24:50.463" v="2781" actId="20577"/>
-        <pc:sldMkLst>
-          <pc:docMk/>
-          <pc:sldMk cId="2075616132" sldId="339"/>
-        </pc:sldMkLst>
-        <pc:spChg chg="mod">
-          <ac:chgData name="Castegnaro, Andrea" userId="e719bb20-b48f-4237-97c2-e35c3e0dc9cd" providerId="ADAL" clId="{78304693-7C79-4023-BC7A-18AAB28EFB2B}" dt="2022-01-24T14:20:16.048" v="2450" actId="26606"/>
-          <ac:spMkLst>
-            <pc:docMk/>
-            <pc:sldMk cId="2075616132" sldId="339"/>
-            <ac:spMk id="2" creationId="{32DCA100-7D85-4A3C-9993-92EC37D3F8E2}"/>
-          </ac:spMkLst>
-        </pc:spChg>
-        <pc:spChg chg="mod">
-          <ac:chgData name="Castegnaro, Andrea" userId="e719bb20-b48f-4237-97c2-e35c3e0dc9cd" providerId="ADAL" clId="{78304693-7C79-4023-BC7A-18AAB28EFB2B}" dt="2022-01-24T14:24:50.463" v="2781" actId="20577"/>
-          <ac:spMkLst>
-            <pc:docMk/>
-            <pc:sldMk cId="2075616132" sldId="339"/>
-            <ac:spMk id="3" creationId="{7A55B0CE-1FB7-4986-A0C4-E26590DF9A46}"/>
-          </ac:spMkLst>
-        </pc:spChg>
-        <pc:spChg chg="add del">
-          <ac:chgData name="Castegnaro, Andrea" userId="e719bb20-b48f-4237-97c2-e35c3e0dc9cd" providerId="ADAL" clId="{78304693-7C79-4023-BC7A-18AAB28EFB2B}" dt="2022-01-24T14:20:16.048" v="2450" actId="26606"/>
-          <ac:spMkLst>
-            <pc:docMk/>
-            <pc:sldMk cId="2075616132" sldId="339"/>
-            <ac:spMk id="10" creationId="{F13C74B1-5B17-4795-BED0-7140497B445A}"/>
-          </ac:spMkLst>
-        </pc:spChg>
-        <pc:spChg chg="add del">
-          <ac:chgData name="Castegnaro, Andrea" userId="e719bb20-b48f-4237-97c2-e35c3e0dc9cd" providerId="ADAL" clId="{78304693-7C79-4023-BC7A-18AAB28EFB2B}" dt="2022-01-24T14:20:16.048" v="2450" actId="26606"/>
-          <ac:spMkLst>
-            <pc:docMk/>
-            <pc:sldMk cId="2075616132" sldId="339"/>
-            <ac:spMk id="12" creationId="{D4974D33-8DC5-464E-8C6D-BE58F0669C17}"/>
-          </ac:spMkLst>
-        </pc:spChg>
-        <pc:spChg chg="del">
-          <ac:chgData name="Castegnaro, Andrea" userId="e719bb20-b48f-4237-97c2-e35c3e0dc9cd" providerId="ADAL" clId="{78304693-7C79-4023-BC7A-18AAB28EFB2B}" dt="2022-01-24T14:16:23" v="1832" actId="478"/>
-          <ac:spMkLst>
-            <pc:docMk/>
-            <pc:sldMk cId="2075616132" sldId="339"/>
-            <ac:spMk id="14" creationId="{BF2838A4-10B1-4B0D-9109-02DE7A4EE607}"/>
-          </ac:spMkLst>
-        </pc:spChg>
-        <pc:spChg chg="del">
-          <ac:chgData name="Castegnaro, Andrea" userId="e719bb20-b48f-4237-97c2-e35c3e0dc9cd" providerId="ADAL" clId="{78304693-7C79-4023-BC7A-18AAB28EFB2B}" dt="2022-01-24T14:16:20.577" v="1829" actId="478"/>
-          <ac:spMkLst>
-            <pc:docMk/>
-            <pc:sldMk cId="2075616132" sldId="339"/>
-            <ac:spMk id="37" creationId="{5791EDE9-2ADD-4106-8EEA-DB3CE83DE3CA}"/>
-          </ac:spMkLst>
-        </pc:spChg>
-        <pc:grpChg chg="del">
-          <ac:chgData name="Castegnaro, Andrea" userId="e719bb20-b48f-4237-97c2-e35c3e0dc9cd" providerId="ADAL" clId="{78304693-7C79-4023-BC7A-18AAB28EFB2B}" dt="2022-01-24T14:16:21.457" v="1830" actId="478"/>
-          <ac:grpSpMkLst>
-            <pc:docMk/>
-            <pc:sldMk cId="2075616132" sldId="339"/>
-            <ac:grpSpMk id="11" creationId="{0C55BF05-5C6E-4A1C-813D-2AF2DEC9645A}"/>
-          </ac:grpSpMkLst>
-        </pc:grpChg>
-        <pc:grpChg chg="del">
-          <ac:chgData name="Castegnaro, Andrea" userId="e719bb20-b48f-4237-97c2-e35c3e0dc9cd" providerId="ADAL" clId="{78304693-7C79-4023-BC7A-18AAB28EFB2B}" dt="2022-01-24T14:16:19.224" v="1828" actId="478"/>
-          <ac:grpSpMkLst>
-            <pc:docMk/>
-            <pc:sldMk cId="2075616132" sldId="339"/>
-            <ac:grpSpMk id="33" creationId="{F4500DD2-6D8D-4761-A1F4-E06D35507531}"/>
-          </ac:grpSpMkLst>
-        </pc:grpChg>
-        <pc:picChg chg="add mod">
-          <ac:chgData name="Castegnaro, Andrea" userId="e719bb20-b48f-4237-97c2-e35c3e0dc9cd" providerId="ADAL" clId="{78304693-7C79-4023-BC7A-18AAB28EFB2B}" dt="2022-01-24T14:24:48.278" v="2780" actId="1076"/>
-          <ac:picMkLst>
-            <pc:docMk/>
-            <pc:sldMk cId="2075616132" sldId="339"/>
-            <ac:picMk id="5" creationId="{B040B3DA-BD5E-4ABE-ADAA-6A62924DE4C9}"/>
-          </ac:picMkLst>
-        </pc:picChg>
-        <pc:picChg chg="add del mod">
-          <ac:chgData name="Castegnaro, Andrea" userId="e719bb20-b48f-4237-97c2-e35c3e0dc9cd" providerId="ADAL" clId="{78304693-7C79-4023-BC7A-18AAB28EFB2B}" dt="2022-01-24T14:24:33.932" v="2774" actId="478"/>
-          <ac:picMkLst>
-            <pc:docMk/>
-            <pc:sldMk cId="2075616132" sldId="339"/>
-            <ac:picMk id="7" creationId="{49FFB218-FA33-4AD1-B608-73692D7DA0BC}"/>
-          </ac:picMkLst>
-        </pc:picChg>
-        <pc:cxnChg chg="del">
-          <ac:chgData name="Castegnaro, Andrea" userId="e719bb20-b48f-4237-97c2-e35c3e0dc9cd" providerId="ADAL" clId="{78304693-7C79-4023-BC7A-18AAB28EFB2B}" dt="2022-01-24T14:16:22.017" v="1831" actId="478"/>
-          <ac:cxnSpMkLst>
-            <pc:docMk/>
-            <pc:sldMk cId="2075616132" sldId="339"/>
-            <ac:cxnSpMk id="15" creationId="{71DEF9B2-8E96-41E4-908F-28CA2A3EC04E}"/>
-          </ac:cxnSpMkLst>
-        </pc:cxnChg>
-      </pc:sldChg>
-      <pc:sldChg chg="add del">
-        <pc:chgData name="Castegnaro, Andrea" userId="e719bb20-b48f-4237-97c2-e35c3e0dc9cd" providerId="ADAL" clId="{78304693-7C79-4023-BC7A-18AAB28EFB2B}" dt="2022-01-24T14:15:11.811" v="1757" actId="47"/>
-        <pc:sldMkLst>
-          <pc:docMk/>
-          <pc:sldMk cId="2477883259" sldId="339"/>
-        </pc:sldMkLst>
-      </pc:sldChg>
-      <pc:sldChg chg="addSp delSp modSp add mod">
-        <pc:chgData name="Castegnaro, Andrea" userId="e719bb20-b48f-4237-97c2-e35c3e0dc9cd" providerId="ADAL" clId="{78304693-7C79-4023-BC7A-18AAB28EFB2B}" dt="2022-01-24T15:20:50.212" v="5744" actId="1036"/>
-        <pc:sldMkLst>
-          <pc:docMk/>
-          <pc:sldMk cId="3243017373" sldId="340"/>
-        </pc:sldMkLst>
-        <pc:spChg chg="mod">
-          <ac:chgData name="Castegnaro, Andrea" userId="e719bb20-b48f-4237-97c2-e35c3e0dc9cd" providerId="ADAL" clId="{78304693-7C79-4023-BC7A-18AAB28EFB2B}" dt="2022-01-24T15:20:45.939" v="5741" actId="14100"/>
-          <ac:spMkLst>
-            <pc:docMk/>
-            <pc:sldMk cId="3243017373" sldId="340"/>
-            <ac:spMk id="3" creationId="{7A55B0CE-1FB7-4986-A0C4-E26590DF9A46}"/>
-          </ac:spMkLst>
-        </pc:spChg>
-        <pc:spChg chg="mod">
-          <ac:chgData name="Castegnaro, Andrea" userId="e719bb20-b48f-4237-97c2-e35c3e0dc9cd" providerId="ADAL" clId="{78304693-7C79-4023-BC7A-18AAB28EFB2B}" dt="2022-01-24T15:20:15.791" v="5729" actId="20577"/>
-          <ac:spMkLst>
-            <pc:docMk/>
-            <pc:sldMk cId="3243017373" sldId="340"/>
-            <ac:spMk id="12" creationId="{E8B9767D-0C35-4C07-89CE-1C2D21EAB79C}"/>
-          </ac:spMkLst>
-        </pc:spChg>
-        <pc:spChg chg="del">
-          <ac:chgData name="Castegnaro, Andrea" userId="e719bb20-b48f-4237-97c2-e35c3e0dc9cd" providerId="ADAL" clId="{78304693-7C79-4023-BC7A-18AAB28EFB2B}" dt="2022-01-24T15:17:27.532" v="5358" actId="478"/>
-          <ac:spMkLst>
-            <pc:docMk/>
-            <pc:sldMk cId="3243017373" sldId="340"/>
-            <ac:spMk id="14" creationId="{BF2838A4-10B1-4B0D-9109-02DE7A4EE607}"/>
-          </ac:spMkLst>
-        </pc:spChg>
-        <pc:spChg chg="mod">
-          <ac:chgData name="Castegnaro, Andrea" userId="e719bb20-b48f-4237-97c2-e35c3e0dc9cd" providerId="ADAL" clId="{78304693-7C79-4023-BC7A-18AAB28EFB2B}" dt="2022-01-24T15:15:24.300" v="5146" actId="404"/>
-          <ac:spMkLst>
-            <pc:docMk/>
-            <pc:sldMk cId="3243017373" sldId="340"/>
-            <ac:spMk id="19" creationId="{AE18C425-4419-4851-B7CD-36AE93E65401}"/>
-          </ac:spMkLst>
-        </pc:spChg>
-        <pc:spChg chg="del">
-          <ac:chgData name="Castegnaro, Andrea" userId="e719bb20-b48f-4237-97c2-e35c3e0dc9cd" providerId="ADAL" clId="{78304693-7C79-4023-BC7A-18AAB28EFB2B}" dt="2022-01-24T15:17:27.532" v="5358" actId="478"/>
-          <ac:spMkLst>
-            <pc:docMk/>
-            <pc:sldMk cId="3243017373" sldId="340"/>
-            <ac:spMk id="20" creationId="{8CD09D1C-A44B-4901-9F91-8B55C4781FF4}"/>
-          </ac:spMkLst>
-        </pc:spChg>
-        <pc:spChg chg="mod">
-          <ac:chgData name="Castegnaro, Andrea" userId="e719bb20-b48f-4237-97c2-e35c3e0dc9cd" providerId="ADAL" clId="{78304693-7C79-4023-BC7A-18AAB28EFB2B}" dt="2022-01-24T15:14:50.625" v="5141"/>
-          <ac:spMkLst>
-            <pc:docMk/>
-            <pc:sldMk cId="3243017373" sldId="340"/>
-            <ac:spMk id="21" creationId="{00B36FB0-FD31-4C6D-B6FC-0A2D2E26CF0C}"/>
-          </ac:spMkLst>
-        </pc:spChg>
-        <pc:spChg chg="add mod">
-          <ac:chgData name="Castegnaro, Andrea" userId="e719bb20-b48f-4237-97c2-e35c3e0dc9cd" providerId="ADAL" clId="{78304693-7C79-4023-BC7A-18AAB28EFB2B}" dt="2022-01-24T15:20:50.212" v="5744" actId="1036"/>
-          <ac:spMkLst>
-            <pc:docMk/>
-            <pc:sldMk cId="3243017373" sldId="340"/>
-            <ac:spMk id="22" creationId="{ABDA0CBA-C8E5-4420-BE8B-190D130A6180}"/>
-          </ac:spMkLst>
-        </pc:spChg>
-        <pc:spChg chg="del">
-          <ac:chgData name="Castegnaro, Andrea" userId="e719bb20-b48f-4237-97c2-e35c3e0dc9cd" providerId="ADAL" clId="{78304693-7C79-4023-BC7A-18AAB28EFB2B}" dt="2022-01-24T15:17:27.532" v="5358" actId="478"/>
-          <ac:spMkLst>
-            <pc:docMk/>
-            <pc:sldMk cId="3243017373" sldId="340"/>
-            <ac:spMk id="28" creationId="{91D3111F-9B4A-457A-9549-710FA698F1C3}"/>
-          </ac:spMkLst>
-        </pc:spChg>
-        <pc:spChg chg="mod">
-          <ac:chgData name="Castegnaro, Andrea" userId="e719bb20-b48f-4237-97c2-e35c3e0dc9cd" providerId="ADAL" clId="{78304693-7C79-4023-BC7A-18AAB28EFB2B}" dt="2022-01-24T15:14:40.967" v="5140"/>
-          <ac:spMkLst>
-            <pc:docMk/>
-            <pc:sldMk cId="3243017373" sldId="340"/>
-            <ac:spMk id="34" creationId="{68B92E82-A63B-4C09-B931-88A388D1A866}"/>
-          </ac:spMkLst>
-        </pc:spChg>
-        <pc:spChg chg="mod">
-          <ac:chgData name="Castegnaro, Andrea" userId="e719bb20-b48f-4237-97c2-e35c3e0dc9cd" providerId="ADAL" clId="{78304693-7C79-4023-BC7A-18AAB28EFB2B}" dt="2022-01-24T15:20:42.842" v="5740" actId="14100"/>
-          <ac:spMkLst>
-            <pc:docMk/>
-            <pc:sldMk cId="3243017373" sldId="340"/>
-            <ac:spMk id="37" creationId="{5791EDE9-2ADD-4106-8EEA-DB3CE83DE3CA}"/>
-          </ac:spMkLst>
-        </pc:spChg>
-        <pc:grpChg chg="mod">
-          <ac:chgData name="Castegnaro, Andrea" userId="e719bb20-b48f-4237-97c2-e35c3e0dc9cd" providerId="ADAL" clId="{78304693-7C79-4023-BC7A-18AAB28EFB2B}" dt="2022-01-24T15:20:22.999" v="5737" actId="1036"/>
-          <ac:grpSpMkLst>
-            <pc:docMk/>
-            <pc:sldMk cId="3243017373" sldId="340"/>
-            <ac:grpSpMk id="11" creationId="{0C55BF05-5C6E-4A1C-813D-2AF2DEC9645A}"/>
-          </ac:grpSpMkLst>
-        </pc:grpChg>
-        <pc:grpChg chg="add mod">
-          <ac:chgData name="Castegnaro, Andrea" userId="e719bb20-b48f-4237-97c2-e35c3e0dc9cd" providerId="ADAL" clId="{78304693-7C79-4023-BC7A-18AAB28EFB2B}" dt="2022-01-24T15:19:57.867" v="5722" actId="1076"/>
-          <ac:grpSpMkLst>
-            <pc:docMk/>
-            <pc:sldMk cId="3243017373" sldId="340"/>
-            <ac:grpSpMk id="18" creationId="{825B9E31-C082-40F1-89E8-5F8CCC7E1EF0}"/>
-          </ac:grpSpMkLst>
-        </pc:grpChg>
-        <pc:grpChg chg="del mod">
-          <ac:chgData name="Castegnaro, Andrea" userId="e719bb20-b48f-4237-97c2-e35c3e0dc9cd" providerId="ADAL" clId="{78304693-7C79-4023-BC7A-18AAB28EFB2B}" dt="2022-01-24T15:14:52.957" v="5142" actId="478"/>
-          <ac:grpSpMkLst>
-            <pc:docMk/>
-            <pc:sldMk cId="3243017373" sldId="340"/>
-            <ac:grpSpMk id="33" creationId="{F4500DD2-6D8D-4761-A1F4-E06D35507531}"/>
-          </ac:grpSpMkLst>
-        </pc:grpChg>
-        <pc:cxnChg chg="del">
-          <ac:chgData name="Castegnaro, Andrea" userId="e719bb20-b48f-4237-97c2-e35c3e0dc9cd" providerId="ADAL" clId="{78304693-7C79-4023-BC7A-18AAB28EFB2B}" dt="2022-01-24T15:17:22.627" v="5357" actId="478"/>
-          <ac:cxnSpMkLst>
-            <pc:docMk/>
-            <pc:sldMk cId="3243017373" sldId="340"/>
-            <ac:cxnSpMk id="15" creationId="{71DEF9B2-8E96-41E4-908F-28CA2A3EC04E}"/>
-          </ac:cxnSpMkLst>
-        </pc:cxnChg>
-        <pc:cxnChg chg="del mod">
-          <ac:chgData name="Castegnaro, Andrea" userId="e719bb20-b48f-4237-97c2-e35c3e0dc9cd" providerId="ADAL" clId="{78304693-7C79-4023-BC7A-18AAB28EFB2B}" dt="2022-01-24T15:17:27.532" v="5358" actId="478"/>
-          <ac:cxnSpMkLst>
-            <pc:docMk/>
-            <pc:sldMk cId="3243017373" sldId="340"/>
-            <ac:cxnSpMk id="23" creationId="{71FC1980-73F2-41AC-BBCB-4962193D0F21}"/>
-          </ac:cxnSpMkLst>
-        </pc:cxnChg>
-        <pc:cxnChg chg="del">
-          <ac:chgData name="Castegnaro, Andrea" userId="e719bb20-b48f-4237-97c2-e35c3e0dc9cd" providerId="ADAL" clId="{78304693-7C79-4023-BC7A-18AAB28EFB2B}" dt="2022-01-24T15:17:27.532" v="5358" actId="478"/>
-          <ac:cxnSpMkLst>
-            <pc:docMk/>
-            <pc:sldMk cId="3243017373" sldId="340"/>
-            <ac:cxnSpMk id="26" creationId="{DA9AB0AC-3262-42E4-B5BA-DB5A161CADE9}"/>
-          </ac:cxnSpMkLst>
-        </pc:cxnChg>
-      </pc:sldChg>
-    </pc:docChg>
-  </pc:docChgLst>
-  <pc:docChgLst>
-    <pc:chgData name="Castegnaro, Andrea" userId="e719bb20-b48f-4237-97c2-e35c3e0dc9cd" providerId="ADAL" clId="{6B0B3B43-C1DE-4F71-93A9-FB02E1545C0E}"/>
-    <pc:docChg chg="custSel addSld delSld modSld delMainMaster delSection modSection">
-      <pc:chgData name="Castegnaro, Andrea" userId="e719bb20-b48f-4237-97c2-e35c3e0dc9cd" providerId="ADAL" clId="{6B0B3B43-C1DE-4F71-93A9-FB02E1545C0E}" dt="2022-01-17T15:04:59.362" v="281" actId="700"/>
-      <pc:docMkLst>
-        <pc:docMk/>
-      </pc:docMkLst>
-      <pc:sldChg chg="new del">
-        <pc:chgData name="Castegnaro, Andrea" userId="e719bb20-b48f-4237-97c2-e35c3e0dc9cd" providerId="ADAL" clId="{6B0B3B43-C1DE-4F71-93A9-FB02E1545C0E}" dt="2022-01-13T16:14:43.903" v="1" actId="47"/>
-        <pc:sldMkLst>
-          <pc:docMk/>
-          <pc:sldMk cId="1085287797" sldId="256"/>
-        </pc:sldMkLst>
-      </pc:sldChg>
-      <pc:sldChg chg="modSp mod modTransition">
-        <pc:chgData name="Castegnaro, Andrea" userId="e719bb20-b48f-4237-97c2-e35c3e0dc9cd" providerId="ADAL" clId="{6B0B3B43-C1DE-4F71-93A9-FB02E1545C0E}" dt="2022-01-17T14:56:18.083" v="276" actId="20577"/>
-        <pc:sldMkLst>
-          <pc:docMk/>
-          <pc:sldMk cId="2445713399" sldId="312"/>
-        </pc:sldMkLst>
-        <pc:spChg chg="mod">
-          <ac:chgData name="Castegnaro, Andrea" userId="e719bb20-b48f-4237-97c2-e35c3e0dc9cd" providerId="ADAL" clId="{6B0B3B43-C1DE-4F71-93A9-FB02E1545C0E}" dt="2022-01-13T16:16:57.856" v="81" actId="20577"/>
-          <ac:spMkLst>
-            <pc:docMk/>
-            <pc:sldMk cId="2445713399" sldId="312"/>
-            <ac:spMk id="4" creationId="{28B7D50A-2F55-41BB-89F9-4739DA584FE6}"/>
-          </ac:spMkLst>
-        </pc:spChg>
-        <pc:spChg chg="mod">
-          <ac:chgData name="Castegnaro, Andrea" userId="e719bb20-b48f-4237-97c2-e35c3e0dc9cd" providerId="ADAL" clId="{6B0B3B43-C1DE-4F71-93A9-FB02E1545C0E}" dt="2022-01-17T14:56:18.083" v="276" actId="20577"/>
-          <ac:spMkLst>
-            <pc:docMk/>
-            <pc:sldMk cId="2445713399" sldId="312"/>
-            <ac:spMk id="5" creationId="{C11578D7-67FF-4927-BFF8-8E8235ECAA05}"/>
-          </ac:spMkLst>
-        </pc:spChg>
-      </pc:sldChg>
-      <pc:sldChg chg="modTransition">
-        <pc:chgData name="Castegnaro, Andrea" userId="e719bb20-b48f-4237-97c2-e35c3e0dc9cd" providerId="ADAL" clId="{6B0B3B43-C1DE-4F71-93A9-FB02E1545C0E}" dt="2022-01-13T16:16:32.731" v="64"/>
-        <pc:sldMkLst>
-          <pc:docMk/>
-          <pc:sldMk cId="2471698210" sldId="313"/>
-        </pc:sldMkLst>
-      </pc:sldChg>
-      <pc:sldChg chg="modTransition">
-        <pc:chgData name="Castegnaro, Andrea" userId="e719bb20-b48f-4237-97c2-e35c3e0dc9cd" providerId="ADAL" clId="{6B0B3B43-C1DE-4F71-93A9-FB02E1545C0E}" dt="2022-01-13T16:16:32.731" v="64"/>
-        <pc:sldMkLst>
-          <pc:docMk/>
-          <pc:sldMk cId="839390016" sldId="314"/>
-        </pc:sldMkLst>
-      </pc:sldChg>
-      <pc:sldChg chg="modTransition">
-        <pc:chgData name="Castegnaro, Andrea" userId="e719bb20-b48f-4237-97c2-e35c3e0dc9cd" providerId="ADAL" clId="{6B0B3B43-C1DE-4F71-93A9-FB02E1545C0E}" dt="2022-01-13T16:16:32.731" v="64"/>
-        <pc:sldMkLst>
-          <pc:docMk/>
-          <pc:sldMk cId="2442215223" sldId="315"/>
-        </pc:sldMkLst>
-      </pc:sldChg>
-      <pc:sldChg chg="modTransition">
-        <pc:chgData name="Castegnaro, Andrea" userId="e719bb20-b48f-4237-97c2-e35c3e0dc9cd" providerId="ADAL" clId="{6B0B3B43-C1DE-4F71-93A9-FB02E1545C0E}" dt="2022-01-13T16:16:32.731" v="64"/>
-        <pc:sldMkLst>
-          <pc:docMk/>
-          <pc:sldMk cId="2590270098" sldId="316"/>
-        </pc:sldMkLst>
-      </pc:sldChg>
-      <pc:sldChg chg="modTransition">
-        <pc:chgData name="Castegnaro, Andrea" userId="e719bb20-b48f-4237-97c2-e35c3e0dc9cd" providerId="ADAL" clId="{6B0B3B43-C1DE-4F71-93A9-FB02E1545C0E}" dt="2022-01-13T16:16:32.731" v="64"/>
-        <pc:sldMkLst>
-          <pc:docMk/>
-          <pc:sldMk cId="3996795517" sldId="317"/>
-        </pc:sldMkLst>
-      </pc:sldChg>
-      <pc:sldChg chg="modTransition">
-        <pc:chgData name="Castegnaro, Andrea" userId="e719bb20-b48f-4237-97c2-e35c3e0dc9cd" providerId="ADAL" clId="{6B0B3B43-C1DE-4F71-93A9-FB02E1545C0E}" dt="2022-01-13T16:16:32.731" v="64"/>
-        <pc:sldMkLst>
-          <pc:docMk/>
-          <pc:sldMk cId="2282461073" sldId="319"/>
-        </pc:sldMkLst>
-      </pc:sldChg>
-      <pc:sldChg chg="addSp delSp modSp add mod chgLayout">
-        <pc:chgData name="Castegnaro, Andrea" userId="e719bb20-b48f-4237-97c2-e35c3e0dc9cd" providerId="ADAL" clId="{6B0B3B43-C1DE-4F71-93A9-FB02E1545C0E}" dt="2022-01-17T15:04:59.362" v="281" actId="700"/>
-        <pc:sldMkLst>
-          <pc:docMk/>
-          <pc:sldMk cId="3098246948" sldId="320"/>
-        </pc:sldMkLst>
-        <pc:spChg chg="add del mod">
-          <ac:chgData name="Castegnaro, Andrea" userId="e719bb20-b48f-4237-97c2-e35c3e0dc9cd" providerId="ADAL" clId="{6B0B3B43-C1DE-4F71-93A9-FB02E1545C0E}" dt="2022-01-17T15:04:48.896" v="280" actId="478"/>
-          <ac:spMkLst>
-            <pc:docMk/>
-            <pc:sldMk cId="3098246948" sldId="320"/>
-            <ac:spMk id="3" creationId="{D77B2032-27A6-421C-B685-217E81A6130A}"/>
-          </ac:spMkLst>
-        </pc:spChg>
-        <pc:spChg chg="del">
-          <ac:chgData name="Castegnaro, Andrea" userId="e719bb20-b48f-4237-97c2-e35c3e0dc9cd" providerId="ADAL" clId="{6B0B3B43-C1DE-4F71-93A9-FB02E1545C0E}" dt="2022-01-17T15:04:43.587" v="278" actId="478"/>
-          <ac:spMkLst>
-            <pc:docMk/>
-            <pc:sldMk cId="3098246948" sldId="320"/>
-            <ac:spMk id="4" creationId="{28B7D50A-2F55-41BB-89F9-4739DA584FE6}"/>
-          </ac:spMkLst>
-        </pc:spChg>
-        <pc:spChg chg="del">
-          <ac:chgData name="Castegnaro, Andrea" userId="e719bb20-b48f-4237-97c2-e35c3e0dc9cd" providerId="ADAL" clId="{6B0B3B43-C1DE-4F71-93A9-FB02E1545C0E}" dt="2022-01-17T15:04:46.927" v="279" actId="478"/>
-          <ac:spMkLst>
-            <pc:docMk/>
-            <pc:sldMk cId="3098246948" sldId="320"/>
-            <ac:spMk id="5" creationId="{C11578D7-67FF-4927-BFF8-8E8235ECAA05}"/>
-          </ac:spMkLst>
-        </pc:spChg>
-        <pc:spChg chg="add mod">
-          <ac:chgData name="Castegnaro, Andrea" userId="e719bb20-b48f-4237-97c2-e35c3e0dc9cd" providerId="ADAL" clId="{6B0B3B43-C1DE-4F71-93A9-FB02E1545C0E}" dt="2022-01-17T15:04:59.362" v="281" actId="700"/>
-          <ac:spMkLst>
-            <pc:docMk/>
-            <pc:sldMk cId="3098246948" sldId="320"/>
-            <ac:spMk id="6" creationId="{626B5DB5-B551-48F4-9907-E9D1AB17A470}"/>
-          </ac:spMkLst>
-        </pc:spChg>
-        <pc:spChg chg="add mod">
-          <ac:chgData name="Castegnaro, Andrea" userId="e719bb20-b48f-4237-97c2-e35c3e0dc9cd" providerId="ADAL" clId="{6B0B3B43-C1DE-4F71-93A9-FB02E1545C0E}" dt="2022-01-17T15:04:59.362" v="281" actId="700"/>
-          <ac:spMkLst>
-            <pc:docMk/>
-            <pc:sldMk cId="3098246948" sldId="320"/>
-            <ac:spMk id="7" creationId="{54CD5984-D0C0-4B4F-AC0A-2376ABCE0754}"/>
-          </ac:spMkLst>
-        </pc:spChg>
-      </pc:sldChg>
-      <pc:sldMasterChg chg="del addSldLayout delSldLayout">
-        <pc:chgData name="Castegnaro, Andrea" userId="e719bb20-b48f-4237-97c2-e35c3e0dc9cd" providerId="ADAL" clId="{6B0B3B43-C1DE-4F71-93A9-FB02E1545C0E}" dt="2022-01-13T16:14:43.903" v="1" actId="47"/>
-        <pc:sldMasterMkLst>
-          <pc:docMk/>
-          <pc:sldMasterMk cId="648575456" sldId="2147483648"/>
-        </pc:sldMasterMkLst>
-        <pc:sldLayoutChg chg="add del">
-          <pc:chgData name="Castegnaro, Andrea" userId="e719bb20-b48f-4237-97c2-e35c3e0dc9cd" providerId="ADAL" clId="{6B0B3B43-C1DE-4F71-93A9-FB02E1545C0E}" dt="2022-01-13T16:14:43.903" v="1" actId="47"/>
-          <pc:sldLayoutMkLst>
-            <pc:docMk/>
-            <pc:sldMasterMk cId="648575456" sldId="2147483648"/>
-            <pc:sldLayoutMk cId="1339338325" sldId="2147483649"/>
-          </pc:sldLayoutMkLst>
-        </pc:sldLayoutChg>
-      </pc:sldMasterChg>
     </pc:docChg>
   </pc:docChgLst>
 </pc:chgInfo>
@@ -8296,7 +8296,12 @@
             <p:ph type="title"/>
           </p:nvPr>
         </p:nvSpPr>
-        <p:spPr/>
+        <p:spPr>
+          <a:xfrm>
+            <a:off x="786442" y="845389"/>
+            <a:ext cx="10619117" cy="1380226"/>
+          </a:xfrm>
+        </p:spPr>
         <p:txBody>
           <a:bodyPr>
             <a:noAutofit/>
@@ -8306,14 +8311,21 @@
             <a:pPr algn="ctr"/>
             <a:r>
               <a:rPr lang="en-GB" sz="3200" dirty="0"/>
-              <a:t>Psychophysics Toolbox (PTB) – a gentle introduction </a:t>
+              <a:t>Psychophysics Toolbox (PTB)</a:t>
             </a:r>
             <a:br>
               <a:rPr lang="en-GB" sz="3200" dirty="0"/>
             </a:br>
             <a:r>
               <a:rPr lang="en-GB" sz="3200" dirty="0"/>
-              <a:t>(part one)</a:t>
+              <a:t>A Gentle Introduction </a:t>
+            </a:r>
+            <a:br>
+              <a:rPr lang="en-GB" sz="3200" dirty="0"/>
+            </a:br>
+            <a:r>
+              <a:rPr lang="en-GB" sz="3200" dirty="0"/>
+              <a:t>(Part One)</a:t>
             </a:r>
           </a:p>
         </p:txBody>
@@ -8342,9 +8354,21 @@
         </p:spPr>
         <p:txBody>
           <a:bodyPr>
-            <a:normAutofit/>
+            <a:normAutofit lnSpcReduction="10000"/>
           </a:bodyPr>
           <a:lstStyle/>
+          <a:p>
+            <a:pPr marL="0" indent="0" algn="ctr">
+              <a:buNone/>
+            </a:pPr>
+            <a:endParaRPr lang="en-GB" dirty="0"/>
+          </a:p>
+          <a:p>
+            <a:pPr marL="0" indent="0" algn="ctr">
+              <a:buNone/>
+            </a:pPr>
+            <a:endParaRPr lang="en-GB" dirty="0"/>
+          </a:p>
           <a:p>
             <a:pPr marL="0" indent="0" algn="ctr">
               <a:buNone/>
@@ -8978,7 +9002,7 @@
             </a:pPr>
             <a:r>
               <a:rPr lang="en-GB" sz="1800" dirty="0"/>
-              <a:t>Time in seconds since the start of the script execution </a:t>
+              <a:t>Time in seconds since the start of script execution </a:t>
             </a:r>
           </a:p>
         </p:txBody>
@@ -9043,8 +9067,8 @@
         </p:nvSpPr>
         <p:spPr>
           <a:xfrm>
-            <a:off x="7170003" y="3220326"/>
-            <a:ext cx="2915900" cy="1034798"/>
+            <a:off x="7170002" y="3220326"/>
+            <a:ext cx="3096627" cy="1034798"/>
           </a:xfrm>
           <a:prstGeom prst="rect">
             <a:avLst/>
@@ -9225,7 +9249,7 @@
             </a:pPr>
             <a:r>
               <a:rPr lang="en-GB" sz="1800" dirty="0"/>
-              <a:t>Time in seconds we want to wait script execution</a:t>
+              <a:t>Time in seconds we want to wait during script execution</a:t>
             </a:r>
           </a:p>
         </p:txBody>
@@ -9428,7 +9452,7 @@
             </a:pPr>
             <a:r>
               <a:rPr lang="en-GB" sz="1800" dirty="0"/>
-              <a:t>To instead getting the time at a specific point in the script execution</a:t>
+              <a:t>Alternatively, to ‘read’ the time at any specific point in the script execution</a:t>
             </a:r>
           </a:p>
         </p:txBody>
@@ -9621,13 +9645,13 @@
   <p:clrMapOvr>
     <a:masterClrMapping/>
   </p:clrMapOvr>
-  <mc:AlternateContent xmlns:mc="http://schemas.openxmlformats.org/markup-compatibility/2006">
-    <mc:Choice xmlns:p14="http://schemas.microsoft.com/office/powerpoint/2010/main" Requires="p14">
+  <mc:AlternateContent xmlns:mc="http://schemas.openxmlformats.org/markup-compatibility/2006" xmlns:p14="http://schemas.microsoft.com/office/powerpoint/2010/main">
+    <mc:Choice Requires="p14">
       <p:transition spd="med" p14:dur="700">
         <p:fade/>
       </p:transition>
     </mc:Choice>
-    <mc:Fallback>
+    <mc:Fallback xmlns="">
       <p:transition spd="med">
         <p:fade/>
       </p:transition>
@@ -9653,6 +9677,98 @@
           <a:chExt cx="0" cy="0"/>
         </a:xfrm>
       </p:grpSpPr>
+      <p:grpSp>
+        <p:nvGrpSpPr>
+          <p:cNvPr id="30" name="Group 29">
+            <a:extLst>
+              <a:ext uri="{FF2B5EF4-FFF2-40B4-BE49-F238E27FC236}">
+                <a16:creationId xmlns:a16="http://schemas.microsoft.com/office/drawing/2014/main" id="{8B1AA5C4-B190-4DB5-871D-4356893DFE53}"/>
+              </a:ext>
+            </a:extLst>
+          </p:cNvPr>
+          <p:cNvGrpSpPr/>
+          <p:nvPr/>
+        </p:nvGrpSpPr>
+        <p:grpSpPr>
+          <a:xfrm>
+            <a:off x="8437500" y="4181077"/>
+            <a:ext cx="2868110" cy="2670772"/>
+            <a:chOff x="8437500" y="4181077"/>
+            <a:chExt cx="2868110" cy="2670772"/>
+          </a:xfrm>
+        </p:grpSpPr>
+        <p:pic>
+          <p:nvPicPr>
+            <p:cNvPr id="34" name="Picture 33" descr="A picture containing text, shoji&#10;&#10;Description automatically generated">
+              <a:extLst>
+                <a:ext uri="{FF2B5EF4-FFF2-40B4-BE49-F238E27FC236}">
+                  <a16:creationId xmlns:a16="http://schemas.microsoft.com/office/drawing/2014/main" id="{65659D29-381B-4FBF-9D0D-9E17B6E0B25E}"/>
+                </a:ext>
+              </a:extLst>
+            </p:cNvPr>
+            <p:cNvPicPr>
+              <a:picLocks noChangeAspect="1"/>
+            </p:cNvPicPr>
+            <p:nvPr/>
+          </p:nvPicPr>
+          <p:blipFill>
+            <a:blip r:embed="rId2">
+              <a:extLst>
+                <a:ext uri="{28A0092B-C50C-407E-A947-70E740481C1C}">
+                  <a14:useLocalDpi xmlns:a14="http://schemas.microsoft.com/office/drawing/2010/main" val="0"/>
+                </a:ext>
+              </a:extLst>
+            </a:blip>
+            <a:stretch>
+              <a:fillRect/>
+            </a:stretch>
+          </p:blipFill>
+          <p:spPr>
+            <a:xfrm>
+              <a:off x="8506960" y="4181077"/>
+              <a:ext cx="2798650" cy="2670772"/>
+            </a:xfrm>
+            <a:prstGeom prst="rect">
+              <a:avLst/>
+            </a:prstGeom>
+          </p:spPr>
+        </p:pic>
+        <p:sp>
+          <p:nvSpPr>
+            <p:cNvPr id="33" name="TextBox 32">
+              <a:extLst>
+                <a:ext uri="{FF2B5EF4-FFF2-40B4-BE49-F238E27FC236}">
+                  <a16:creationId xmlns:a16="http://schemas.microsoft.com/office/drawing/2014/main" id="{C6BEE785-4666-4356-9903-DD6A1FC5CA43}"/>
+                </a:ext>
+              </a:extLst>
+            </p:cNvPr>
+            <p:cNvSpPr txBox="1"/>
+            <p:nvPr/>
+          </p:nvSpPr>
+          <p:spPr>
+            <a:xfrm>
+              <a:off x="8437500" y="4432204"/>
+              <a:ext cx="759935" cy="307777"/>
+            </a:xfrm>
+            <a:prstGeom prst="rect">
+              <a:avLst/>
+            </a:prstGeom>
+            <a:noFill/>
+          </p:spPr>
+          <p:txBody>
+            <a:bodyPr wrap="square">
+              <a:spAutoFit/>
+            </a:bodyPr>
+            <a:lstStyle/>
+            <a:p>
+              <a:r>
+                <a:rPr lang="en-GB" sz="1400" dirty="0"/>
+                <a:t>(0,0)</a:t>
+              </a:r>
+            </a:p>
+          </p:txBody>
+        </p:sp>
+      </p:grpSp>
       <p:sp>
         <p:nvSpPr>
           <p:cNvPr id="2" name="Title 1">
@@ -9719,7 +9835,7 @@
             </a:pPr>
             <a:r>
               <a:rPr lang="en-GB" sz="1700" dirty="0"/>
-              <a:t>Opening a window requires initialization of graphics (e.g. checking OpenGL availability), peripherals (e.g. keyboard), audios. This can be easily performed by doing</a:t>
+              <a:t>Opening a window requires initialization of graphics (e.g. checking OpenGL availability), peripherals (e.g. keyboard), audio This can be easily performed by executing:</a:t>
             </a:r>
             <a:endParaRPr lang="en-GB" sz="1600" dirty="0"/>
           </a:p>
@@ -10509,7 +10625,7 @@
         <p:spPr>
           <a:xfrm>
             <a:off x="8391816" y="3698038"/>
-            <a:ext cx="3169321" cy="584775"/>
+            <a:ext cx="3169321" cy="830997"/>
           </a:xfrm>
           <a:prstGeom prst="rect">
             <a:avLst/>
@@ -10599,6 +10715,9 @@
               </a:rPr>
               <a:t>screen coordinates</a:t>
             </a:r>
+          </a:p>
+          <a:p>
+            <a:pPr algn="ctr"/>
             <a:endParaRPr lang="en-GB" sz="1600" b="1" dirty="0"/>
           </a:p>
         </p:txBody>
@@ -10666,98 +10785,6 @@
           </a:p>
         </p:txBody>
       </p:sp>
-      <p:grpSp>
-        <p:nvGrpSpPr>
-          <p:cNvPr id="30" name="Group 29">
-            <a:extLst>
-              <a:ext uri="{FF2B5EF4-FFF2-40B4-BE49-F238E27FC236}">
-                <a16:creationId xmlns:a16="http://schemas.microsoft.com/office/drawing/2014/main" id="{8B1AA5C4-B190-4DB5-871D-4356893DFE53}"/>
-              </a:ext>
-            </a:extLst>
-          </p:cNvPr>
-          <p:cNvGrpSpPr/>
-          <p:nvPr/>
-        </p:nvGrpSpPr>
-        <p:grpSpPr>
-          <a:xfrm>
-            <a:off x="8437500" y="4181077"/>
-            <a:ext cx="2868110" cy="2670772"/>
-            <a:chOff x="8437500" y="4181077"/>
-            <a:chExt cx="2868110" cy="2670772"/>
-          </a:xfrm>
-        </p:grpSpPr>
-        <p:pic>
-          <p:nvPicPr>
-            <p:cNvPr id="34" name="Picture 33" descr="A picture containing text, shoji&#10;&#10;Description automatically generated">
-              <a:extLst>
-                <a:ext uri="{FF2B5EF4-FFF2-40B4-BE49-F238E27FC236}">
-                  <a16:creationId xmlns:a16="http://schemas.microsoft.com/office/drawing/2014/main" id="{65659D29-381B-4FBF-9D0D-9E17B6E0B25E}"/>
-                </a:ext>
-              </a:extLst>
-            </p:cNvPr>
-            <p:cNvPicPr>
-              <a:picLocks noChangeAspect="1"/>
-            </p:cNvPicPr>
-            <p:nvPr/>
-          </p:nvPicPr>
-          <p:blipFill>
-            <a:blip r:embed="rId2">
-              <a:extLst>
-                <a:ext uri="{28A0092B-C50C-407E-A947-70E740481C1C}">
-                  <a14:useLocalDpi xmlns:a14="http://schemas.microsoft.com/office/drawing/2010/main" val="0"/>
-                </a:ext>
-              </a:extLst>
-            </a:blip>
-            <a:stretch>
-              <a:fillRect/>
-            </a:stretch>
-          </p:blipFill>
-          <p:spPr>
-            <a:xfrm>
-              <a:off x="8506960" y="4181077"/>
-              <a:ext cx="2798650" cy="2670772"/>
-            </a:xfrm>
-            <a:prstGeom prst="rect">
-              <a:avLst/>
-            </a:prstGeom>
-          </p:spPr>
-        </p:pic>
-        <p:sp>
-          <p:nvSpPr>
-            <p:cNvPr id="33" name="TextBox 32">
-              <a:extLst>
-                <a:ext uri="{FF2B5EF4-FFF2-40B4-BE49-F238E27FC236}">
-                  <a16:creationId xmlns:a16="http://schemas.microsoft.com/office/drawing/2014/main" id="{C6BEE785-4666-4356-9903-DD6A1FC5CA43}"/>
-                </a:ext>
-              </a:extLst>
-            </p:cNvPr>
-            <p:cNvSpPr txBox="1"/>
-            <p:nvPr/>
-          </p:nvSpPr>
-          <p:spPr>
-            <a:xfrm>
-              <a:off x="8437500" y="4432204"/>
-              <a:ext cx="759935" cy="307777"/>
-            </a:xfrm>
-            <a:prstGeom prst="rect">
-              <a:avLst/>
-            </a:prstGeom>
-            <a:noFill/>
-          </p:spPr>
-          <p:txBody>
-            <a:bodyPr wrap="square">
-              <a:spAutoFit/>
-            </a:bodyPr>
-            <a:lstStyle/>
-            <a:p>
-              <a:r>
-                <a:rPr lang="en-GB" sz="1400" dirty="0"/>
-                <a:t>(0,0)</a:t>
-              </a:r>
-            </a:p>
-          </p:txBody>
-        </p:sp>
-      </p:grpSp>
       <p:sp>
         <p:nvSpPr>
           <p:cNvPr id="37" name="Rectangle 36">
@@ -11244,7 +11271,7 @@
           <a:p>
             <a:r>
               <a:rPr lang="en-GB" dirty="0"/>
-              <a:t>Drawing shapes – example 3/4</a:t>
+              <a:t>Drawing shapes – examples 3/4</a:t>
             </a:r>
           </a:p>
         </p:txBody>
@@ -12265,7 +12292,7 @@
         </p:blipFill>
         <p:spPr>
           <a:xfrm>
-            <a:off x="8639802" y="567254"/>
+            <a:off x="9128685" y="567254"/>
             <a:ext cx="995719" cy="995719"/>
           </a:xfrm>
           <a:prstGeom prst="rect">
@@ -12495,7 +12522,7 @@
           <a:p>
             <a:r>
               <a:rPr lang="en-GB" dirty="0"/>
-              <a:t>Drawing shapes – example 5/6</a:t>
+              <a:t>Drawing shapes – examples 5/6</a:t>
             </a:r>
           </a:p>
         </p:txBody>
@@ -13465,10 +13492,10 @@
       </p:sp>
       <p:pic>
         <p:nvPicPr>
-          <p:cNvPr id="33" name="Graphic 32" descr="Basic Shapes outline">
+          <p:cNvPr id="30" name="Graphic 29" descr="Basic Shapes outline">
             <a:extLst>
               <a:ext uri="{FF2B5EF4-FFF2-40B4-BE49-F238E27FC236}">
-                <a16:creationId xmlns:a16="http://schemas.microsoft.com/office/drawing/2014/main" id="{9D2BB5CC-B830-4007-85FF-34E2D985C0DA}"/>
+                <a16:creationId xmlns:a16="http://schemas.microsoft.com/office/drawing/2014/main" id="{64E2C65D-0799-4237-AA6E-3DD04A8C0502}"/>
               </a:ext>
             </a:extLst>
           </p:cNvPr>
@@ -13494,7 +13521,7 @@
         </p:blipFill>
         <p:spPr>
           <a:xfrm>
-            <a:off x="8639802" y="567254"/>
+            <a:off x="9128685" y="567254"/>
             <a:ext cx="995719" cy="995719"/>
           </a:xfrm>
           <a:prstGeom prst="rect">
@@ -13572,7 +13599,7 @@
           <a:p>
             <a:r>
               <a:rPr lang="en-GB" dirty="0"/>
-              <a:t>Drawing images – example 7/8</a:t>
+              <a:t>Drawing images – examples 7/8</a:t>
             </a:r>
           </a:p>
         </p:txBody>
@@ -14604,7 +14631,7 @@
         </p:blipFill>
         <p:spPr>
           <a:xfrm>
-            <a:off x="8721933" y="726616"/>
+            <a:off x="9002588" y="726616"/>
             <a:ext cx="914400" cy="914400"/>
           </a:xfrm>
           <a:prstGeom prst="rect">
@@ -14888,7 +14915,16 @@
             </a:r>
             <a:r>
               <a:rPr lang="en-GB" sz="1800" dirty="0"/>
-              <a:t> are the coordinates of the cursor after the last drawn character. Getting the final cursor 	might be useful when wanting to display more text in more than in ‘flip’.</a:t>
+              <a:t> are the coordinates of the cursor after the last drawn character </a:t>
+            </a:r>
+          </a:p>
+          <a:p>
+            <a:pPr marL="0" indent="0">
+              <a:buNone/>
+            </a:pPr>
+            <a:r>
+              <a:rPr lang="en-GB" sz="1800" dirty="0"/>
+              <a:t>	Getting the final cursor might be useful when wanting to display more text, later on</a:t>
             </a:r>
           </a:p>
           <a:p>
@@ -15012,15 +15048,7 @@
             </a:r>
             <a:r>
               <a:rPr lang="en-GB" sz="1800" dirty="0"/>
-              <a:t> are the coordinates of the rectangle that enclose the entire text, useful to display </a:t>
-            </a:r>
-            <a:r>
-              <a:rPr lang="en-GB" sz="1800" dirty="0" err="1"/>
-              <a:t>obejcts</a:t>
-            </a:r>
-            <a:r>
-              <a:rPr lang="en-GB" sz="1800" dirty="0"/>
-              <a:t> around 	the text</a:t>
+              <a:t> are the coordinates of the rectangle that enclose the entire text, useful to display objects around 	the text</a:t>
             </a:r>
             <a:endParaRPr lang="en-GB" sz="1800" i="1" dirty="0"/>
           </a:p>
@@ -15943,7 +15971,7 @@
             </a:pPr>
             <a:r>
               <a:rPr lang="en-GB" sz="1800" dirty="0"/>
-              <a:t>Waiting for a keyboard press. This function stop the execution of the current script waiting for a keyboard press</a:t>
+              <a:t>This function stop the execution of the current script to wait for a keyboard press</a:t>
             </a:r>
             <a:endParaRPr lang="en-GB" sz="2000" dirty="0"/>
           </a:p>
@@ -15969,7 +15997,7 @@
         </p:nvGrpSpPr>
         <p:grpSpPr>
           <a:xfrm>
-            <a:off x="5558785" y="2408585"/>
+            <a:off x="5558785" y="2272785"/>
             <a:ext cx="1074429" cy="391448"/>
             <a:chOff x="1853057" y="2225615"/>
             <a:chExt cx="8485885" cy="407555"/>
@@ -16469,7 +16497,7 @@
         <p:spPr>
           <a:xfrm>
             <a:off x="977775" y="4669587"/>
-            <a:ext cx="2906162" cy="1323439"/>
+            <a:ext cx="2906162" cy="830997"/>
           </a:xfrm>
           <a:prstGeom prst="rect">
             <a:avLst/>
@@ -16484,7 +16512,7 @@
           <a:p>
             <a:r>
               <a:rPr lang="en-GB" sz="1600" dirty="0"/>
-              <a:t>A number indicating whether the key is been pressed 0 or release the pointer to the PTB window where we want to draw our line</a:t>
+              <a:t>A number indicating whether the key has been pressed (0) or released (1)</a:t>
             </a:r>
           </a:p>
         </p:txBody>
@@ -16851,7 +16879,7 @@
             </a:pPr>
             <a:r>
               <a:rPr lang="en-GB" sz="1800" dirty="0"/>
-              <a:t>To check the current key indices – key names mapping PTB uses for a system you can simply write</a:t>
+              <a:t>To check the current key indices (i.e. the key mapping PTB uses for any system) you can simply write:</a:t>
             </a:r>
             <a:endParaRPr lang="en-GB" sz="2000" dirty="0"/>
           </a:p>
@@ -17060,7 +17088,15 @@
             </a:pPr>
             <a:r>
               <a:rPr lang="en-GB" sz="1800" dirty="0"/>
-              <a:t>To check a single association between key name and key code you can run the same by providing either or the other.</a:t>
+              <a:t>To check a single association between key name and key code you can run the same function, providing either the name or code (</a:t>
+            </a:r>
+            <a:r>
+              <a:rPr lang="en-GB" sz="1800"/>
+              <a:t>and receiving the </a:t>
+            </a:r>
+            <a:r>
+              <a:rPr lang="en-GB" sz="1800" dirty="0"/>
+              <a:t>other as output):</a:t>
             </a:r>
           </a:p>
         </p:txBody>
@@ -17629,13 +17665,13 @@
   <p:clrMapOvr>
     <a:masterClrMapping/>
   </p:clrMapOvr>
-  <mc:AlternateContent xmlns:mc="http://schemas.openxmlformats.org/markup-compatibility/2006">
-    <mc:Choice xmlns:p14="http://schemas.microsoft.com/office/powerpoint/2010/main" Requires="p14">
+  <mc:AlternateContent xmlns:mc="http://schemas.openxmlformats.org/markup-compatibility/2006" xmlns:p14="http://schemas.microsoft.com/office/powerpoint/2010/main">
+    <mc:Choice Requires="p14">
       <p:transition spd="med" p14:dur="700">
         <p:fade/>
       </p:transition>
     </mc:Choice>
-    <mc:Fallback>
+    <mc:Fallback xmlns="">
       <p:transition spd="med">
         <p:fade/>
       </p:transition>
@@ -17728,7 +17764,7 @@
             </a:pPr>
             <a:r>
               <a:rPr lang="en-GB" sz="2800" dirty="0"/>
-              <a:t>Any questions or clarification?</a:t>
+              <a:t>Any questions or clarifications?</a:t>
             </a:r>
           </a:p>
           <a:p>
@@ -17761,7 +17797,7 @@
             </a:pPr>
             <a:r>
               <a:rPr lang="en-GB" sz="2000" dirty="0"/>
-              <a:t>In the course webpage (</a:t>
+              <a:t>On the course webpage (</a:t>
             </a:r>
             <a:r>
               <a:rPr lang="en-GB" sz="2000" b="0" i="0" dirty="0">
@@ -17776,7 +17812,7 @@
             </a:r>
             <a:r>
               <a:rPr lang="en-GB" sz="2000" dirty="0"/>
-              <a:t>) there is a challenge for you to be built over the course of these two lectures. The idea is for you to build a full “game” using PTB.</a:t>
+              <a:t>) there is an exercise, for you to build a full “game” over the course of these two lectures using PTB</a:t>
             </a:r>
           </a:p>
           <a:p>
@@ -17791,7 +17827,7 @@
             </a:pPr>
             <a:r>
               <a:rPr lang="en-GB" sz="2000" dirty="0"/>
-              <a:t>A description of the challenge can be found in the </a:t>
+              <a:t>A description of the exercise can be found in the </a:t>
             </a:r>
             <a:r>
               <a:rPr lang="en-GB" sz="2000" i="1" dirty="0" err="1"/>
@@ -17803,7 +17839,7 @@
             </a:r>
             <a:r>
               <a:rPr lang="en-GB" sz="2000" dirty="0"/>
-              <a:t>document.</a:t>
+              <a:t>document</a:t>
             </a:r>
           </a:p>
           <a:p>
@@ -17833,7 +17869,7 @@
             </a:pPr>
             <a:r>
               <a:rPr lang="en-GB" sz="2000" dirty="0"/>
-              <a:t>And please don’t hesitate to contact me if you want to ask any ques</a:t>
+              <a:t>Please don’t hesitate to contact me if you want to ask any questions</a:t>
             </a:r>
           </a:p>
         </p:txBody>
@@ -17866,7 +17902,7 @@
         </p:blipFill>
         <p:spPr>
           <a:xfrm>
-            <a:off x="10568792" y="3897874"/>
+            <a:off x="10568792" y="4513510"/>
             <a:ext cx="859773" cy="979956"/>
           </a:xfrm>
           <a:prstGeom prst="rect">
@@ -17884,13 +17920,13 @@
   <p:clrMapOvr>
     <a:masterClrMapping/>
   </p:clrMapOvr>
-  <mc:AlternateContent xmlns:mc="http://schemas.openxmlformats.org/markup-compatibility/2006">
-    <mc:Choice xmlns:p14="http://schemas.microsoft.com/office/powerpoint/2010/main" Requires="p14">
+  <mc:AlternateContent xmlns:mc="http://schemas.openxmlformats.org/markup-compatibility/2006" xmlns:p14="http://schemas.microsoft.com/office/powerpoint/2010/main">
+    <mc:Choice Requires="p14">
       <p:transition spd="med" p14:dur="700">
         <p:fade/>
       </p:transition>
     </mc:Choice>
-    <mc:Fallback>
+    <mc:Fallback xmlns="">
       <p:transition spd="med">
         <p:fade/>
       </p:transition>
@@ -17988,7 +18024,7 @@
             </a:pPr>
             <a:r>
               <a:rPr lang="en-GB" dirty="0"/>
-              <a:t>Necessity for having an accurate and flexible control over stimulus presentation (e.g. visuals and auditory)</a:t>
+              <a:t>Necessary for having an accurate and flexible control over stimulus presentation (e.g. visuals and auditory)</a:t>
             </a:r>
           </a:p>
           <a:p>
@@ -18015,15 +18051,7 @@
             </a:pPr>
             <a:r>
               <a:rPr lang="en-GB" dirty="0"/>
-              <a:t>Requires low-level programming operations: usually made using C++ for managing </a:t>
-            </a:r>
-            <a:r>
-              <a:rPr lang="en-GB" dirty="0" err="1"/>
-              <a:t>periphericals</a:t>
-            </a:r>
-            <a:r>
-              <a:rPr lang="en-GB" dirty="0"/>
-              <a:t> (e.g. keyboard) and sound, or using OpenGL for managing graphics libraries to display shapes/images/video</a:t>
+              <a:t>Requires low-level programming operations: usually made using C++ for managing peripherals (e.g. keyboard) and sound, or using OpenGL for managing graphics libraries to display shapes/images/video</a:t>
             </a:r>
           </a:p>
           <a:p>
@@ -19471,7 +19499,7 @@
             </a:pPr>
             <a:r>
               <a:rPr lang="en-GB" sz="2200" dirty="0"/>
-              <a:t>Opening a transparent window in PTB letting mouse clicks to go beyond the PTB window (useful when working on a single screen to access </a:t>
+              <a:t>Opening a transparent window in PTB allows mouse clicks to be registered outside of the PTB window (useful when working on a single screen to access </a:t>
             </a:r>
             <a:r>
               <a:rPr lang="en-GB" sz="2200" dirty="0" err="1"/>
@@ -19622,7 +19650,7 @@
             </a:r>
             <a:r>
               <a:rPr lang="en-GB" sz="2200" dirty="0"/>
-              <a:t>for getting high level description of any API</a:t>
+              <a:t>to get a high level description of any API</a:t>
             </a:r>
           </a:p>
           <a:p>
@@ -19658,12 +19686,8 @@
               <a:t>Some PTB functions are nested with sub-functions. Type “</a:t>
             </a:r>
             <a:r>
-              <a:rPr lang="en-GB" sz="2200" dirty="0" err="1"/>
-              <a:t>f</a:t>
-            </a:r>
-            <a:r>
               <a:rPr lang="en-GB" sz="2200" i="1" dirty="0" err="1"/>
-              <a:t>unctionName</a:t>
+              <a:t>functionName</a:t>
             </a:r>
             <a:r>
               <a:rPr lang="en-GB" sz="2200" i="1" dirty="0"/>
@@ -19679,7 +19703,7 @@
             </a:r>
             <a:r>
               <a:rPr lang="en-GB" sz="2200" dirty="0"/>
-              <a:t>for getting a description of sub-functions</a:t>
+              <a:t>to get a description of sub-functions</a:t>
             </a:r>
           </a:p>
           <a:p>
@@ -20230,7 +20254,7 @@
             </a:pPr>
             <a:r>
               <a:rPr lang="en-GB" sz="2000" dirty="0"/>
-              <a:t>Try/catch statement is your best friend here</a:t>
+              <a:t>The try / catch statement is your best friend here</a:t>
             </a:r>
           </a:p>
           <a:p>
@@ -20466,25 +20490,7 @@
                   </a:solidFill>
                   <a:latin typeface="Menlo"/>
                 </a:rPr>
-                <a:t>the error will be ‘</a:t>
-              </a:r>
-              <a:r>
-                <a:rPr lang="en-GB" sz="1600" dirty="0" err="1">
-                  <a:solidFill>
-                    <a:srgbClr val="228B22"/>
-                  </a:solidFill>
-                  <a:latin typeface="Menlo"/>
-                </a:rPr>
-                <a:t>catched</a:t>
-              </a:r>
-              <a:r>
-                <a:rPr lang="en-GB" sz="1600" dirty="0">
-                  <a:solidFill>
-                    <a:srgbClr val="228B22"/>
-                  </a:solidFill>
-                  <a:latin typeface="Menlo"/>
-                </a:rPr>
-                <a:t>’ and only then the catch block will be executed. ME is a struct containing all the information about the error raised in the try block.</a:t>
+                <a:t>the error will be ‘caught’ and only then the catch block will be executed. ME is a struct containing all the information about the error raised in the try block.</a:t>
               </a:r>
             </a:p>
             <a:p>
@@ -20553,7 +20559,7 @@
                   </a:solidFill>
                   <a:latin typeface="Menlo"/>
                 </a:rPr>
-                <a:t>% Usually we want to understand what error we encountered so we ‘rethrow’. This will make the script execution to stop and the error will be placed in the command window (as usual)</a:t>
+                <a:t>% Usually we want to understand what error we encountered so we ‘rethrow’. This will make the script execution stop and display the error in the command window (as usual)</a:t>
               </a:r>
             </a:p>
             <a:p>
@@ -21578,7 +21584,7 @@
             </a:pPr>
             <a:r>
               <a:rPr lang="en-GB" sz="1800" dirty="0"/>
-              <a:t>The function will place the objects on the back-buffer to the front-buffer and at the same time 	will clear the back-buffer enabling us to prepare the next screen.</a:t>
+              <a:t>This function will move the objects on the back-buffer to the front-buffer and at the same time 	clear the back-buffer, enabling us to prepare the next screen.</a:t>
             </a:r>
           </a:p>
         </p:txBody>
@@ -21887,7 +21893,7 @@
             </a:pPr>
             <a:r>
               <a:rPr lang="en-GB" sz="1800" dirty="0"/>
-              <a:t>The reason ‘flipping’ cannot happen at any time is because it needs to happen accordingly to the refresh capability of the monitor. </a:t>
+              <a:t>The reason ‘flipping’ cannot occur at any time is because it needs to be scheduled by the refresh capability of the monitor. </a:t>
             </a:r>
           </a:p>
           <a:p>
@@ -21897,7 +21903,7 @@
             </a:pPr>
             <a:r>
               <a:rPr lang="en-GB" sz="1800" dirty="0"/>
-              <a:t>Refresh rate is measure in Hz indicating how many refreshes a monitor can make in a second.</a:t>
+              <a:t>Refresh rate is measured in Hz indicating how many refreshes a monitor can make in a second</a:t>
             </a:r>
           </a:p>
           <a:p>

</xml_diff>